<commit_message>
Tweaked the PPT a little.
</commit_message>
<xml_diff>
--- a/Capstone3_CJK.pptx
+++ b/Capstone3_CJK.pptx
@@ -2019,14 +2019,12 @@
         <a:blipFill>
           <a:blip xmlns:r="http://schemas.openxmlformats.org/officeDocument/2006/relationships" r:embed="rId1">
             <a:extLst>
-              <a:ext uri="{28A0092B-C50C-407E-A947-70E740481C1C}">
-                <a14:useLocalDpi xmlns:a14="http://schemas.microsoft.com/office/drawing/2010/main" val="0"/>
-              </a:ext>
               <a:ext uri="{96DAC541-7B7A-43D3-8B79-37D633B846F1}">
                 <asvg:svgBlip xmlns:asvg="http://schemas.microsoft.com/office/drawing/2016/SVG/main" r:embed="rId2"/>
               </a:ext>
             </a:extLst>
           </a:blip>
+          <a:srcRect/>
           <a:stretch>
             <a:fillRect/>
           </a:stretch>
@@ -2037,7 +2035,7 @@
       </dgm:spPr>
       <dgm:extLst>
         <a:ext uri="{E40237B7-FDA0-4F09-8148-C483321AD2D9}">
-          <dgm14:cNvPr xmlns:dgm14="http://schemas.microsoft.com/office/drawing/2010/diagram" id="0" name="" descr="Car"/>
+          <dgm14:cNvPr xmlns:dgm14="http://schemas.microsoft.com/office/drawing/2010/diagram" id="0" name="" descr="Brainstorm with solid fill"/>
         </a:ext>
       </dgm:extLst>
     </dgm:pt>
@@ -2067,19 +2065,17 @@
       <dgm:spPr/>
     </dgm:pt>
     <dgm:pt modelId="{8ADB9D8E-BEB3-41DA-A6D2-310110A30014}" type="pres">
-      <dgm:prSet presAssocID="{8C6716B8-D3B5-435F-B6B7-2F546CFE6B31}" presName="iconRect" presStyleLbl="node1" presStyleIdx="1" presStyleCnt="3"/>
+      <dgm:prSet presAssocID="{8C6716B8-D3B5-435F-B6B7-2F546CFE6B31}" presName="iconRect" presStyleLbl="node1" presStyleIdx="1" presStyleCnt="3" custFlipHor="1"/>
       <dgm:spPr>
         <a:blipFill>
           <a:blip xmlns:r="http://schemas.openxmlformats.org/officeDocument/2006/relationships" r:embed="rId3">
             <a:extLst>
-              <a:ext uri="{28A0092B-C50C-407E-A947-70E740481C1C}">
-                <a14:useLocalDpi xmlns:a14="http://schemas.microsoft.com/office/drawing/2010/main" val="0"/>
-              </a:ext>
               <a:ext uri="{96DAC541-7B7A-43D3-8B79-37D633B846F1}">
                 <asvg:svgBlip xmlns:asvg="http://schemas.microsoft.com/office/drawing/2016/SVG/main" r:embed="rId4"/>
               </a:ext>
             </a:extLst>
           </a:blip>
+          <a:srcRect/>
           <a:stretch>
             <a:fillRect/>
           </a:stretch>
@@ -2090,7 +2086,7 @@
       </dgm:spPr>
       <dgm:extLst>
         <a:ext uri="{E40237B7-FDA0-4F09-8148-C483321AD2D9}">
-          <dgm14:cNvPr xmlns:dgm14="http://schemas.microsoft.com/office/drawing/2010/diagram" id="0" name="" descr="Tablet"/>
+          <dgm14:cNvPr xmlns:dgm14="http://schemas.microsoft.com/office/drawing/2010/diagram" id="0" name="" descr="Idea with solid fill"/>
         </a:ext>
       </dgm:extLst>
     </dgm:pt>
@@ -2218,7 +2214,10 @@
         <a:bodyPr/>
         <a:lstStyle/>
         <a:p>
-          <a:pPr>
+          <a:pPr algn="ctr">
+            <a:lnSpc>
+              <a:spcPct val="100000"/>
+            </a:lnSpc>
             <a:defRPr b="1"/>
           </a:pPr>
           <a:r>
@@ -2257,10 +2256,12 @@
         <a:bodyPr/>
         <a:lstStyle/>
         <a:p>
-          <a:r>
-            <a:rPr lang="en-US"/>
-            <a:t>HTML</a:t>
-          </a:r>
+          <a:pPr>
+            <a:lnSpc>
+              <a:spcPct val="100000"/>
+            </a:lnSpc>
+          </a:pPr>
+          <a:endParaRPr lang="en-US" dirty="0"/>
         </a:p>
       </dgm:t>
     </dgm:pt>
@@ -2286,114 +2287,6 @@
         </a:p>
       </dgm:t>
     </dgm:pt>
-    <dgm:pt modelId="{D140BFD7-8437-4686-8B47-73984833FF26}">
-      <dgm:prSet/>
-      <dgm:spPr/>
-      <dgm:t>
-        <a:bodyPr/>
-        <a:lstStyle/>
-        <a:p>
-          <a:r>
-            <a:rPr lang="en-US"/>
-            <a:t>CSS</a:t>
-          </a:r>
-        </a:p>
-      </dgm:t>
-    </dgm:pt>
-    <dgm:pt modelId="{59D56A76-082E-4C30-88BD-57A857822A78}" type="parTrans" cxnId="{65839C4C-A29D-422F-A005-850CCBDC4156}">
-      <dgm:prSet/>
-      <dgm:spPr/>
-      <dgm:t>
-        <a:bodyPr/>
-        <a:lstStyle/>
-        <a:p>
-          <a:endParaRPr lang="en-US"/>
-        </a:p>
-      </dgm:t>
-    </dgm:pt>
-    <dgm:pt modelId="{F697C9FC-64FC-4CE9-829A-DD6353A0AE97}" type="sibTrans" cxnId="{65839C4C-A29D-422F-A005-850CCBDC4156}">
-      <dgm:prSet/>
-      <dgm:spPr/>
-      <dgm:t>
-        <a:bodyPr/>
-        <a:lstStyle/>
-        <a:p>
-          <a:endParaRPr lang="en-US"/>
-        </a:p>
-      </dgm:t>
-    </dgm:pt>
-    <dgm:pt modelId="{61FF2665-4333-4658-9BFE-72E5CD1403CF}">
-      <dgm:prSet/>
-      <dgm:spPr/>
-      <dgm:t>
-        <a:bodyPr/>
-        <a:lstStyle/>
-        <a:p>
-          <a:r>
-            <a:rPr lang="en-US"/>
-            <a:t>React</a:t>
-          </a:r>
-        </a:p>
-      </dgm:t>
-    </dgm:pt>
-    <dgm:pt modelId="{640EC1F7-5AB0-4504-86D8-5319BDFE7764}" type="parTrans" cxnId="{1C0FB1D8-21DF-4570-BEFC-55219CCEE292}">
-      <dgm:prSet/>
-      <dgm:spPr/>
-      <dgm:t>
-        <a:bodyPr/>
-        <a:lstStyle/>
-        <a:p>
-          <a:endParaRPr lang="en-US"/>
-        </a:p>
-      </dgm:t>
-    </dgm:pt>
-    <dgm:pt modelId="{2489F853-D838-4172-BE90-D9E461102084}" type="sibTrans" cxnId="{1C0FB1D8-21DF-4570-BEFC-55219CCEE292}">
-      <dgm:prSet/>
-      <dgm:spPr/>
-      <dgm:t>
-        <a:bodyPr/>
-        <a:lstStyle/>
-        <a:p>
-          <a:endParaRPr lang="en-US"/>
-        </a:p>
-      </dgm:t>
-    </dgm:pt>
-    <dgm:pt modelId="{4B124860-5996-490F-BF63-1159500EE9AA}">
-      <dgm:prSet/>
-      <dgm:spPr/>
-      <dgm:t>
-        <a:bodyPr/>
-        <a:lstStyle/>
-        <a:p>
-          <a:r>
-            <a:rPr lang="en-US"/>
-            <a:t>Bootstrap</a:t>
-          </a:r>
-        </a:p>
-      </dgm:t>
-    </dgm:pt>
-    <dgm:pt modelId="{9BE698D1-1745-44F1-8311-5ABC9F01C187}" type="parTrans" cxnId="{2B616772-9CD5-467F-96F6-1DCDBF05239F}">
-      <dgm:prSet/>
-      <dgm:spPr/>
-      <dgm:t>
-        <a:bodyPr/>
-        <a:lstStyle/>
-        <a:p>
-          <a:endParaRPr lang="en-US"/>
-        </a:p>
-      </dgm:t>
-    </dgm:pt>
-    <dgm:pt modelId="{AA59F98B-68ED-48F6-B2C0-1FC4432747F6}" type="sibTrans" cxnId="{2B616772-9CD5-467F-96F6-1DCDBF05239F}">
-      <dgm:prSet/>
-      <dgm:spPr/>
-      <dgm:t>
-        <a:bodyPr/>
-        <a:lstStyle/>
-        <a:p>
-          <a:endParaRPr lang="en-US"/>
-        </a:p>
-      </dgm:t>
-    </dgm:pt>
     <dgm:pt modelId="{D5092FE7-65BD-44F0-BE84-EE2FB79D62FF}">
       <dgm:prSet/>
       <dgm:spPr/>
@@ -2401,11 +2294,14 @@
         <a:bodyPr/>
         <a:lstStyle/>
         <a:p>
-          <a:pPr>
+          <a:pPr algn="ctr">
+            <a:lnSpc>
+              <a:spcPct val="100000"/>
+            </a:lnSpc>
             <a:defRPr b="1"/>
           </a:pPr>
           <a:r>
-            <a:rPr lang="en-US"/>
+            <a:rPr lang="en-US" dirty="0"/>
             <a:t>Backend</a:t>
           </a:r>
         </a:p>
@@ -2440,10 +2336,12 @@
         <a:bodyPr/>
         <a:lstStyle/>
         <a:p>
-          <a:r>
-            <a:rPr lang="en-US"/>
-            <a:t>MongoDB</a:t>
-          </a:r>
+          <a:pPr>
+            <a:lnSpc>
+              <a:spcPct val="100000"/>
+            </a:lnSpc>
+          </a:pPr>
+          <a:endParaRPr lang="en-US" dirty="0"/>
         </a:p>
       </dgm:t>
     </dgm:pt>
@@ -2469,114 +2367,6 @@
         </a:p>
       </dgm:t>
     </dgm:pt>
-    <dgm:pt modelId="{65A2A896-FEC9-433C-8762-4D3B382086D1}">
-      <dgm:prSet/>
-      <dgm:spPr/>
-      <dgm:t>
-        <a:bodyPr/>
-        <a:lstStyle/>
-        <a:p>
-          <a:r>
-            <a:rPr lang="en-US"/>
-            <a:t>Express</a:t>
-          </a:r>
-        </a:p>
-      </dgm:t>
-    </dgm:pt>
-    <dgm:pt modelId="{FF04C097-B98B-4B58-B8CC-239B5F63CCC0}" type="parTrans" cxnId="{C6EAEEBB-44AF-4645-A92B-361316FED33C}">
-      <dgm:prSet/>
-      <dgm:spPr/>
-      <dgm:t>
-        <a:bodyPr/>
-        <a:lstStyle/>
-        <a:p>
-          <a:endParaRPr lang="en-US"/>
-        </a:p>
-      </dgm:t>
-    </dgm:pt>
-    <dgm:pt modelId="{2D3835C7-8DBA-4FF1-A89E-B2C8D317E85C}" type="sibTrans" cxnId="{C6EAEEBB-44AF-4645-A92B-361316FED33C}">
-      <dgm:prSet/>
-      <dgm:spPr/>
-      <dgm:t>
-        <a:bodyPr/>
-        <a:lstStyle/>
-        <a:p>
-          <a:endParaRPr lang="en-US"/>
-        </a:p>
-      </dgm:t>
-    </dgm:pt>
-    <dgm:pt modelId="{FEECBE71-976C-4B08-898B-7FF11C593A96}">
-      <dgm:prSet/>
-      <dgm:spPr/>
-      <dgm:t>
-        <a:bodyPr/>
-        <a:lstStyle/>
-        <a:p>
-          <a:r>
-            <a:rPr lang="en-US"/>
-            <a:t>Node.js</a:t>
-          </a:r>
-        </a:p>
-      </dgm:t>
-    </dgm:pt>
-    <dgm:pt modelId="{3EC37FC6-240B-46AD-A5D4-2434538941BA}" type="parTrans" cxnId="{48C08276-3D16-44BE-A160-5C66397F42D0}">
-      <dgm:prSet/>
-      <dgm:spPr/>
-      <dgm:t>
-        <a:bodyPr/>
-        <a:lstStyle/>
-        <a:p>
-          <a:endParaRPr lang="en-US"/>
-        </a:p>
-      </dgm:t>
-    </dgm:pt>
-    <dgm:pt modelId="{D6115845-08ED-4B0F-8F18-641128DA1D16}" type="sibTrans" cxnId="{48C08276-3D16-44BE-A160-5C66397F42D0}">
-      <dgm:prSet/>
-      <dgm:spPr/>
-      <dgm:t>
-        <a:bodyPr/>
-        <a:lstStyle/>
-        <a:p>
-          <a:endParaRPr lang="en-US"/>
-        </a:p>
-      </dgm:t>
-    </dgm:pt>
-    <dgm:pt modelId="{6BD67AD9-AC20-4DED-B70F-9200B14DD1BC}">
-      <dgm:prSet/>
-      <dgm:spPr/>
-      <dgm:t>
-        <a:bodyPr/>
-        <a:lstStyle/>
-        <a:p>
-          <a:r>
-            <a:rPr lang="en-US"/>
-            <a:t>Mongoose</a:t>
-          </a:r>
-        </a:p>
-      </dgm:t>
-    </dgm:pt>
-    <dgm:pt modelId="{68B861D5-BA76-43FA-A443-2604B3F45189}" type="parTrans" cxnId="{AF10968B-57D6-4BA2-B929-560FEAC97139}">
-      <dgm:prSet/>
-      <dgm:spPr/>
-      <dgm:t>
-        <a:bodyPr/>
-        <a:lstStyle/>
-        <a:p>
-          <a:endParaRPr lang="en-US"/>
-        </a:p>
-      </dgm:t>
-    </dgm:pt>
-    <dgm:pt modelId="{75C5EBFD-6041-4539-83BA-1DF3F73F1B8B}" type="sibTrans" cxnId="{AF10968B-57D6-4BA2-B929-560FEAC97139}">
-      <dgm:prSet/>
-      <dgm:spPr/>
-      <dgm:t>
-        <a:bodyPr/>
-        <a:lstStyle/>
-        <a:p>
-          <a:endParaRPr lang="en-US"/>
-        </a:p>
-      </dgm:t>
-    </dgm:pt>
     <dgm:pt modelId="{20A4A35E-9593-4D51-82AB-BDCD19DDE7F2}" type="pres">
       <dgm:prSet presAssocID="{BA876136-0C15-4DA6-B7F3-E3283AB2C719}" presName="root" presStyleCnt="0">
         <dgm:presLayoutVars>
@@ -2591,7 +2381,7 @@
       <dgm:spPr/>
     </dgm:pt>
     <dgm:pt modelId="{B2DCE835-4C88-4C29-A26A-CD21BE4A7ECD}" type="pres">
-      <dgm:prSet presAssocID="{58D22F6A-59BF-40ED-914E-7D4B96D41FED}" presName="iconRect" presStyleLbl="node1" presStyleIdx="0" presStyleCnt="2"/>
+      <dgm:prSet presAssocID="{58D22F6A-59BF-40ED-914E-7D4B96D41FED}" presName="iconRect" presStyleLbl="node1" presStyleIdx="0" presStyleCnt="2" custLinFactNeighborX="81298" custLinFactNeighborY="-27874"/>
       <dgm:spPr>
         <a:blipFill>
           <a:blip xmlns:r="http://schemas.openxmlformats.org/officeDocument/2006/relationships" r:embed="rId1">
@@ -2623,7 +2413,7 @@
       <dgm:spPr/>
     </dgm:pt>
     <dgm:pt modelId="{82C8596F-96C7-4F30-9F6C-C71C5954EC2A}" type="pres">
-      <dgm:prSet presAssocID="{58D22F6A-59BF-40ED-914E-7D4B96D41FED}" presName="parTx" presStyleLbl="revTx" presStyleIdx="0" presStyleCnt="4">
+      <dgm:prSet presAssocID="{58D22F6A-59BF-40ED-914E-7D4B96D41FED}" presName="parTx" presStyleLbl="revTx" presStyleIdx="0" presStyleCnt="4" custLinFactNeighborX="-962" custLinFactNeighborY="-88830">
         <dgm:presLayoutVars>
           <dgm:chMax val="0"/>
           <dgm:chPref val="0"/>
@@ -2650,19 +2440,17 @@
       <dgm:spPr/>
     </dgm:pt>
     <dgm:pt modelId="{CE52A116-F7D3-4A95-A497-94687AEFE950}" type="pres">
-      <dgm:prSet presAssocID="{D5092FE7-65BD-44F0-BE84-EE2FB79D62FF}" presName="iconRect" presStyleLbl="node1" presStyleIdx="1" presStyleCnt="2"/>
+      <dgm:prSet presAssocID="{D5092FE7-65BD-44F0-BE84-EE2FB79D62FF}" presName="iconRect" presStyleLbl="node1" presStyleIdx="1" presStyleCnt="2" custLinFactX="3440" custLinFactNeighborX="100000" custLinFactNeighborY="-17702"/>
       <dgm:spPr>
         <a:blipFill>
           <a:blip xmlns:r="http://schemas.openxmlformats.org/officeDocument/2006/relationships" r:embed="rId3">
             <a:extLst>
-              <a:ext uri="{28A0092B-C50C-407E-A947-70E740481C1C}">
-                <a14:useLocalDpi xmlns:a14="http://schemas.microsoft.com/office/drawing/2010/main" val="0"/>
-              </a:ext>
               <a:ext uri="{96DAC541-7B7A-43D3-8B79-37D633B846F1}">
                 <asvg:svgBlip xmlns:asvg="http://schemas.microsoft.com/office/drawing/2016/SVG/main" r:embed="rId4"/>
               </a:ext>
             </a:extLst>
           </a:blip>
+          <a:srcRect/>
           <a:stretch>
             <a:fillRect/>
           </a:stretch>
@@ -2673,7 +2461,7 @@
       </dgm:spPr>
       <dgm:extLst>
         <a:ext uri="{E40237B7-FDA0-4F09-8148-C483321AD2D9}">
-          <dgm14:cNvPr xmlns:dgm14="http://schemas.microsoft.com/office/drawing/2010/diagram" id="0" name="" descr="Document"/>
+          <dgm14:cNvPr xmlns:dgm14="http://schemas.microsoft.com/office/drawing/2010/diagram" id="0" name="" descr="Server with solid fill"/>
         </a:ext>
       </dgm:extLst>
     </dgm:pt>
@@ -2682,7 +2470,7 @@
       <dgm:spPr/>
     </dgm:pt>
     <dgm:pt modelId="{3B1B8C72-C876-4811-B55B-53EB31E4EF8C}" type="pres">
-      <dgm:prSet presAssocID="{D5092FE7-65BD-44F0-BE84-EE2FB79D62FF}" presName="parTx" presStyleLbl="revTx" presStyleIdx="2" presStyleCnt="4">
+      <dgm:prSet presAssocID="{D5092FE7-65BD-44F0-BE84-EE2FB79D62FF}" presName="parTx" presStyleLbl="revTx" presStyleIdx="2" presStyleCnt="4" custLinFactNeighborX="-5007" custLinFactNeighborY="-28013">
         <dgm:presLayoutVars>
           <dgm:chMax val="0"/>
           <dgm:chPref val="0"/>
@@ -2703,25 +2491,13 @@
   </dgm:ptLst>
   <dgm:cxnLst>
     <dgm:cxn modelId="{ABCDA107-82EF-4682-9A4D-7BA2E8AD04F2}" type="presOf" srcId="{D4FA6874-239A-48A3-B415-224A56D26CB1}" destId="{8695703C-38D9-4197-AB01-3B0E5250649A}" srcOrd="0" destOrd="0" presId="urn:microsoft.com/office/officeart/2018/2/layout/IconLabelDescriptionList"/>
-    <dgm:cxn modelId="{4ECE8E0E-3777-4B59-BBDA-75367D4B5B0F}" type="presOf" srcId="{4B124860-5996-490F-BF63-1159500EE9AA}" destId="{8695703C-38D9-4197-AB01-3B0E5250649A}" srcOrd="0" destOrd="3" presId="urn:microsoft.com/office/officeart/2018/2/layout/IconLabelDescriptionList"/>
-    <dgm:cxn modelId="{3AEE5F2F-70EB-477C-866A-21F754224093}" type="presOf" srcId="{61FF2665-4333-4658-9BFE-72E5CD1403CF}" destId="{8695703C-38D9-4197-AB01-3B0E5250649A}" srcOrd="0" destOrd="2" presId="urn:microsoft.com/office/officeart/2018/2/layout/IconLabelDescriptionList"/>
     <dgm:cxn modelId="{C5C37034-42DD-4EC5-8713-9BA622624E25}" type="presOf" srcId="{D5092FE7-65BD-44F0-BE84-EE2FB79D62FF}" destId="{3B1B8C72-C876-4811-B55B-53EB31E4EF8C}" srcOrd="0" destOrd="0" presId="urn:microsoft.com/office/officeart/2018/2/layout/IconLabelDescriptionList"/>
     <dgm:cxn modelId="{71AE0637-E31A-4A81-985E-CC8D3881984F}" type="presOf" srcId="{BA876136-0C15-4DA6-B7F3-E3283AB2C719}" destId="{20A4A35E-9593-4D51-82AB-BDCD19DDE7F2}" srcOrd="0" destOrd="0" presId="urn:microsoft.com/office/officeart/2018/2/layout/IconLabelDescriptionList"/>
+    <dgm:cxn modelId="{6F157B5B-C4A5-4BDD-AB08-8DABBC7EF303}" type="presOf" srcId="{6B8EA26E-1869-4569-9DB1-FCDD3CD21AE8}" destId="{ACC27209-9F80-4826-86D0-1CA53A97DE02}" srcOrd="0" destOrd="0" presId="urn:microsoft.com/office/officeart/2018/2/layout/IconLabelDescriptionList"/>
     <dgm:cxn modelId="{53267C43-B3B9-4024-AAE7-1D6F549D871C}" srcId="{D5092FE7-65BD-44F0-BE84-EE2FB79D62FF}" destId="{6B8EA26E-1869-4569-9DB1-FCDD3CD21AE8}" srcOrd="0" destOrd="0" parTransId="{5CB5034D-24F2-4146-B429-B12474A56793}" sibTransId="{7A7C185B-83C4-49EB-9872-C4382447268C}"/>
-    <dgm:cxn modelId="{65839C4C-A29D-422F-A005-850CCBDC4156}" srcId="{58D22F6A-59BF-40ED-914E-7D4B96D41FED}" destId="{D140BFD7-8437-4686-8B47-73984833FF26}" srcOrd="1" destOrd="0" parTransId="{59D56A76-082E-4C30-88BD-57A857822A78}" sibTransId="{F697C9FC-64FC-4CE9-829A-DD6353A0AE97}"/>
-    <dgm:cxn modelId="{F8828D54-9999-4F5F-B0FD-B27A0028D6B0}" type="presOf" srcId="{65A2A896-FEC9-433C-8762-4D3B382086D1}" destId="{ACC27209-9F80-4826-86D0-1CA53A97DE02}" srcOrd="0" destOrd="1" presId="urn:microsoft.com/office/officeart/2018/2/layout/IconLabelDescriptionList"/>
-    <dgm:cxn modelId="{6F157B5B-C4A5-4BDD-AB08-8DABBC7EF303}" type="presOf" srcId="{6B8EA26E-1869-4569-9DB1-FCDD3CD21AE8}" destId="{ACC27209-9F80-4826-86D0-1CA53A97DE02}" srcOrd="0" destOrd="0" presId="urn:microsoft.com/office/officeart/2018/2/layout/IconLabelDescriptionList"/>
-    <dgm:cxn modelId="{2C889061-95F8-41A4-9D14-EEC9FA44B84F}" type="presOf" srcId="{D140BFD7-8437-4686-8B47-73984833FF26}" destId="{8695703C-38D9-4197-AB01-3B0E5250649A}" srcOrd="0" destOrd="1" presId="urn:microsoft.com/office/officeart/2018/2/layout/IconLabelDescriptionList"/>
     <dgm:cxn modelId="{51185067-B884-4853-BDB8-7CD64E51372D}" type="presOf" srcId="{58D22F6A-59BF-40ED-914E-7D4B96D41FED}" destId="{82C8596F-96C7-4F30-9F6C-C71C5954EC2A}" srcOrd="0" destOrd="0" presId="urn:microsoft.com/office/officeart/2018/2/layout/IconLabelDescriptionList"/>
     <dgm:cxn modelId="{E58ECD6F-F91C-465C-B7CA-395B95D03A58}" srcId="{BA876136-0C15-4DA6-B7F3-E3283AB2C719}" destId="{D5092FE7-65BD-44F0-BE84-EE2FB79D62FF}" srcOrd="1" destOrd="0" parTransId="{9AD97C1C-843E-4598-B1ED-606713AF525B}" sibTransId="{0F96E083-5CE2-4445-86B1-8B1DE9EC770C}"/>
-    <dgm:cxn modelId="{2B616772-9CD5-467F-96F6-1DCDBF05239F}" srcId="{58D22F6A-59BF-40ED-914E-7D4B96D41FED}" destId="{4B124860-5996-490F-BF63-1159500EE9AA}" srcOrd="3" destOrd="0" parTransId="{9BE698D1-1745-44F1-8311-5ABC9F01C187}" sibTransId="{AA59F98B-68ED-48F6-B2C0-1FC4432747F6}"/>
-    <dgm:cxn modelId="{48C08276-3D16-44BE-A160-5C66397F42D0}" srcId="{D5092FE7-65BD-44F0-BE84-EE2FB79D62FF}" destId="{FEECBE71-976C-4B08-898B-7FF11C593A96}" srcOrd="2" destOrd="0" parTransId="{3EC37FC6-240B-46AD-A5D4-2434538941BA}" sibTransId="{D6115845-08ED-4B0F-8F18-641128DA1D16}"/>
     <dgm:cxn modelId="{77CC8F83-F45B-45C6-A690-AABDC729A6EA}" srcId="{BA876136-0C15-4DA6-B7F3-E3283AB2C719}" destId="{58D22F6A-59BF-40ED-914E-7D4B96D41FED}" srcOrd="0" destOrd="0" parTransId="{56F41A32-D7D5-4C38-9409-67D276CF7856}" sibTransId="{1D135967-ABFA-4DEA-9187-5363B9892560}"/>
-    <dgm:cxn modelId="{6063EB88-BECA-4129-944C-E89593F84444}" type="presOf" srcId="{FEECBE71-976C-4B08-898B-7FF11C593A96}" destId="{ACC27209-9F80-4826-86D0-1CA53A97DE02}" srcOrd="0" destOrd="2" presId="urn:microsoft.com/office/officeart/2018/2/layout/IconLabelDescriptionList"/>
-    <dgm:cxn modelId="{7683208A-E541-4CD3-A072-EFE26CF8725E}" type="presOf" srcId="{6BD67AD9-AC20-4DED-B70F-9200B14DD1BC}" destId="{ACC27209-9F80-4826-86D0-1CA53A97DE02}" srcOrd="0" destOrd="3" presId="urn:microsoft.com/office/officeart/2018/2/layout/IconLabelDescriptionList"/>
-    <dgm:cxn modelId="{AF10968B-57D6-4BA2-B929-560FEAC97139}" srcId="{D5092FE7-65BD-44F0-BE84-EE2FB79D62FF}" destId="{6BD67AD9-AC20-4DED-B70F-9200B14DD1BC}" srcOrd="3" destOrd="0" parTransId="{68B861D5-BA76-43FA-A443-2604B3F45189}" sibTransId="{75C5EBFD-6041-4539-83BA-1DF3F73F1B8B}"/>
-    <dgm:cxn modelId="{C6EAEEBB-44AF-4645-A92B-361316FED33C}" srcId="{D5092FE7-65BD-44F0-BE84-EE2FB79D62FF}" destId="{65A2A896-FEC9-433C-8762-4D3B382086D1}" srcOrd="1" destOrd="0" parTransId="{FF04C097-B98B-4B58-B8CC-239B5F63CCC0}" sibTransId="{2D3835C7-8DBA-4FF1-A89E-B2C8D317E85C}"/>
-    <dgm:cxn modelId="{1C0FB1D8-21DF-4570-BEFC-55219CCEE292}" srcId="{58D22F6A-59BF-40ED-914E-7D4B96D41FED}" destId="{61FF2665-4333-4658-9BFE-72E5CD1403CF}" srcOrd="2" destOrd="0" parTransId="{640EC1F7-5AB0-4504-86D8-5319BDFE7764}" sibTransId="{2489F853-D838-4172-BE90-D9E461102084}"/>
     <dgm:cxn modelId="{6F8328FC-E7CE-45CF-B42D-5AE6E41AFDB9}" srcId="{58D22F6A-59BF-40ED-914E-7D4B96D41FED}" destId="{D4FA6874-239A-48A3-B415-224A56D26CB1}" srcOrd="0" destOrd="0" parTransId="{B0302242-069A-41D2-960A-E01DFB692F4A}" sibTransId="{9303E49F-3D3B-4C49-BA41-8ED18536238B}"/>
     <dgm:cxn modelId="{FFC931DA-0929-4414-B3AC-45BD1ED89345}" type="presParOf" srcId="{20A4A35E-9593-4D51-82AB-BDCD19DDE7F2}" destId="{356E89C8-F87F-4DBE-8393-206D659F9856}" srcOrd="0" destOrd="0" presId="urn:microsoft.com/office/officeart/2018/2/layout/IconLabelDescriptionList"/>
     <dgm:cxn modelId="{D5CC72FB-C3E6-4741-B8A9-927B5F373AE2}" type="presParOf" srcId="{356E89C8-F87F-4DBE-8393-206D659F9856}" destId="{B2DCE835-4C88-4C29-A26A-CD21BE4A7ECD}" srcOrd="0" destOrd="0" presId="urn:microsoft.com/office/officeart/2018/2/layout/IconLabelDescriptionList"/>
@@ -2762,7 +2538,7 @@
       </dsp:nvSpPr>
       <dsp:spPr>
         <a:xfrm>
-          <a:off x="674478" y="613961"/>
+          <a:off x="674477" y="613961"/>
           <a:ext cx="1887187" cy="1887187"/>
         </a:xfrm>
         <a:prstGeom prst="ellipse">
@@ -2811,14 +2587,12 @@
         <a:blipFill>
           <a:blip xmlns:r="http://schemas.openxmlformats.org/officeDocument/2006/relationships" r:embed="rId1">
             <a:extLst>
-              <a:ext uri="{28A0092B-C50C-407E-A947-70E740481C1C}">
-                <a14:useLocalDpi xmlns:a14="http://schemas.microsoft.com/office/drawing/2010/main" val="0"/>
-              </a:ext>
               <a:ext uri="{96DAC541-7B7A-43D3-8B79-37D633B846F1}">
                 <asvg:svgBlip xmlns:asvg="http://schemas.microsoft.com/office/drawing/2016/SVG/main" r:embed="rId2"/>
               </a:ext>
             </a:extLst>
           </a:blip>
+          <a:srcRect/>
           <a:stretch>
             <a:fillRect/>
           </a:stretch>
@@ -2852,7 +2626,7 @@
       </dsp:nvSpPr>
       <dsp:spPr>
         <a:xfrm>
-          <a:off x="71196" y="3088961"/>
+          <a:off x="71196" y="3088962"/>
           <a:ext cx="3093750" cy="832500"/>
         </a:xfrm>
         <a:prstGeom prst="rect">
@@ -2921,7 +2695,7 @@
         </a:p>
       </dsp:txBody>
       <dsp:txXfrm>
-        <a:off x="71196" y="3088961"/>
+        <a:off x="71196" y="3088962"/>
         <a:ext cx="3093750" cy="832500"/>
       </dsp:txXfrm>
     </dsp:sp>
@@ -2971,7 +2745,7 @@
         <dsp:cNvSpPr/>
       </dsp:nvSpPr>
       <dsp:spPr>
-        <a:xfrm>
+        <a:xfrm flipH="1">
           <a:off x="4711821" y="1016149"/>
           <a:ext cx="1082812" cy="1082812"/>
         </a:xfrm>
@@ -2981,14 +2755,12 @@
         <a:blipFill>
           <a:blip xmlns:r="http://schemas.openxmlformats.org/officeDocument/2006/relationships" r:embed="rId3">
             <a:extLst>
-              <a:ext uri="{28A0092B-C50C-407E-A947-70E740481C1C}">
-                <a14:useLocalDpi xmlns:a14="http://schemas.microsoft.com/office/drawing/2010/main" val="0"/>
-              </a:ext>
               <a:ext uri="{96DAC541-7B7A-43D3-8B79-37D633B846F1}">
                 <asvg:svgBlip xmlns:asvg="http://schemas.microsoft.com/office/drawing/2016/SVG/main" r:embed="rId4"/>
               </a:ext>
             </a:extLst>
           </a:blip>
+          <a:srcRect/>
           <a:stretch>
             <a:fillRect/>
           </a:stretch>
@@ -3022,7 +2794,7 @@
       </dsp:nvSpPr>
       <dsp:spPr>
         <a:xfrm>
-          <a:off x="3706353" y="3088961"/>
+          <a:off x="3706353" y="3088962"/>
           <a:ext cx="3093750" cy="832500"/>
         </a:xfrm>
         <a:prstGeom prst="rect">
@@ -3091,7 +2863,7 @@
         </a:p>
       </dsp:txBody>
       <dsp:txXfrm>
-        <a:off x="3706353" y="3088961"/>
+        <a:off x="3706353" y="3088962"/>
         <a:ext cx="3093750" cy="832500"/>
       </dsp:txXfrm>
     </dsp:sp>
@@ -3192,7 +2964,7 @@
       </dsp:nvSpPr>
       <dsp:spPr>
         <a:xfrm>
-          <a:off x="7341509" y="3088961"/>
+          <a:off x="7341509" y="3088962"/>
           <a:ext cx="3093750" cy="832500"/>
         </a:xfrm>
         <a:prstGeom prst="rect">
@@ -3261,7 +3033,7 @@
         </a:p>
       </dsp:txBody>
       <dsp:txXfrm>
-        <a:off x="7341509" y="3088961"/>
+        <a:off x="7341509" y="3088962"/>
         <a:ext cx="3093750" cy="832500"/>
       </dsp:txXfrm>
     </dsp:sp>
@@ -3284,7 +3056,7 @@
       </dsp:nvSpPr>
       <dsp:spPr>
         <a:xfrm>
-          <a:off x="559800" y="360982"/>
+          <a:off x="1789025" y="427141"/>
           <a:ext cx="1512000" cy="1512000"/>
         </a:xfrm>
         <a:prstGeom prst="rect">
@@ -3334,7 +3106,7 @@
       </dsp:nvSpPr>
       <dsp:spPr>
         <a:xfrm>
-          <a:off x="559800" y="2029045"/>
+          <a:off x="518241" y="1899105"/>
           <a:ext cx="4320000" cy="648000"/>
         </a:xfrm>
         <a:prstGeom prst="rect">
@@ -3364,9 +3136,9 @@
         </a:bodyPr>
         <a:lstStyle/>
         <a:p>
-          <a:pPr marL="0" lvl="0" indent="0" algn="l" defTabSz="1600200">
+          <a:pPr marL="0" lvl="0" indent="0" algn="ctr" defTabSz="1600200">
             <a:lnSpc>
-              <a:spcPct val="90000"/>
+              <a:spcPct val="100000"/>
             </a:lnSpc>
             <a:spcBef>
               <a:spcPct val="0"/>
@@ -3384,7 +3156,7 @@
         </a:p>
       </dsp:txBody>
       <dsp:txXfrm>
-        <a:off x="559800" y="2029045"/>
+        <a:off x="518241" y="1899105"/>
         <a:ext cx="4320000" cy="648000"/>
       </dsp:txXfrm>
     </dsp:sp>
@@ -3395,8 +3167,8 @@
       </dsp:nvSpPr>
       <dsp:spPr>
         <a:xfrm>
-          <a:off x="559800" y="2749633"/>
-          <a:ext cx="4320000" cy="1240722"/>
+          <a:off x="559800" y="3175807"/>
+          <a:ext cx="4320000" cy="326934"/>
         </a:xfrm>
         <a:prstGeom prst="rect">
           <a:avLst/>
@@ -3425,9 +3197,9 @@
         </a:bodyPr>
         <a:lstStyle/>
         <a:p>
-          <a:pPr marL="0" lvl="0" indent="0" algn="l" defTabSz="755650">
+          <a:pPr marL="0" lvl="0" indent="0" algn="l" defTabSz="889000">
             <a:lnSpc>
-              <a:spcPct val="90000"/>
+              <a:spcPct val="100000"/>
             </a:lnSpc>
             <a:spcBef>
               <a:spcPct val="0"/>
@@ -3437,69 +3209,12 @@
             </a:spcAft>
             <a:buNone/>
           </a:pPr>
-          <a:r>
-            <a:rPr lang="en-US" sz="1700" kern="1200"/>
-            <a:t>HTML</a:t>
-          </a:r>
-        </a:p>
-        <a:p>
-          <a:pPr marL="0" lvl="0" indent="0" algn="l" defTabSz="755650">
-            <a:lnSpc>
-              <a:spcPct val="90000"/>
-            </a:lnSpc>
-            <a:spcBef>
-              <a:spcPct val="0"/>
-            </a:spcBef>
-            <a:spcAft>
-              <a:spcPct val="35000"/>
-            </a:spcAft>
-            <a:buNone/>
-          </a:pPr>
-          <a:r>
-            <a:rPr lang="en-US" sz="1700" kern="1200"/>
-            <a:t>CSS</a:t>
-          </a:r>
-        </a:p>
-        <a:p>
-          <a:pPr marL="0" lvl="0" indent="0" algn="l" defTabSz="755650">
-            <a:lnSpc>
-              <a:spcPct val="90000"/>
-            </a:lnSpc>
-            <a:spcBef>
-              <a:spcPct val="0"/>
-            </a:spcBef>
-            <a:spcAft>
-              <a:spcPct val="35000"/>
-            </a:spcAft>
-            <a:buNone/>
-          </a:pPr>
-          <a:r>
-            <a:rPr lang="en-US" sz="1700" kern="1200"/>
-            <a:t>React</a:t>
-          </a:r>
-        </a:p>
-        <a:p>
-          <a:pPr marL="0" lvl="0" indent="0" algn="l" defTabSz="755650">
-            <a:lnSpc>
-              <a:spcPct val="90000"/>
-            </a:lnSpc>
-            <a:spcBef>
-              <a:spcPct val="0"/>
-            </a:spcBef>
-            <a:spcAft>
-              <a:spcPct val="35000"/>
-            </a:spcAft>
-            <a:buNone/>
-          </a:pPr>
-          <a:r>
-            <a:rPr lang="en-US" sz="1700" kern="1200"/>
-            <a:t>Bootstrap</a:t>
-          </a:r>
+          <a:endParaRPr lang="en-US" sz="2000" kern="1200" dirty="0"/>
         </a:p>
       </dsp:txBody>
       <dsp:txXfrm>
-        <a:off x="559800" y="2749633"/>
-        <a:ext cx="4320000" cy="1240722"/>
+        <a:off x="559800" y="3175807"/>
+        <a:ext cx="4320000" cy="326934"/>
       </dsp:txXfrm>
     </dsp:sp>
     <dsp:sp modelId="{CE52A116-F7D3-4A95-A497-94687AEFE950}">
@@ -3509,7 +3224,7 @@
       </dsp:nvSpPr>
       <dsp:spPr>
         <a:xfrm>
-          <a:off x="5635800" y="360982"/>
+          <a:off x="7199812" y="580941"/>
           <a:ext cx="1512000" cy="1512000"/>
         </a:xfrm>
         <a:prstGeom prst="rect">
@@ -3518,14 +3233,12 @@
         <a:blipFill>
           <a:blip xmlns:r="http://schemas.openxmlformats.org/officeDocument/2006/relationships" r:embed="rId3">
             <a:extLst>
-              <a:ext uri="{28A0092B-C50C-407E-A947-70E740481C1C}">
-                <a14:useLocalDpi xmlns:a14="http://schemas.microsoft.com/office/drawing/2010/main" val="0"/>
-              </a:ext>
               <a:ext uri="{96DAC541-7B7A-43D3-8B79-37D633B846F1}">
                 <asvg:svgBlip xmlns:asvg="http://schemas.microsoft.com/office/drawing/2016/SVG/main" r:embed="rId4"/>
               </a:ext>
             </a:extLst>
           </a:blip>
+          <a:srcRect/>
           <a:stretch>
             <a:fillRect/>
           </a:stretch>
@@ -3559,7 +3272,7 @@
       </dsp:nvSpPr>
       <dsp:spPr>
         <a:xfrm>
-          <a:off x="5635800" y="2029045"/>
+          <a:off x="5419497" y="2293199"/>
           <a:ext cx="4320000" cy="648000"/>
         </a:xfrm>
         <a:prstGeom prst="rect">
@@ -3589,9 +3302,9 @@
         </a:bodyPr>
         <a:lstStyle/>
         <a:p>
-          <a:pPr marL="0" lvl="0" indent="0" algn="l" defTabSz="1600200">
+          <a:pPr marL="0" lvl="0" indent="0" algn="ctr" defTabSz="1600200">
             <a:lnSpc>
-              <a:spcPct val="90000"/>
+              <a:spcPct val="100000"/>
             </a:lnSpc>
             <a:spcBef>
               <a:spcPct val="0"/>
@@ -3603,13 +3316,13 @@
             <a:defRPr b="1"/>
           </a:pPr>
           <a:r>
-            <a:rPr lang="en-US" sz="3600" kern="1200"/>
+            <a:rPr lang="en-US" sz="3600" kern="1200" dirty="0"/>
             <a:t>Backend</a:t>
           </a:r>
         </a:p>
       </dsp:txBody>
       <dsp:txXfrm>
-        <a:off x="5635800" y="2029045"/>
+        <a:off x="5419497" y="2293199"/>
         <a:ext cx="4320000" cy="648000"/>
       </dsp:txXfrm>
     </dsp:sp>
@@ -3620,8 +3333,8 @@
       </dsp:nvSpPr>
       <dsp:spPr>
         <a:xfrm>
-          <a:off x="5635800" y="2749633"/>
-          <a:ext cx="4320000" cy="1240722"/>
+          <a:off x="5635800" y="3175807"/>
+          <a:ext cx="4320000" cy="326934"/>
         </a:xfrm>
         <a:prstGeom prst="rect">
           <a:avLst/>
@@ -3650,9 +3363,9 @@
         </a:bodyPr>
         <a:lstStyle/>
         <a:p>
-          <a:pPr marL="0" lvl="0" indent="0" algn="l" defTabSz="755650">
+          <a:pPr marL="0" lvl="0" indent="0" algn="l" defTabSz="933450">
             <a:lnSpc>
-              <a:spcPct val="90000"/>
+              <a:spcPct val="100000"/>
             </a:lnSpc>
             <a:spcBef>
               <a:spcPct val="0"/>
@@ -3662,69 +3375,12 @@
             </a:spcAft>
             <a:buNone/>
           </a:pPr>
-          <a:r>
-            <a:rPr lang="en-US" sz="1700" kern="1200"/>
-            <a:t>MongoDB</a:t>
-          </a:r>
-        </a:p>
-        <a:p>
-          <a:pPr marL="0" lvl="0" indent="0" algn="l" defTabSz="755650">
-            <a:lnSpc>
-              <a:spcPct val="90000"/>
-            </a:lnSpc>
-            <a:spcBef>
-              <a:spcPct val="0"/>
-            </a:spcBef>
-            <a:spcAft>
-              <a:spcPct val="35000"/>
-            </a:spcAft>
-            <a:buNone/>
-          </a:pPr>
-          <a:r>
-            <a:rPr lang="en-US" sz="1700" kern="1200"/>
-            <a:t>Express</a:t>
-          </a:r>
-        </a:p>
-        <a:p>
-          <a:pPr marL="0" lvl="0" indent="0" algn="l" defTabSz="755650">
-            <a:lnSpc>
-              <a:spcPct val="90000"/>
-            </a:lnSpc>
-            <a:spcBef>
-              <a:spcPct val="0"/>
-            </a:spcBef>
-            <a:spcAft>
-              <a:spcPct val="35000"/>
-            </a:spcAft>
-            <a:buNone/>
-          </a:pPr>
-          <a:r>
-            <a:rPr lang="en-US" sz="1700" kern="1200"/>
-            <a:t>Node.js</a:t>
-          </a:r>
-        </a:p>
-        <a:p>
-          <a:pPr marL="0" lvl="0" indent="0" algn="l" defTabSz="755650">
-            <a:lnSpc>
-              <a:spcPct val="90000"/>
-            </a:lnSpc>
-            <a:spcBef>
-              <a:spcPct val="0"/>
-            </a:spcBef>
-            <a:spcAft>
-              <a:spcPct val="35000"/>
-            </a:spcAft>
-            <a:buNone/>
-          </a:pPr>
-          <a:r>
-            <a:rPr lang="en-US" sz="1700" kern="1200"/>
-            <a:t>Mongoose</a:t>
-          </a:r>
+          <a:endParaRPr lang="en-US" sz="2100" kern="1200" dirty="0"/>
         </a:p>
       </dsp:txBody>
       <dsp:txXfrm>
-        <a:off x="5635800" y="2749633"/>
-        <a:ext cx="4320000" cy="1240722"/>
+        <a:off x="5635800" y="3175807"/>
+        <a:ext cx="4320000" cy="326934"/>
       </dsp:txXfrm>
     </dsp:sp>
   </dsp:spTree>
@@ -6370,7 +6026,7 @@
           <a:p>
             <a:fld id="{8E1B361F-AF8B-8048-AD58-40D4EF99588B}" type="datetimeFigureOut">
               <a:rPr lang="en-US" smtClean="0"/>
-              <a:t>8/23/23</a:t>
+              <a:t>8/23/2023</a:t>
             </a:fld>
             <a:endParaRPr lang="en-US"/>
           </a:p>
@@ -6568,7 +6224,7 @@
           <a:p>
             <a:fld id="{8E1B361F-AF8B-8048-AD58-40D4EF99588B}" type="datetimeFigureOut">
               <a:rPr lang="en-US" smtClean="0"/>
-              <a:t>8/23/23</a:t>
+              <a:t>8/23/2023</a:t>
             </a:fld>
             <a:endParaRPr lang="en-US"/>
           </a:p>
@@ -6776,7 +6432,7 @@
           <a:p>
             <a:fld id="{8E1B361F-AF8B-8048-AD58-40D4EF99588B}" type="datetimeFigureOut">
               <a:rPr lang="en-US" smtClean="0"/>
-              <a:t>8/23/23</a:t>
+              <a:t>8/23/2023</a:t>
             </a:fld>
             <a:endParaRPr lang="en-US"/>
           </a:p>
@@ -6974,7 +6630,7 @@
           <a:p>
             <a:fld id="{8E1B361F-AF8B-8048-AD58-40D4EF99588B}" type="datetimeFigureOut">
               <a:rPr lang="en-US" smtClean="0"/>
-              <a:t>8/23/23</a:t>
+              <a:t>8/23/2023</a:t>
             </a:fld>
             <a:endParaRPr lang="en-US"/>
           </a:p>
@@ -7249,7 +6905,7 @@
           <a:p>
             <a:fld id="{8E1B361F-AF8B-8048-AD58-40D4EF99588B}" type="datetimeFigureOut">
               <a:rPr lang="en-US" smtClean="0"/>
-              <a:t>8/23/23</a:t>
+              <a:t>8/23/2023</a:t>
             </a:fld>
             <a:endParaRPr lang="en-US"/>
           </a:p>
@@ -7514,7 +7170,7 @@
           <a:p>
             <a:fld id="{8E1B361F-AF8B-8048-AD58-40D4EF99588B}" type="datetimeFigureOut">
               <a:rPr lang="en-US" smtClean="0"/>
-              <a:t>8/23/23</a:t>
+              <a:t>8/23/2023</a:t>
             </a:fld>
             <a:endParaRPr lang="en-US"/>
           </a:p>
@@ -7926,7 +7582,7 @@
           <a:p>
             <a:fld id="{8E1B361F-AF8B-8048-AD58-40D4EF99588B}" type="datetimeFigureOut">
               <a:rPr lang="en-US" smtClean="0"/>
-              <a:t>8/23/23</a:t>
+              <a:t>8/23/2023</a:t>
             </a:fld>
             <a:endParaRPr lang="en-US"/>
           </a:p>
@@ -8067,7 +7723,7 @@
           <a:p>
             <a:fld id="{8E1B361F-AF8B-8048-AD58-40D4EF99588B}" type="datetimeFigureOut">
               <a:rPr lang="en-US" smtClean="0"/>
-              <a:t>8/23/23</a:t>
+              <a:t>8/23/2023</a:t>
             </a:fld>
             <a:endParaRPr lang="en-US"/>
           </a:p>
@@ -8180,7 +7836,7 @@
           <a:p>
             <a:fld id="{8E1B361F-AF8B-8048-AD58-40D4EF99588B}" type="datetimeFigureOut">
               <a:rPr lang="en-US" smtClean="0"/>
-              <a:t>8/23/23</a:t>
+              <a:t>8/23/2023</a:t>
             </a:fld>
             <a:endParaRPr lang="en-US"/>
           </a:p>
@@ -8491,7 +8147,7 @@
           <a:p>
             <a:fld id="{8E1B361F-AF8B-8048-AD58-40D4EF99588B}" type="datetimeFigureOut">
               <a:rPr lang="en-US" smtClean="0"/>
-              <a:t>8/23/23</a:t>
+              <a:t>8/23/2023</a:t>
             </a:fld>
             <a:endParaRPr lang="en-US"/>
           </a:p>
@@ -8779,7 +8435,7 @@
           <a:p>
             <a:fld id="{8E1B361F-AF8B-8048-AD58-40D4EF99588B}" type="datetimeFigureOut">
               <a:rPr lang="en-US" smtClean="0"/>
-              <a:t>8/23/23</a:t>
+              <a:t>8/23/2023</a:t>
             </a:fld>
             <a:endParaRPr lang="en-US"/>
           </a:p>
@@ -9020,7 +8676,7 @@
           <a:p>
             <a:fld id="{8E1B361F-AF8B-8048-AD58-40D4EF99588B}" type="datetimeFigureOut">
               <a:rPr lang="en-US" smtClean="0"/>
-              <a:t>8/23/23</a:t>
+              <a:t>8/23/2023</a:t>
             </a:fld>
             <a:endParaRPr lang="en-US"/>
           </a:p>
@@ -10110,7 +9766,7 @@
             <p:ph idx="1"/>
             <p:extLst>
               <p:ext uri="{D42A27DB-BD31-4B8C-83A1-F6EECF244321}">
-                <p14:modId xmlns:p14="http://schemas.microsoft.com/office/powerpoint/2010/main" val="763184915"/>
+                <p14:modId xmlns:p14="http://schemas.microsoft.com/office/powerpoint/2010/main" val="543631603"/>
               </p:ext>
             </p:extLst>
           </p:nvPr>
@@ -10739,7 +10395,7 @@
         </p:nvSpPr>
         <p:spPr>
           <a:xfrm>
-            <a:off x="838200" y="459863"/>
+            <a:off x="838200" y="394549"/>
             <a:ext cx="10515600" cy="1004594"/>
           </a:xfrm>
         </p:spPr>
@@ -10844,7 +10500,7 @@
             <p:ph idx="1"/>
             <p:extLst>
               <p:ext uri="{D42A27DB-BD31-4B8C-83A1-F6EECF244321}">
-                <p14:modId xmlns:p14="http://schemas.microsoft.com/office/powerpoint/2010/main" val="2065672530"/>
+                <p14:modId xmlns:p14="http://schemas.microsoft.com/office/powerpoint/2010/main" val="2310892066"/>
               </p:ext>
             </p:extLst>
           </p:nvPr>
@@ -10859,6 +10515,382 @@
           </a:graphicData>
         </a:graphic>
       </p:graphicFrame>
+      <p:pic>
+        <p:nvPicPr>
+          <p:cNvPr id="1028" name="Picture 4" descr="CSS - Wikipedia">
+            <a:extLst>
+              <a:ext uri="{FF2B5EF4-FFF2-40B4-BE49-F238E27FC236}">
+                <a16:creationId xmlns:a16="http://schemas.microsoft.com/office/drawing/2014/main" id="{BE053895-36EF-B419-0D7C-583F0FE2D72E}"/>
+              </a:ext>
+            </a:extLst>
+          </p:cNvPr>
+          <p:cNvPicPr>
+            <a:picLocks noChangeAspect="1" noChangeArrowheads="1"/>
+          </p:cNvPicPr>
+          <p:nvPr/>
+        </p:nvPicPr>
+        <p:blipFill>
+          <a:blip r:embed="rId7">
+            <a:extLst>
+              <a:ext uri="{28A0092B-C50C-407E-A947-70E740481C1C}">
+                <a14:useLocalDpi xmlns:a14="http://schemas.microsoft.com/office/drawing/2010/main" val="0"/>
+              </a:ext>
+            </a:extLst>
+          </a:blip>
+          <a:srcRect/>
+          <a:stretch>
+            <a:fillRect/>
+          </a:stretch>
+        </p:blipFill>
+        <p:spPr bwMode="auto">
+          <a:xfrm>
+            <a:off x="2464626" y="4380135"/>
+            <a:ext cx="770676" cy="1087303"/>
+          </a:xfrm>
+          <a:prstGeom prst="rect">
+            <a:avLst/>
+          </a:prstGeom>
+          <a:noFill/>
+          <a:extLst>
+            <a:ext uri="{909E8E84-426E-40DD-AFC4-6F175D3DCCD1}">
+              <a14:hiddenFill xmlns:a14="http://schemas.microsoft.com/office/drawing/2010/main">
+                <a:solidFill>
+                  <a:srgbClr val="FFFFFF"/>
+                </a:solidFill>
+              </a14:hiddenFill>
+            </a:ext>
+          </a:extLst>
+        </p:spPr>
+      </p:pic>
+      <p:pic>
+        <p:nvPicPr>
+          <p:cNvPr id="1034" name="Picture 10">
+            <a:extLst>
+              <a:ext uri="{FF2B5EF4-FFF2-40B4-BE49-F238E27FC236}">
+                <a16:creationId xmlns:a16="http://schemas.microsoft.com/office/drawing/2014/main" id="{3561B86C-6BDE-53AE-1D27-C6D298FAD5B5}"/>
+              </a:ext>
+            </a:extLst>
+          </p:cNvPr>
+          <p:cNvPicPr>
+            <a:picLocks noChangeAspect="1" noChangeArrowheads="1"/>
+          </p:cNvPicPr>
+          <p:nvPr/>
+        </p:nvPicPr>
+        <p:blipFill>
+          <a:blip r:embed="rId8">
+            <a:extLst>
+              <a:ext uri="{28A0092B-C50C-407E-A947-70E740481C1C}">
+                <a14:useLocalDpi xmlns:a14="http://schemas.microsoft.com/office/drawing/2010/main" val="0"/>
+              </a:ext>
+            </a:extLst>
+          </a:blip>
+          <a:srcRect/>
+          <a:stretch>
+            <a:fillRect/>
+          </a:stretch>
+        </p:blipFill>
+        <p:spPr bwMode="auto">
+          <a:xfrm>
+            <a:off x="4690137" y="4525665"/>
+            <a:ext cx="1091607" cy="949223"/>
+          </a:xfrm>
+          <a:prstGeom prst="rect">
+            <a:avLst/>
+          </a:prstGeom>
+          <a:noFill/>
+          <a:extLst>
+            <a:ext uri="{909E8E84-426E-40DD-AFC4-6F175D3DCCD1}">
+              <a14:hiddenFill xmlns:a14="http://schemas.microsoft.com/office/drawing/2010/main">
+                <a:solidFill>
+                  <a:srgbClr val="FFFFFF"/>
+                </a:solidFill>
+              </a14:hiddenFill>
+            </a:ext>
+          </a:extLst>
+        </p:spPr>
+      </p:pic>
+      <p:pic>
+        <p:nvPicPr>
+          <p:cNvPr id="1036" name="Picture 12">
+            <a:extLst>
+              <a:ext uri="{FF2B5EF4-FFF2-40B4-BE49-F238E27FC236}">
+                <a16:creationId xmlns:a16="http://schemas.microsoft.com/office/drawing/2014/main" id="{C62F6F60-E473-EFF0-C116-3B22F4D5BB66}"/>
+              </a:ext>
+            </a:extLst>
+          </p:cNvPr>
+          <p:cNvPicPr>
+            <a:picLocks noChangeAspect="1" noChangeArrowheads="1"/>
+          </p:cNvPicPr>
+          <p:nvPr/>
+        </p:nvPicPr>
+        <p:blipFill>
+          <a:blip r:embed="rId9">
+            <a:extLst>
+              <a:ext uri="{28A0092B-C50C-407E-A947-70E740481C1C}">
+                <a14:useLocalDpi xmlns:a14="http://schemas.microsoft.com/office/drawing/2010/main" val="0"/>
+              </a:ext>
+            </a:extLst>
+          </a:blip>
+          <a:srcRect/>
+          <a:stretch>
+            <a:fillRect/>
+          </a:stretch>
+        </p:blipFill>
+        <p:spPr bwMode="auto">
+          <a:xfrm>
+            <a:off x="3363575" y="4512520"/>
+            <a:ext cx="1198289" cy="954918"/>
+          </a:xfrm>
+          <a:prstGeom prst="rect">
+            <a:avLst/>
+          </a:prstGeom>
+          <a:noFill/>
+          <a:extLst>
+            <a:ext uri="{909E8E84-426E-40DD-AFC4-6F175D3DCCD1}">
+              <a14:hiddenFill xmlns:a14="http://schemas.microsoft.com/office/drawing/2010/main">
+                <a:solidFill>
+                  <a:srgbClr val="FFFFFF"/>
+                </a:solidFill>
+              </a14:hiddenFill>
+            </a:ext>
+          </a:extLst>
+        </p:spPr>
+      </p:pic>
+      <p:pic>
+        <p:nvPicPr>
+          <p:cNvPr id="1038" name="Picture 14">
+            <a:extLst>
+              <a:ext uri="{FF2B5EF4-FFF2-40B4-BE49-F238E27FC236}">
+                <a16:creationId xmlns:a16="http://schemas.microsoft.com/office/drawing/2014/main" id="{5F9B5BCD-7C12-9535-73AF-4F5EFA51DBAD}"/>
+              </a:ext>
+            </a:extLst>
+          </p:cNvPr>
+          <p:cNvPicPr>
+            <a:picLocks noChangeAspect="1" noChangeArrowheads="1"/>
+          </p:cNvPicPr>
+          <p:nvPr/>
+        </p:nvPicPr>
+        <p:blipFill>
+          <a:blip r:embed="rId10">
+            <a:extLst>
+              <a:ext uri="{28A0092B-C50C-407E-A947-70E740481C1C}">
+                <a14:useLocalDpi xmlns:a14="http://schemas.microsoft.com/office/drawing/2010/main" val="0"/>
+              </a:ext>
+            </a:extLst>
+          </a:blip>
+          <a:srcRect/>
+          <a:stretch>
+            <a:fillRect/>
+          </a:stretch>
+        </p:blipFill>
+        <p:spPr bwMode="auto">
+          <a:xfrm>
+            <a:off x="1257985" y="4658326"/>
+            <a:ext cx="1087303" cy="1087303"/>
+          </a:xfrm>
+          <a:prstGeom prst="rect">
+            <a:avLst/>
+          </a:prstGeom>
+          <a:noFill/>
+          <a:extLst>
+            <a:ext uri="{909E8E84-426E-40DD-AFC4-6F175D3DCCD1}">
+              <a14:hiddenFill xmlns:a14="http://schemas.microsoft.com/office/drawing/2010/main">
+                <a:solidFill>
+                  <a:srgbClr val="FFFFFF"/>
+                </a:solidFill>
+              </a14:hiddenFill>
+            </a:ext>
+          </a:extLst>
+        </p:spPr>
+      </p:pic>
+      <p:pic>
+        <p:nvPicPr>
+          <p:cNvPr id="1040" name="Picture 16" descr="Mongodb, original, wordmark, logo Icon in Devicon">
+            <a:extLst>
+              <a:ext uri="{FF2B5EF4-FFF2-40B4-BE49-F238E27FC236}">
+                <a16:creationId xmlns:a16="http://schemas.microsoft.com/office/drawing/2014/main" id="{7104E597-978E-20A4-6B9E-8F116AB8721B}"/>
+              </a:ext>
+            </a:extLst>
+          </p:cNvPr>
+          <p:cNvPicPr>
+            <a:picLocks noChangeAspect="1" noChangeArrowheads="1"/>
+          </p:cNvPicPr>
+          <p:nvPr/>
+        </p:nvPicPr>
+        <p:blipFill>
+          <a:blip r:embed="rId11">
+            <a:extLst>
+              <a:ext uri="{28A0092B-C50C-407E-A947-70E740481C1C}">
+                <a14:useLocalDpi xmlns:a14="http://schemas.microsoft.com/office/drawing/2010/main" val="0"/>
+              </a:ext>
+            </a:extLst>
+          </a:blip>
+          <a:srcRect/>
+          <a:stretch>
+            <a:fillRect/>
+          </a:stretch>
+        </p:blipFill>
+        <p:spPr bwMode="auto">
+          <a:xfrm>
+            <a:off x="8494769" y="4654845"/>
+            <a:ext cx="1048645" cy="1048645"/>
+          </a:xfrm>
+          <a:prstGeom prst="rect">
+            <a:avLst/>
+          </a:prstGeom>
+          <a:noFill/>
+          <a:extLst>
+            <a:ext uri="{909E8E84-426E-40DD-AFC4-6F175D3DCCD1}">
+              <a14:hiddenFill xmlns:a14="http://schemas.microsoft.com/office/drawing/2010/main">
+                <a:solidFill>
+                  <a:srgbClr val="FFFFFF"/>
+                </a:solidFill>
+              </a14:hiddenFill>
+            </a:ext>
+          </a:extLst>
+        </p:spPr>
+      </p:pic>
+      <p:pic>
+        <p:nvPicPr>
+          <p:cNvPr id="1042" name="Picture 18">
+            <a:extLst>
+              <a:ext uri="{FF2B5EF4-FFF2-40B4-BE49-F238E27FC236}">
+                <a16:creationId xmlns:a16="http://schemas.microsoft.com/office/drawing/2014/main" id="{5DA38EB6-E57D-86DC-97E6-769214A9CA99}"/>
+              </a:ext>
+            </a:extLst>
+          </p:cNvPr>
+          <p:cNvPicPr>
+            <a:picLocks noChangeAspect="1" noChangeArrowheads="1"/>
+          </p:cNvPicPr>
+          <p:nvPr/>
+        </p:nvPicPr>
+        <p:blipFill>
+          <a:blip r:embed="rId12">
+            <a:extLst>
+              <a:ext uri="{28A0092B-C50C-407E-A947-70E740481C1C}">
+                <a14:useLocalDpi xmlns:a14="http://schemas.microsoft.com/office/drawing/2010/main" val="0"/>
+              </a:ext>
+            </a:extLst>
+          </a:blip>
+          <a:srcRect/>
+          <a:stretch>
+            <a:fillRect/>
+          </a:stretch>
+        </p:blipFill>
+        <p:spPr bwMode="auto">
+          <a:xfrm>
+            <a:off x="5781744" y="3369532"/>
+            <a:ext cx="2758849" cy="836554"/>
+          </a:xfrm>
+          <a:prstGeom prst="rect">
+            <a:avLst/>
+          </a:prstGeom>
+          <a:noFill/>
+          <a:extLst>
+            <a:ext uri="{909E8E84-426E-40DD-AFC4-6F175D3DCCD1}">
+              <a14:hiddenFill xmlns:a14="http://schemas.microsoft.com/office/drawing/2010/main">
+                <a:solidFill>
+                  <a:srgbClr val="FFFFFF"/>
+                </a:solidFill>
+              </a14:hiddenFill>
+            </a:ext>
+          </a:extLst>
+        </p:spPr>
+      </p:pic>
+      <p:pic>
+        <p:nvPicPr>
+          <p:cNvPr id="1044" name="Picture 20" descr="Node.js Logo PNG Vector (SVG) Free Download">
+            <a:extLst>
+              <a:ext uri="{FF2B5EF4-FFF2-40B4-BE49-F238E27FC236}">
+                <a16:creationId xmlns:a16="http://schemas.microsoft.com/office/drawing/2014/main" id="{550FDE04-3E34-3E54-A22C-E46D13DFE170}"/>
+              </a:ext>
+            </a:extLst>
+          </p:cNvPr>
+          <p:cNvPicPr>
+            <a:picLocks noChangeAspect="1" noChangeArrowheads="1"/>
+          </p:cNvPicPr>
+          <p:nvPr/>
+        </p:nvPicPr>
+        <p:blipFill>
+          <a:blip r:embed="rId13">
+            <a:extLst>
+              <a:ext uri="{28A0092B-C50C-407E-A947-70E740481C1C}">
+                <a14:useLocalDpi xmlns:a14="http://schemas.microsoft.com/office/drawing/2010/main" val="0"/>
+              </a:ext>
+            </a:extLst>
+          </a:blip>
+          <a:srcRect/>
+          <a:stretch>
+            <a:fillRect/>
+          </a:stretch>
+        </p:blipFill>
+        <p:spPr bwMode="auto">
+          <a:xfrm>
+            <a:off x="7495097" y="4654845"/>
+            <a:ext cx="923193" cy="1041195"/>
+          </a:xfrm>
+          <a:prstGeom prst="rect">
+            <a:avLst/>
+          </a:prstGeom>
+          <a:noFill/>
+          <a:extLst>
+            <a:ext uri="{909E8E84-426E-40DD-AFC4-6F175D3DCCD1}">
+              <a14:hiddenFill xmlns:a14="http://schemas.microsoft.com/office/drawing/2010/main">
+                <a:solidFill>
+                  <a:srgbClr val="FFFFFF"/>
+                </a:solidFill>
+              </a14:hiddenFill>
+            </a:ext>
+          </a:extLst>
+        </p:spPr>
+      </p:pic>
+      <p:pic>
+        <p:nvPicPr>
+          <p:cNvPr id="1046" name="Picture 22" descr="mongoose · GitHub Topics · GitHub">
+            <a:extLst>
+              <a:ext uri="{FF2B5EF4-FFF2-40B4-BE49-F238E27FC236}">
+                <a16:creationId xmlns:a16="http://schemas.microsoft.com/office/drawing/2014/main" id="{7D39BA74-077F-E786-4A51-9F4186AD76FE}"/>
+              </a:ext>
+            </a:extLst>
+          </p:cNvPr>
+          <p:cNvPicPr>
+            <a:picLocks noChangeAspect="1" noChangeArrowheads="1"/>
+          </p:cNvPicPr>
+          <p:nvPr/>
+        </p:nvPicPr>
+        <p:blipFill>
+          <a:blip r:embed="rId14">
+            <a:extLst>
+              <a:ext uri="{28A0092B-C50C-407E-A947-70E740481C1C}">
+                <a14:useLocalDpi xmlns:a14="http://schemas.microsoft.com/office/drawing/2010/main" val="0"/>
+              </a:ext>
+            </a:extLst>
+          </a:blip>
+          <a:srcRect/>
+          <a:stretch>
+            <a:fillRect/>
+          </a:stretch>
+        </p:blipFill>
+        <p:spPr bwMode="auto">
+          <a:xfrm>
+            <a:off x="9744269" y="4512520"/>
+            <a:ext cx="1233109" cy="1233109"/>
+          </a:xfrm>
+          <a:prstGeom prst="rect">
+            <a:avLst/>
+          </a:prstGeom>
+          <a:noFill/>
+          <a:extLst>
+            <a:ext uri="{909E8E84-426E-40DD-AFC4-6F175D3DCCD1}">
+              <a14:hiddenFill xmlns:a14="http://schemas.microsoft.com/office/drawing/2010/main">
+                <a:solidFill>
+                  <a:srgbClr val="FFFFFF"/>
+                </a:solidFill>
+              </a14:hiddenFill>
+            </a:ext>
+          </a:extLst>
+        </p:spPr>
+      </p:pic>
     </p:spTree>
     <p:extLst>
       <p:ext uri="{BB962C8B-B14F-4D97-AF65-F5344CB8AC3E}">

</xml_diff>

<commit_message>
got single record response for vehicle.
</commit_message>
<xml_diff>
--- a/Capstone3_CJK.pptx
+++ b/Capstone3_CJK.pptx
@@ -4,6 +4,9 @@
   <p:sldMasterIdLst>
     <p:sldMasterId id="2147483648" r:id="rId1"/>
   </p:sldMasterIdLst>
+  <p:notesMasterIdLst>
+    <p:notesMasterId r:id="rId11"/>
+  </p:notesMasterIdLst>
   <p:sldIdLst>
     <p:sldId id="259" r:id="rId2"/>
     <p:sldId id="260" r:id="rId3"/>
@@ -13,6 +16,7 @@
     <p:sldId id="256" r:id="rId7"/>
     <p:sldId id="257" r:id="rId8"/>
     <p:sldId id="264" r:id="rId9"/>
+    <p:sldId id="265" r:id="rId10"/>
   </p:sldIdLst>
   <p:sldSz cx="12192000" cy="6858000"/>
   <p:notesSz cx="6858000" cy="9144000"/>
@@ -124,6 +128,7 @@
             <p14:sldId id="256"/>
             <p14:sldId id="257"/>
             <p14:sldId id="264"/>
+            <p14:sldId id="265"/>
           </p14:sldIdLst>
         </p14:section>
       </p14:sectionLst>
@@ -5881,6 +5886,439 @@
 </dgm:styleDef>
 </file>
 
+<file path=ppt/notesMasters/notesMaster1.xml><?xml version="1.0" encoding="utf-8"?>
+<p:notesMaster xmlns:a="http://schemas.openxmlformats.org/drawingml/2006/main" xmlns:r="http://schemas.openxmlformats.org/officeDocument/2006/relationships" xmlns:p="http://schemas.openxmlformats.org/presentationml/2006/main">
+  <p:cSld>
+    <p:bg>
+      <p:bgRef idx="1001">
+        <a:schemeClr val="bg1"/>
+      </p:bgRef>
+    </p:bg>
+    <p:spTree>
+      <p:nvGrpSpPr>
+        <p:cNvPr id="1" name=""/>
+        <p:cNvGrpSpPr/>
+        <p:nvPr/>
+      </p:nvGrpSpPr>
+      <p:grpSpPr>
+        <a:xfrm>
+          <a:off x="0" y="0"/>
+          <a:ext cx="0" cy="0"/>
+          <a:chOff x="0" y="0"/>
+          <a:chExt cx="0" cy="0"/>
+        </a:xfrm>
+      </p:grpSpPr>
+      <p:sp>
+        <p:nvSpPr>
+          <p:cNvPr id="2" name="Header Placeholder 1"/>
+          <p:cNvSpPr>
+            <a:spLocks noGrp="1"/>
+          </p:cNvSpPr>
+          <p:nvPr>
+            <p:ph type="hdr" sz="quarter"/>
+          </p:nvPr>
+        </p:nvSpPr>
+        <p:spPr>
+          <a:xfrm>
+            <a:off x="0" y="0"/>
+            <a:ext cx="2971800" cy="458788"/>
+          </a:xfrm>
+          <a:prstGeom prst="rect">
+            <a:avLst/>
+          </a:prstGeom>
+        </p:spPr>
+        <p:txBody>
+          <a:bodyPr vert="horz" lIns="91440" tIns="45720" rIns="91440" bIns="45720" rtlCol="0"/>
+          <a:lstStyle>
+            <a:lvl1pPr algn="l">
+              <a:defRPr sz="1200"/>
+            </a:lvl1pPr>
+          </a:lstStyle>
+          <a:p>
+            <a:endParaRPr lang="en-US"/>
+          </a:p>
+        </p:txBody>
+      </p:sp>
+      <p:sp>
+        <p:nvSpPr>
+          <p:cNvPr id="3" name="Date Placeholder 2"/>
+          <p:cNvSpPr>
+            <a:spLocks noGrp="1"/>
+          </p:cNvSpPr>
+          <p:nvPr>
+            <p:ph type="dt" idx="1"/>
+          </p:nvPr>
+        </p:nvSpPr>
+        <p:spPr>
+          <a:xfrm>
+            <a:off x="3884613" y="0"/>
+            <a:ext cx="2971800" cy="458788"/>
+          </a:xfrm>
+          <a:prstGeom prst="rect">
+            <a:avLst/>
+          </a:prstGeom>
+        </p:spPr>
+        <p:txBody>
+          <a:bodyPr vert="horz" lIns="91440" tIns="45720" rIns="91440" bIns="45720" rtlCol="0"/>
+          <a:lstStyle>
+            <a:lvl1pPr algn="r">
+              <a:defRPr sz="1200"/>
+            </a:lvl1pPr>
+          </a:lstStyle>
+          <a:p>
+            <a:fld id="{8418364D-2D75-47C5-80C2-90F31B92226A}" type="datetimeFigureOut">
+              <a:rPr lang="en-US" smtClean="0"/>
+              <a:t>8/25/2023</a:t>
+            </a:fld>
+            <a:endParaRPr lang="en-US"/>
+          </a:p>
+        </p:txBody>
+      </p:sp>
+      <p:sp>
+        <p:nvSpPr>
+          <p:cNvPr id="4" name="Slide Image Placeholder 3"/>
+          <p:cNvSpPr>
+            <a:spLocks noGrp="1" noRot="1" noChangeAspect="1"/>
+          </p:cNvSpPr>
+          <p:nvPr>
+            <p:ph type="sldImg" idx="2"/>
+          </p:nvPr>
+        </p:nvSpPr>
+        <p:spPr>
+          <a:xfrm>
+            <a:off x="685800" y="1143000"/>
+            <a:ext cx="5486400" cy="3086100"/>
+          </a:xfrm>
+          <a:prstGeom prst="rect">
+            <a:avLst/>
+          </a:prstGeom>
+          <a:noFill/>
+          <a:ln w="12700">
+            <a:solidFill>
+              <a:prstClr val="black"/>
+            </a:solidFill>
+          </a:ln>
+        </p:spPr>
+        <p:txBody>
+          <a:bodyPr vert="horz" lIns="91440" tIns="45720" rIns="91440" bIns="45720" rtlCol="0" anchor="ctr"/>
+          <a:lstStyle/>
+          <a:p>
+            <a:endParaRPr lang="en-US"/>
+          </a:p>
+        </p:txBody>
+      </p:sp>
+      <p:sp>
+        <p:nvSpPr>
+          <p:cNvPr id="5" name="Notes Placeholder 4"/>
+          <p:cNvSpPr>
+            <a:spLocks noGrp="1"/>
+          </p:cNvSpPr>
+          <p:nvPr>
+            <p:ph type="body" sz="quarter" idx="3"/>
+          </p:nvPr>
+        </p:nvSpPr>
+        <p:spPr>
+          <a:xfrm>
+            <a:off x="685800" y="4400550"/>
+            <a:ext cx="5486400" cy="3600450"/>
+          </a:xfrm>
+          <a:prstGeom prst="rect">
+            <a:avLst/>
+          </a:prstGeom>
+        </p:spPr>
+        <p:txBody>
+          <a:bodyPr vert="horz" lIns="91440" tIns="45720" rIns="91440" bIns="45720" rtlCol="0"/>
+          <a:lstStyle/>
+          <a:p>
+            <a:pPr lvl="0"/>
+            <a:r>
+              <a:rPr lang="en-US"/>
+              <a:t>Click to edit Master text styles</a:t>
+            </a:r>
+          </a:p>
+          <a:p>
+            <a:pPr lvl="1"/>
+            <a:r>
+              <a:rPr lang="en-US"/>
+              <a:t>Second level</a:t>
+            </a:r>
+          </a:p>
+          <a:p>
+            <a:pPr lvl="2"/>
+            <a:r>
+              <a:rPr lang="en-US"/>
+              <a:t>Third level</a:t>
+            </a:r>
+          </a:p>
+          <a:p>
+            <a:pPr lvl="3"/>
+            <a:r>
+              <a:rPr lang="en-US"/>
+              <a:t>Fourth level</a:t>
+            </a:r>
+          </a:p>
+          <a:p>
+            <a:pPr lvl="4"/>
+            <a:r>
+              <a:rPr lang="en-US"/>
+              <a:t>Fifth level</a:t>
+            </a:r>
+          </a:p>
+        </p:txBody>
+      </p:sp>
+      <p:sp>
+        <p:nvSpPr>
+          <p:cNvPr id="6" name="Footer Placeholder 5"/>
+          <p:cNvSpPr>
+            <a:spLocks noGrp="1"/>
+          </p:cNvSpPr>
+          <p:nvPr>
+            <p:ph type="ftr" sz="quarter" idx="4"/>
+          </p:nvPr>
+        </p:nvSpPr>
+        <p:spPr>
+          <a:xfrm>
+            <a:off x="0" y="8685213"/>
+            <a:ext cx="2971800" cy="458787"/>
+          </a:xfrm>
+          <a:prstGeom prst="rect">
+            <a:avLst/>
+          </a:prstGeom>
+        </p:spPr>
+        <p:txBody>
+          <a:bodyPr vert="horz" lIns="91440" tIns="45720" rIns="91440" bIns="45720" rtlCol="0" anchor="b"/>
+          <a:lstStyle>
+            <a:lvl1pPr algn="l">
+              <a:defRPr sz="1200"/>
+            </a:lvl1pPr>
+          </a:lstStyle>
+          <a:p>
+            <a:endParaRPr lang="en-US"/>
+          </a:p>
+        </p:txBody>
+      </p:sp>
+      <p:sp>
+        <p:nvSpPr>
+          <p:cNvPr id="7" name="Slide Number Placeholder 6"/>
+          <p:cNvSpPr>
+            <a:spLocks noGrp="1"/>
+          </p:cNvSpPr>
+          <p:nvPr>
+            <p:ph type="sldNum" sz="quarter" idx="5"/>
+          </p:nvPr>
+        </p:nvSpPr>
+        <p:spPr>
+          <a:xfrm>
+            <a:off x="3884613" y="8685213"/>
+            <a:ext cx="2971800" cy="458787"/>
+          </a:xfrm>
+          <a:prstGeom prst="rect">
+            <a:avLst/>
+          </a:prstGeom>
+        </p:spPr>
+        <p:txBody>
+          <a:bodyPr vert="horz" lIns="91440" tIns="45720" rIns="91440" bIns="45720" rtlCol="0" anchor="b"/>
+          <a:lstStyle>
+            <a:lvl1pPr algn="r">
+              <a:defRPr sz="1200"/>
+            </a:lvl1pPr>
+          </a:lstStyle>
+          <a:p>
+            <a:fld id="{914556D5-6B52-4582-8BBE-AD7D33DC4150}" type="slidenum">
+              <a:rPr lang="en-US" smtClean="0"/>
+              <a:t>‹#›</a:t>
+            </a:fld>
+            <a:endParaRPr lang="en-US"/>
+          </a:p>
+        </p:txBody>
+      </p:sp>
+    </p:spTree>
+    <p:extLst>
+      <p:ext uri="{BB962C8B-B14F-4D97-AF65-F5344CB8AC3E}">
+        <p14:creationId xmlns:p14="http://schemas.microsoft.com/office/powerpoint/2010/main" val="4102991554"/>
+      </p:ext>
+    </p:extLst>
+  </p:cSld>
+  <p:clrMap bg1="lt1" tx1="dk1" bg2="lt2" tx2="dk2" accent1="accent1" accent2="accent2" accent3="accent3" accent4="accent4" accent5="accent5" accent6="accent6" hlink="hlink" folHlink="folHlink"/>
+  <p:notesStyle>
+    <a:lvl1pPr marL="0" algn="l" defTabSz="914400" rtl="0" eaLnBrk="1" latinLnBrk="0" hangingPunct="1">
+      <a:defRPr sz="1200" kern="1200">
+        <a:solidFill>
+          <a:schemeClr val="tx1"/>
+        </a:solidFill>
+        <a:latin typeface="+mn-lt"/>
+        <a:ea typeface="+mn-ea"/>
+        <a:cs typeface="+mn-cs"/>
+      </a:defRPr>
+    </a:lvl1pPr>
+    <a:lvl2pPr marL="457200" algn="l" defTabSz="914400" rtl="0" eaLnBrk="1" latinLnBrk="0" hangingPunct="1">
+      <a:defRPr sz="1200" kern="1200">
+        <a:solidFill>
+          <a:schemeClr val="tx1"/>
+        </a:solidFill>
+        <a:latin typeface="+mn-lt"/>
+        <a:ea typeface="+mn-ea"/>
+        <a:cs typeface="+mn-cs"/>
+      </a:defRPr>
+    </a:lvl2pPr>
+    <a:lvl3pPr marL="914400" algn="l" defTabSz="914400" rtl="0" eaLnBrk="1" latinLnBrk="0" hangingPunct="1">
+      <a:defRPr sz="1200" kern="1200">
+        <a:solidFill>
+          <a:schemeClr val="tx1"/>
+        </a:solidFill>
+        <a:latin typeface="+mn-lt"/>
+        <a:ea typeface="+mn-ea"/>
+        <a:cs typeface="+mn-cs"/>
+      </a:defRPr>
+    </a:lvl3pPr>
+    <a:lvl4pPr marL="1371600" algn="l" defTabSz="914400" rtl="0" eaLnBrk="1" latinLnBrk="0" hangingPunct="1">
+      <a:defRPr sz="1200" kern="1200">
+        <a:solidFill>
+          <a:schemeClr val="tx1"/>
+        </a:solidFill>
+        <a:latin typeface="+mn-lt"/>
+        <a:ea typeface="+mn-ea"/>
+        <a:cs typeface="+mn-cs"/>
+      </a:defRPr>
+    </a:lvl4pPr>
+    <a:lvl5pPr marL="1828800" algn="l" defTabSz="914400" rtl="0" eaLnBrk="1" latinLnBrk="0" hangingPunct="1">
+      <a:defRPr sz="1200" kern="1200">
+        <a:solidFill>
+          <a:schemeClr val="tx1"/>
+        </a:solidFill>
+        <a:latin typeface="+mn-lt"/>
+        <a:ea typeface="+mn-ea"/>
+        <a:cs typeface="+mn-cs"/>
+      </a:defRPr>
+    </a:lvl5pPr>
+    <a:lvl6pPr marL="2286000" algn="l" defTabSz="914400" rtl="0" eaLnBrk="1" latinLnBrk="0" hangingPunct="1">
+      <a:defRPr sz="1200" kern="1200">
+        <a:solidFill>
+          <a:schemeClr val="tx1"/>
+        </a:solidFill>
+        <a:latin typeface="+mn-lt"/>
+        <a:ea typeface="+mn-ea"/>
+        <a:cs typeface="+mn-cs"/>
+      </a:defRPr>
+    </a:lvl6pPr>
+    <a:lvl7pPr marL="2743200" algn="l" defTabSz="914400" rtl="0" eaLnBrk="1" latinLnBrk="0" hangingPunct="1">
+      <a:defRPr sz="1200" kern="1200">
+        <a:solidFill>
+          <a:schemeClr val="tx1"/>
+        </a:solidFill>
+        <a:latin typeface="+mn-lt"/>
+        <a:ea typeface="+mn-ea"/>
+        <a:cs typeface="+mn-cs"/>
+      </a:defRPr>
+    </a:lvl7pPr>
+    <a:lvl8pPr marL="3200400" algn="l" defTabSz="914400" rtl="0" eaLnBrk="1" latinLnBrk="0" hangingPunct="1">
+      <a:defRPr sz="1200" kern="1200">
+        <a:solidFill>
+          <a:schemeClr val="tx1"/>
+        </a:solidFill>
+        <a:latin typeface="+mn-lt"/>
+        <a:ea typeface="+mn-ea"/>
+        <a:cs typeface="+mn-cs"/>
+      </a:defRPr>
+    </a:lvl8pPr>
+    <a:lvl9pPr marL="3657600" algn="l" defTabSz="914400" rtl="0" eaLnBrk="1" latinLnBrk="0" hangingPunct="1">
+      <a:defRPr sz="1200" kern="1200">
+        <a:solidFill>
+          <a:schemeClr val="tx1"/>
+        </a:solidFill>
+        <a:latin typeface="+mn-lt"/>
+        <a:ea typeface="+mn-ea"/>
+        <a:cs typeface="+mn-cs"/>
+      </a:defRPr>
+    </a:lvl9pPr>
+  </p:notesStyle>
+</p:notesMaster>
+</file>
+
+<file path=ppt/notesSlides/notesSlide1.xml><?xml version="1.0" encoding="utf-8"?>
+<p:notes xmlns:a="http://schemas.openxmlformats.org/drawingml/2006/main" xmlns:r="http://schemas.openxmlformats.org/officeDocument/2006/relationships" xmlns:p="http://schemas.openxmlformats.org/presentationml/2006/main">
+  <p:cSld>
+    <p:spTree>
+      <p:nvGrpSpPr>
+        <p:cNvPr id="1" name=""/>
+        <p:cNvGrpSpPr/>
+        <p:nvPr/>
+      </p:nvGrpSpPr>
+      <p:grpSpPr>
+        <a:xfrm>
+          <a:off x="0" y="0"/>
+          <a:ext cx="0" cy="0"/>
+          <a:chOff x="0" y="0"/>
+          <a:chExt cx="0" cy="0"/>
+        </a:xfrm>
+      </p:grpSpPr>
+      <p:sp>
+        <p:nvSpPr>
+          <p:cNvPr id="2" name="Slide Image Placeholder 1"/>
+          <p:cNvSpPr>
+            <a:spLocks noGrp="1" noRot="1" noChangeAspect="1"/>
+          </p:cNvSpPr>
+          <p:nvPr>
+            <p:ph type="sldImg"/>
+          </p:nvPr>
+        </p:nvSpPr>
+        <p:spPr/>
+      </p:sp>
+      <p:sp>
+        <p:nvSpPr>
+          <p:cNvPr id="3" name="Notes Placeholder 2"/>
+          <p:cNvSpPr>
+            <a:spLocks noGrp="1"/>
+          </p:cNvSpPr>
+          <p:nvPr>
+            <p:ph type="body" idx="1"/>
+          </p:nvPr>
+        </p:nvSpPr>
+        <p:spPr/>
+        <p:txBody>
+          <a:bodyPr/>
+          <a:lstStyle/>
+          <a:p>
+            <a:endParaRPr lang="en-US" dirty="0"/>
+          </a:p>
+        </p:txBody>
+      </p:sp>
+      <p:sp>
+        <p:nvSpPr>
+          <p:cNvPr id="4" name="Slide Number Placeholder 3"/>
+          <p:cNvSpPr>
+            <a:spLocks noGrp="1"/>
+          </p:cNvSpPr>
+          <p:nvPr>
+            <p:ph type="sldNum" sz="quarter" idx="5"/>
+          </p:nvPr>
+        </p:nvSpPr>
+        <p:spPr/>
+        <p:txBody>
+          <a:bodyPr/>
+          <a:lstStyle/>
+          <a:p>
+            <a:fld id="{914556D5-6B52-4582-8BBE-AD7D33DC4150}" type="slidenum">
+              <a:rPr lang="en-US" smtClean="0"/>
+              <a:t>9</a:t>
+            </a:fld>
+            <a:endParaRPr lang="en-US"/>
+          </a:p>
+        </p:txBody>
+      </p:sp>
+    </p:spTree>
+    <p:extLst>
+      <p:ext uri="{BB962C8B-B14F-4D97-AF65-F5344CB8AC3E}">
+        <p14:creationId xmlns:p14="http://schemas.microsoft.com/office/powerpoint/2010/main" val="2277760605"/>
+      </p:ext>
+    </p:extLst>
+  </p:cSld>
+  <p:clrMapOvr>
+    <a:masterClrMapping/>
+  </p:clrMapOvr>
+</p:notes>
+</file>
+
 <file path=ppt/slideLayouts/slideLayout1.xml><?xml version="1.0" encoding="utf-8"?>
 <p:sldLayout xmlns:a="http://schemas.openxmlformats.org/drawingml/2006/main" xmlns:r="http://schemas.openxmlformats.org/officeDocument/2006/relationships" xmlns:p="http://schemas.openxmlformats.org/presentationml/2006/main" type="title" preserve="1">
   <p:cSld name="Title Slide">
@@ -6028,7 +6466,7 @@
           <a:p>
             <a:fld id="{8E1B361F-AF8B-8048-AD58-40D4EF99588B}" type="datetimeFigureOut">
               <a:rPr lang="en-US" smtClean="0"/>
-              <a:t>8/24/2023</a:t>
+              <a:t>8/25/2023</a:t>
             </a:fld>
             <a:endParaRPr lang="en-US"/>
           </a:p>
@@ -6226,7 +6664,7 @@
           <a:p>
             <a:fld id="{8E1B361F-AF8B-8048-AD58-40D4EF99588B}" type="datetimeFigureOut">
               <a:rPr lang="en-US" smtClean="0"/>
-              <a:t>8/24/2023</a:t>
+              <a:t>8/25/2023</a:t>
             </a:fld>
             <a:endParaRPr lang="en-US"/>
           </a:p>
@@ -6434,7 +6872,7 @@
           <a:p>
             <a:fld id="{8E1B361F-AF8B-8048-AD58-40D4EF99588B}" type="datetimeFigureOut">
               <a:rPr lang="en-US" smtClean="0"/>
-              <a:t>8/24/2023</a:t>
+              <a:t>8/25/2023</a:t>
             </a:fld>
             <a:endParaRPr lang="en-US"/>
           </a:p>
@@ -6632,7 +7070,7 @@
           <a:p>
             <a:fld id="{8E1B361F-AF8B-8048-AD58-40D4EF99588B}" type="datetimeFigureOut">
               <a:rPr lang="en-US" smtClean="0"/>
-              <a:t>8/24/2023</a:t>
+              <a:t>8/25/2023</a:t>
             </a:fld>
             <a:endParaRPr lang="en-US"/>
           </a:p>
@@ -6907,7 +7345,7 @@
           <a:p>
             <a:fld id="{8E1B361F-AF8B-8048-AD58-40D4EF99588B}" type="datetimeFigureOut">
               <a:rPr lang="en-US" smtClean="0"/>
-              <a:t>8/24/2023</a:t>
+              <a:t>8/25/2023</a:t>
             </a:fld>
             <a:endParaRPr lang="en-US"/>
           </a:p>
@@ -7172,7 +7610,7 @@
           <a:p>
             <a:fld id="{8E1B361F-AF8B-8048-AD58-40D4EF99588B}" type="datetimeFigureOut">
               <a:rPr lang="en-US" smtClean="0"/>
-              <a:t>8/24/2023</a:t>
+              <a:t>8/25/2023</a:t>
             </a:fld>
             <a:endParaRPr lang="en-US"/>
           </a:p>
@@ -7584,7 +8022,7 @@
           <a:p>
             <a:fld id="{8E1B361F-AF8B-8048-AD58-40D4EF99588B}" type="datetimeFigureOut">
               <a:rPr lang="en-US" smtClean="0"/>
-              <a:t>8/24/2023</a:t>
+              <a:t>8/25/2023</a:t>
             </a:fld>
             <a:endParaRPr lang="en-US"/>
           </a:p>
@@ -7725,7 +8163,7 @@
           <a:p>
             <a:fld id="{8E1B361F-AF8B-8048-AD58-40D4EF99588B}" type="datetimeFigureOut">
               <a:rPr lang="en-US" smtClean="0"/>
-              <a:t>8/24/2023</a:t>
+              <a:t>8/25/2023</a:t>
             </a:fld>
             <a:endParaRPr lang="en-US"/>
           </a:p>
@@ -7838,7 +8276,7 @@
           <a:p>
             <a:fld id="{8E1B361F-AF8B-8048-AD58-40D4EF99588B}" type="datetimeFigureOut">
               <a:rPr lang="en-US" smtClean="0"/>
-              <a:t>8/24/2023</a:t>
+              <a:t>8/25/2023</a:t>
             </a:fld>
             <a:endParaRPr lang="en-US"/>
           </a:p>
@@ -8149,7 +8587,7 @@
           <a:p>
             <a:fld id="{8E1B361F-AF8B-8048-AD58-40D4EF99588B}" type="datetimeFigureOut">
               <a:rPr lang="en-US" smtClean="0"/>
-              <a:t>8/24/2023</a:t>
+              <a:t>8/25/2023</a:t>
             </a:fld>
             <a:endParaRPr lang="en-US"/>
           </a:p>
@@ -8437,7 +8875,7 @@
           <a:p>
             <a:fld id="{8E1B361F-AF8B-8048-AD58-40D4EF99588B}" type="datetimeFigureOut">
               <a:rPr lang="en-US" smtClean="0"/>
-              <a:t>8/24/2023</a:t>
+              <a:t>8/25/2023</a:t>
             </a:fld>
             <a:endParaRPr lang="en-US"/>
           </a:p>
@@ -8678,7 +9116,7 @@
           <a:p>
             <a:fld id="{8E1B361F-AF8B-8048-AD58-40D4EF99588B}" type="datetimeFigureOut">
               <a:rPr lang="en-US" smtClean="0"/>
-              <a:t>8/24/2023</a:t>
+              <a:t>8/25/2023</a:t>
             </a:fld>
             <a:endParaRPr lang="en-US"/>
           </a:p>
@@ -12601,6 +13039,662 @@
 </p:sld>
 </file>
 
+<file path=ppt/slides/slide9.xml><?xml version="1.0" encoding="utf-8"?>
+<p:sld xmlns:a="http://schemas.openxmlformats.org/drawingml/2006/main" xmlns:r="http://schemas.openxmlformats.org/officeDocument/2006/relationships" xmlns:p="http://schemas.openxmlformats.org/presentationml/2006/main">
+  <p:cSld>
+    <p:spTree>
+      <p:nvGrpSpPr>
+        <p:cNvPr id="1" name=""/>
+        <p:cNvGrpSpPr/>
+        <p:nvPr/>
+      </p:nvGrpSpPr>
+      <p:grpSpPr>
+        <a:xfrm>
+          <a:off x="0" y="0"/>
+          <a:ext cx="0" cy="0"/>
+          <a:chOff x="0" y="0"/>
+          <a:chExt cx="0" cy="0"/>
+        </a:xfrm>
+      </p:grpSpPr>
+      <p:sp>
+        <p:nvSpPr>
+          <p:cNvPr id="17" name="Rectangle 16">
+            <a:extLst>
+              <a:ext uri="{FF2B5EF4-FFF2-40B4-BE49-F238E27FC236}">
+                <a16:creationId xmlns:a16="http://schemas.microsoft.com/office/drawing/2014/main" id="{4B14899B-4AE4-D583-40E2-253AE557B774}"/>
+              </a:ext>
+            </a:extLst>
+          </p:cNvPr>
+          <p:cNvSpPr/>
+          <p:nvPr/>
+        </p:nvSpPr>
+        <p:spPr>
+          <a:xfrm>
+            <a:off x="3004457" y="163285"/>
+            <a:ext cx="7173686" cy="6531430"/>
+          </a:xfrm>
+          <a:prstGeom prst="rect">
+            <a:avLst/>
+          </a:prstGeom>
+          <a:solidFill>
+            <a:schemeClr val="accent4">
+              <a:lumMod val="60000"/>
+              <a:lumOff val="40000"/>
+            </a:schemeClr>
+          </a:solidFill>
+        </p:spPr>
+        <p:style>
+          <a:lnRef idx="2">
+            <a:schemeClr val="accent1">
+              <a:shade val="15000"/>
+            </a:schemeClr>
+          </a:lnRef>
+          <a:fillRef idx="1">
+            <a:schemeClr val="accent1"/>
+          </a:fillRef>
+          <a:effectRef idx="0">
+            <a:schemeClr val="accent1"/>
+          </a:effectRef>
+          <a:fontRef idx="minor">
+            <a:schemeClr val="lt1"/>
+          </a:fontRef>
+        </p:style>
+        <p:txBody>
+          <a:bodyPr rtlCol="0" anchor="ctr"/>
+          <a:lstStyle/>
+          <a:p>
+            <a:pPr algn="ctr"/>
+            <a:endParaRPr lang="en-US" dirty="0"/>
+          </a:p>
+        </p:txBody>
+      </p:sp>
+      <p:sp>
+        <p:nvSpPr>
+          <p:cNvPr id="5" name="Rectangle 4">
+            <a:extLst>
+              <a:ext uri="{FF2B5EF4-FFF2-40B4-BE49-F238E27FC236}">
+                <a16:creationId xmlns:a16="http://schemas.microsoft.com/office/drawing/2014/main" id="{79875C78-E69B-D6EE-9FAD-29CB8952770E}"/>
+              </a:ext>
+            </a:extLst>
+          </p:cNvPr>
+          <p:cNvSpPr/>
+          <p:nvPr/>
+        </p:nvSpPr>
+        <p:spPr>
+          <a:xfrm>
+            <a:off x="283029" y="163285"/>
+            <a:ext cx="2449285" cy="6291943"/>
+          </a:xfrm>
+          <a:prstGeom prst="rect">
+            <a:avLst/>
+          </a:prstGeom>
+        </p:spPr>
+        <p:style>
+          <a:lnRef idx="2">
+            <a:schemeClr val="accent1">
+              <a:shade val="15000"/>
+            </a:schemeClr>
+          </a:lnRef>
+          <a:fillRef idx="1">
+            <a:schemeClr val="accent1"/>
+          </a:fillRef>
+          <a:effectRef idx="0">
+            <a:schemeClr val="accent1"/>
+          </a:effectRef>
+          <a:fontRef idx="minor">
+            <a:schemeClr val="lt1"/>
+          </a:fontRef>
+        </p:style>
+        <p:txBody>
+          <a:bodyPr rtlCol="0" anchor="ctr"/>
+          <a:lstStyle/>
+          <a:p>
+            <a:pPr algn="ctr"/>
+            <a:r>
+              <a:rPr lang="en-US" dirty="0"/>
+              <a:t>Filters</a:t>
+            </a:r>
+          </a:p>
+          <a:p>
+            <a:pPr algn="ctr"/>
+            <a:br>
+              <a:rPr lang="en-US" dirty="0"/>
+            </a:br>
+            <a:r>
+              <a:rPr lang="en-US" dirty="0"/>
+              <a:t>make</a:t>
+            </a:r>
+            <a:br>
+              <a:rPr lang="en-US" dirty="0"/>
+            </a:br>
+            <a:r>
+              <a:rPr lang="en-US" dirty="0"/>
+              <a:t>model</a:t>
+            </a:r>
+          </a:p>
+          <a:p>
+            <a:pPr algn="ctr"/>
+            <a:r>
+              <a:rPr lang="en-US" dirty="0"/>
+              <a:t>year</a:t>
+            </a:r>
+          </a:p>
+          <a:p>
+            <a:pPr algn="ctr"/>
+            <a:r>
+              <a:rPr lang="en-US" dirty="0"/>
+              <a:t>Mileage</a:t>
+            </a:r>
+          </a:p>
+          <a:p>
+            <a:pPr algn="ctr"/>
+            <a:r>
+              <a:rPr lang="en-US" dirty="0"/>
+              <a:t>price</a:t>
+            </a:r>
+          </a:p>
+          <a:p>
+            <a:pPr algn="ctr"/>
+            <a:endParaRPr lang="en-US" dirty="0"/>
+          </a:p>
+        </p:txBody>
+      </p:sp>
+      <p:sp>
+        <p:nvSpPr>
+          <p:cNvPr id="6" name="Rectangle 5">
+            <a:extLst>
+              <a:ext uri="{FF2B5EF4-FFF2-40B4-BE49-F238E27FC236}">
+                <a16:creationId xmlns:a16="http://schemas.microsoft.com/office/drawing/2014/main" id="{6CE48759-9931-EEB7-C1FF-FC530709E99C}"/>
+              </a:ext>
+            </a:extLst>
+          </p:cNvPr>
+          <p:cNvSpPr/>
+          <p:nvPr/>
+        </p:nvSpPr>
+        <p:spPr>
+          <a:xfrm>
+            <a:off x="3271156" y="163285"/>
+            <a:ext cx="1807029" cy="1240971"/>
+          </a:xfrm>
+          <a:prstGeom prst="rect">
+            <a:avLst/>
+          </a:prstGeom>
+          <a:solidFill>
+            <a:schemeClr val="accent2"/>
+          </a:solidFill>
+        </p:spPr>
+        <p:style>
+          <a:lnRef idx="2">
+            <a:schemeClr val="accent1">
+              <a:shade val="15000"/>
+            </a:schemeClr>
+          </a:lnRef>
+          <a:fillRef idx="1">
+            <a:schemeClr val="accent1"/>
+          </a:fillRef>
+          <a:effectRef idx="0">
+            <a:schemeClr val="accent1"/>
+          </a:effectRef>
+          <a:fontRef idx="minor">
+            <a:schemeClr val="lt1"/>
+          </a:fontRef>
+        </p:style>
+        <p:txBody>
+          <a:bodyPr rtlCol="0" anchor="ctr"/>
+          <a:lstStyle/>
+          <a:p>
+            <a:pPr algn="ctr"/>
+            <a:r>
+              <a:rPr lang="en-US" dirty="0"/>
+              <a:t>Car Component</a:t>
+            </a:r>
+          </a:p>
+        </p:txBody>
+      </p:sp>
+      <p:sp>
+        <p:nvSpPr>
+          <p:cNvPr id="7" name="Rectangle 6">
+            <a:extLst>
+              <a:ext uri="{FF2B5EF4-FFF2-40B4-BE49-F238E27FC236}">
+                <a16:creationId xmlns:a16="http://schemas.microsoft.com/office/drawing/2014/main" id="{45CB8103-B658-5DFA-D4B3-BD1D2AB49CF9}"/>
+              </a:ext>
+            </a:extLst>
+          </p:cNvPr>
+          <p:cNvSpPr/>
+          <p:nvPr/>
+        </p:nvSpPr>
+        <p:spPr>
+          <a:xfrm>
+            <a:off x="5617027" y="163285"/>
+            <a:ext cx="1807029" cy="1240971"/>
+          </a:xfrm>
+          <a:prstGeom prst="rect">
+            <a:avLst/>
+          </a:prstGeom>
+          <a:solidFill>
+            <a:schemeClr val="accent2"/>
+          </a:solidFill>
+        </p:spPr>
+        <p:style>
+          <a:lnRef idx="2">
+            <a:schemeClr val="accent1">
+              <a:shade val="15000"/>
+            </a:schemeClr>
+          </a:lnRef>
+          <a:fillRef idx="1">
+            <a:schemeClr val="accent1"/>
+          </a:fillRef>
+          <a:effectRef idx="0">
+            <a:schemeClr val="accent1"/>
+          </a:effectRef>
+          <a:fontRef idx="minor">
+            <a:schemeClr val="lt1"/>
+          </a:fontRef>
+        </p:style>
+        <p:txBody>
+          <a:bodyPr rtlCol="0" anchor="ctr"/>
+          <a:lstStyle/>
+          <a:p>
+            <a:pPr algn="ctr"/>
+            <a:r>
+              <a:rPr lang="en-US" dirty="0"/>
+              <a:t>Car Component</a:t>
+            </a:r>
+          </a:p>
+        </p:txBody>
+      </p:sp>
+      <p:sp>
+        <p:nvSpPr>
+          <p:cNvPr id="8" name="Rectangle 7">
+            <a:extLst>
+              <a:ext uri="{FF2B5EF4-FFF2-40B4-BE49-F238E27FC236}">
+                <a16:creationId xmlns:a16="http://schemas.microsoft.com/office/drawing/2014/main" id="{102A67EF-FA44-9603-9385-E8B4A882F5C2}"/>
+              </a:ext>
+            </a:extLst>
+          </p:cNvPr>
+          <p:cNvSpPr/>
+          <p:nvPr/>
+        </p:nvSpPr>
+        <p:spPr>
+          <a:xfrm>
+            <a:off x="7962898" y="163285"/>
+            <a:ext cx="1807029" cy="1240971"/>
+          </a:xfrm>
+          <a:prstGeom prst="rect">
+            <a:avLst/>
+          </a:prstGeom>
+          <a:solidFill>
+            <a:schemeClr val="accent2"/>
+          </a:solidFill>
+        </p:spPr>
+        <p:style>
+          <a:lnRef idx="2">
+            <a:schemeClr val="accent1">
+              <a:shade val="15000"/>
+            </a:schemeClr>
+          </a:lnRef>
+          <a:fillRef idx="1">
+            <a:schemeClr val="accent1"/>
+          </a:fillRef>
+          <a:effectRef idx="0">
+            <a:schemeClr val="accent1"/>
+          </a:effectRef>
+          <a:fontRef idx="minor">
+            <a:schemeClr val="lt1"/>
+          </a:fontRef>
+        </p:style>
+        <p:txBody>
+          <a:bodyPr rtlCol="0" anchor="ctr"/>
+          <a:lstStyle/>
+          <a:p>
+            <a:pPr algn="ctr"/>
+            <a:r>
+              <a:rPr lang="en-US" dirty="0"/>
+              <a:t>Car Component</a:t>
+            </a:r>
+          </a:p>
+        </p:txBody>
+      </p:sp>
+      <p:sp>
+        <p:nvSpPr>
+          <p:cNvPr id="9" name="Rectangle 8">
+            <a:extLst>
+              <a:ext uri="{FF2B5EF4-FFF2-40B4-BE49-F238E27FC236}">
+                <a16:creationId xmlns:a16="http://schemas.microsoft.com/office/drawing/2014/main" id="{ED515557-C263-9720-C52B-E98604E71EB2}"/>
+              </a:ext>
+            </a:extLst>
+          </p:cNvPr>
+          <p:cNvSpPr/>
+          <p:nvPr/>
+        </p:nvSpPr>
+        <p:spPr>
+          <a:xfrm>
+            <a:off x="3271156" y="1861456"/>
+            <a:ext cx="1807029" cy="1328058"/>
+          </a:xfrm>
+          <a:prstGeom prst="rect">
+            <a:avLst/>
+          </a:prstGeom>
+          <a:solidFill>
+            <a:schemeClr val="accent2"/>
+          </a:solidFill>
+        </p:spPr>
+        <p:style>
+          <a:lnRef idx="2">
+            <a:schemeClr val="accent1">
+              <a:shade val="15000"/>
+            </a:schemeClr>
+          </a:lnRef>
+          <a:fillRef idx="1">
+            <a:schemeClr val="accent1"/>
+          </a:fillRef>
+          <a:effectRef idx="0">
+            <a:schemeClr val="accent1"/>
+          </a:effectRef>
+          <a:fontRef idx="minor">
+            <a:schemeClr val="lt1"/>
+          </a:fontRef>
+        </p:style>
+        <p:txBody>
+          <a:bodyPr rtlCol="0" anchor="ctr"/>
+          <a:lstStyle/>
+          <a:p>
+            <a:pPr algn="ctr"/>
+            <a:r>
+              <a:rPr lang="en-US" dirty="0"/>
+              <a:t>Car Component</a:t>
+            </a:r>
+          </a:p>
+        </p:txBody>
+      </p:sp>
+      <p:sp>
+        <p:nvSpPr>
+          <p:cNvPr id="10" name="Rectangle 9">
+            <a:extLst>
+              <a:ext uri="{FF2B5EF4-FFF2-40B4-BE49-F238E27FC236}">
+                <a16:creationId xmlns:a16="http://schemas.microsoft.com/office/drawing/2014/main" id="{DABDB437-D5AA-9367-764E-1FF9D059956F}"/>
+              </a:ext>
+            </a:extLst>
+          </p:cNvPr>
+          <p:cNvSpPr/>
+          <p:nvPr/>
+        </p:nvSpPr>
+        <p:spPr>
+          <a:xfrm>
+            <a:off x="5617026" y="1904999"/>
+            <a:ext cx="1807029" cy="1240971"/>
+          </a:xfrm>
+          <a:prstGeom prst="rect">
+            <a:avLst/>
+          </a:prstGeom>
+          <a:solidFill>
+            <a:schemeClr val="accent2"/>
+          </a:solidFill>
+        </p:spPr>
+        <p:style>
+          <a:lnRef idx="2">
+            <a:schemeClr val="accent1">
+              <a:shade val="15000"/>
+            </a:schemeClr>
+          </a:lnRef>
+          <a:fillRef idx="1">
+            <a:schemeClr val="accent1"/>
+          </a:fillRef>
+          <a:effectRef idx="0">
+            <a:schemeClr val="accent1"/>
+          </a:effectRef>
+          <a:fontRef idx="minor">
+            <a:schemeClr val="lt1"/>
+          </a:fontRef>
+        </p:style>
+        <p:txBody>
+          <a:bodyPr rtlCol="0" anchor="ctr"/>
+          <a:lstStyle/>
+          <a:p>
+            <a:pPr algn="ctr"/>
+            <a:r>
+              <a:rPr lang="en-US" dirty="0"/>
+              <a:t>Car Component</a:t>
+            </a:r>
+          </a:p>
+        </p:txBody>
+      </p:sp>
+      <p:sp>
+        <p:nvSpPr>
+          <p:cNvPr id="11" name="Rectangle 10">
+            <a:extLst>
+              <a:ext uri="{FF2B5EF4-FFF2-40B4-BE49-F238E27FC236}">
+                <a16:creationId xmlns:a16="http://schemas.microsoft.com/office/drawing/2014/main" id="{0058A4D3-9314-0200-8C5E-15F14E7B1734}"/>
+              </a:ext>
+            </a:extLst>
+          </p:cNvPr>
+          <p:cNvSpPr/>
+          <p:nvPr/>
+        </p:nvSpPr>
+        <p:spPr>
+          <a:xfrm>
+            <a:off x="7962896" y="1861456"/>
+            <a:ext cx="1807029" cy="1240971"/>
+          </a:xfrm>
+          <a:prstGeom prst="rect">
+            <a:avLst/>
+          </a:prstGeom>
+          <a:solidFill>
+            <a:schemeClr val="accent2"/>
+          </a:solidFill>
+        </p:spPr>
+        <p:style>
+          <a:lnRef idx="2">
+            <a:schemeClr val="accent1">
+              <a:shade val="15000"/>
+            </a:schemeClr>
+          </a:lnRef>
+          <a:fillRef idx="1">
+            <a:schemeClr val="accent1"/>
+          </a:fillRef>
+          <a:effectRef idx="0">
+            <a:schemeClr val="accent1"/>
+          </a:effectRef>
+          <a:fontRef idx="minor">
+            <a:schemeClr val="lt1"/>
+          </a:fontRef>
+        </p:style>
+        <p:txBody>
+          <a:bodyPr rtlCol="0" anchor="ctr"/>
+          <a:lstStyle/>
+          <a:p>
+            <a:pPr algn="ctr"/>
+            <a:r>
+              <a:rPr lang="en-US" dirty="0"/>
+              <a:t>…</a:t>
+            </a:r>
+          </a:p>
+        </p:txBody>
+      </p:sp>
+      <p:sp>
+        <p:nvSpPr>
+          <p:cNvPr id="12" name="Rectangle 11">
+            <a:extLst>
+              <a:ext uri="{FF2B5EF4-FFF2-40B4-BE49-F238E27FC236}">
+                <a16:creationId xmlns:a16="http://schemas.microsoft.com/office/drawing/2014/main" id="{47C704A6-1BA3-7086-755C-966BB6600F9D}"/>
+              </a:ext>
+            </a:extLst>
+          </p:cNvPr>
+          <p:cNvSpPr/>
+          <p:nvPr/>
+        </p:nvSpPr>
+        <p:spPr>
+          <a:xfrm>
+            <a:off x="4735286" y="3646714"/>
+            <a:ext cx="4953000" cy="2939143"/>
+          </a:xfrm>
+          <a:prstGeom prst="rect">
+            <a:avLst/>
+          </a:prstGeom>
+          <a:solidFill>
+            <a:schemeClr val="accent6">
+              <a:lumMod val="60000"/>
+              <a:lumOff val="40000"/>
+            </a:schemeClr>
+          </a:solidFill>
+        </p:spPr>
+        <p:style>
+          <a:lnRef idx="2">
+            <a:schemeClr val="accent1">
+              <a:shade val="15000"/>
+            </a:schemeClr>
+          </a:lnRef>
+          <a:fillRef idx="1">
+            <a:schemeClr val="accent1"/>
+          </a:fillRef>
+          <a:effectRef idx="0">
+            <a:schemeClr val="accent1"/>
+          </a:effectRef>
+          <a:fontRef idx="minor">
+            <a:schemeClr val="lt1"/>
+          </a:fontRef>
+        </p:style>
+        <p:txBody>
+          <a:bodyPr rtlCol="0" anchor="ctr"/>
+          <a:lstStyle/>
+          <a:p>
+            <a:pPr algn="ctr"/>
+            <a:r>
+              <a:rPr lang="en-US" dirty="0"/>
+              <a:t>Make</a:t>
+            </a:r>
+          </a:p>
+          <a:p>
+            <a:pPr algn="ctr"/>
+            <a:r>
+              <a:rPr lang="en-US" dirty="0"/>
+              <a:t>Model</a:t>
+            </a:r>
+          </a:p>
+          <a:p>
+            <a:pPr algn="ctr"/>
+            <a:r>
+              <a:rPr lang="en-US" dirty="0"/>
+              <a:t>Year</a:t>
+            </a:r>
+          </a:p>
+          <a:p>
+            <a:pPr algn="ctr"/>
+            <a:r>
+              <a:rPr lang="en-US" dirty="0"/>
+              <a:t>Mileage</a:t>
+            </a:r>
+            <a:br>
+              <a:rPr lang="en-US" dirty="0"/>
+            </a:br>
+            <a:r>
+              <a:rPr lang="en-US" dirty="0"/>
+              <a:t>Price</a:t>
+            </a:r>
+          </a:p>
+          <a:p>
+            <a:pPr algn="ctr"/>
+            <a:r>
+              <a:rPr lang="en-US" dirty="0"/>
+              <a:t>Contact Button</a:t>
+            </a:r>
+            <a:br>
+              <a:rPr lang="en-US" dirty="0"/>
+            </a:br>
+            <a:r>
+              <a:rPr lang="en-US" dirty="0"/>
+              <a:t>[image… API?]</a:t>
+            </a:r>
+          </a:p>
+        </p:txBody>
+      </p:sp>
+      <p:cxnSp>
+        <p:nvCxnSpPr>
+          <p:cNvPr id="14" name="Straight Connector 13">
+            <a:extLst>
+              <a:ext uri="{FF2B5EF4-FFF2-40B4-BE49-F238E27FC236}">
+                <a16:creationId xmlns:a16="http://schemas.microsoft.com/office/drawing/2014/main" id="{8BC294AD-01C9-D036-AC19-DB6692D59230}"/>
+              </a:ext>
+            </a:extLst>
+          </p:cNvPr>
+          <p:cNvCxnSpPr/>
+          <p:nvPr/>
+        </p:nvCxnSpPr>
+        <p:spPr>
+          <a:xfrm>
+            <a:off x="3271156" y="3298371"/>
+            <a:ext cx="1377044" cy="3156857"/>
+          </a:xfrm>
+          <a:prstGeom prst="line">
+            <a:avLst/>
+          </a:prstGeom>
+        </p:spPr>
+        <p:style>
+          <a:lnRef idx="1">
+            <a:schemeClr val="accent1"/>
+          </a:lnRef>
+          <a:fillRef idx="0">
+            <a:schemeClr val="accent1"/>
+          </a:fillRef>
+          <a:effectRef idx="0">
+            <a:schemeClr val="accent1"/>
+          </a:effectRef>
+          <a:fontRef idx="minor">
+            <a:schemeClr val="tx1"/>
+          </a:fontRef>
+        </p:style>
+      </p:cxnSp>
+      <p:cxnSp>
+        <p:nvCxnSpPr>
+          <p:cNvPr id="15" name="Straight Connector 14">
+            <a:extLst>
+              <a:ext uri="{FF2B5EF4-FFF2-40B4-BE49-F238E27FC236}">
+                <a16:creationId xmlns:a16="http://schemas.microsoft.com/office/drawing/2014/main" id="{2A9F7BD2-B595-D8E0-DEA2-F1BB5AE45E98}"/>
+              </a:ext>
+            </a:extLst>
+          </p:cNvPr>
+          <p:cNvCxnSpPr>
+            <a:cxnSpLocks/>
+          </p:cNvCxnSpPr>
+          <p:nvPr/>
+        </p:nvCxnSpPr>
+        <p:spPr>
+          <a:xfrm>
+            <a:off x="5080905" y="1850571"/>
+            <a:ext cx="4607381" cy="1796143"/>
+          </a:xfrm>
+          <a:prstGeom prst="line">
+            <a:avLst/>
+          </a:prstGeom>
+        </p:spPr>
+        <p:style>
+          <a:lnRef idx="1">
+            <a:schemeClr val="accent1"/>
+          </a:lnRef>
+          <a:fillRef idx="0">
+            <a:schemeClr val="accent1"/>
+          </a:fillRef>
+          <a:effectRef idx="0">
+            <a:schemeClr val="accent1"/>
+          </a:effectRef>
+          <a:fontRef idx="minor">
+            <a:schemeClr val="tx1"/>
+          </a:fontRef>
+        </p:style>
+      </p:cxnSp>
+    </p:spTree>
+    <p:extLst>
+      <p:ext uri="{BB962C8B-B14F-4D97-AF65-F5344CB8AC3E}">
+        <p14:creationId xmlns:p14="http://schemas.microsoft.com/office/powerpoint/2010/main" val="2258453339"/>
+      </p:ext>
+    </p:extLst>
+  </p:cSld>
+  <p:clrMapOvr>
+    <a:masterClrMapping/>
+  </p:clrMapOvr>
+</p:sld>
+</file>
+
 <file path=ppt/theme/theme1.xml><?xml version="1.0" encoding="utf-8"?>
 <a:theme xmlns:a="http://schemas.openxmlformats.org/drawingml/2006/main" name="Office Theme">
   <a:themeElements>
@@ -12894,4 +13988,299 @@
     </a:ext>
   </a:extLst>
 </a:theme>
+</file>
+
+<file path=ppt/theme/theme2.xml><?xml version="1.0" encoding="utf-8"?>
+<a:theme xmlns:a="http://schemas.openxmlformats.org/drawingml/2006/main" name="Office Theme">
+  <a:themeElements>
+    <a:clrScheme name="Office">
+      <a:dk1>
+        <a:sysClr val="windowText" lastClr="000000"/>
+      </a:dk1>
+      <a:lt1>
+        <a:sysClr val="window" lastClr="FFFFFF"/>
+      </a:lt1>
+      <a:dk2>
+        <a:srgbClr val="44546A"/>
+      </a:dk2>
+      <a:lt2>
+        <a:srgbClr val="E7E6E6"/>
+      </a:lt2>
+      <a:accent1>
+        <a:srgbClr val="4472C4"/>
+      </a:accent1>
+      <a:accent2>
+        <a:srgbClr val="ED7D31"/>
+      </a:accent2>
+      <a:accent3>
+        <a:srgbClr val="A5A5A5"/>
+      </a:accent3>
+      <a:accent4>
+        <a:srgbClr val="FFC000"/>
+      </a:accent4>
+      <a:accent5>
+        <a:srgbClr val="5B9BD5"/>
+      </a:accent5>
+      <a:accent6>
+        <a:srgbClr val="70AD47"/>
+      </a:accent6>
+      <a:hlink>
+        <a:srgbClr val="0563C1"/>
+      </a:hlink>
+      <a:folHlink>
+        <a:srgbClr val="954F72"/>
+      </a:folHlink>
+    </a:clrScheme>
+    <a:fontScheme name="Office">
+      <a:majorFont>
+        <a:latin typeface="Calibri Light" panose="020F0302020204030204"/>
+        <a:ea typeface=""/>
+        <a:cs typeface=""/>
+        <a:font script="Jpan" typeface="游ゴシック Light"/>
+        <a:font script="Hang" typeface="맑은 고딕"/>
+        <a:font script="Hans" typeface="等线 Light"/>
+        <a:font script="Hant" typeface="新細明體"/>
+        <a:font script="Arab" typeface="Times New Roman"/>
+        <a:font script="Hebr" typeface="Times New Roman"/>
+        <a:font script="Thai" typeface="Angsana New"/>
+        <a:font script="Ethi" typeface="Nyala"/>
+        <a:font script="Beng" typeface="Vrinda"/>
+        <a:font script="Gujr" typeface="Shruti"/>
+        <a:font script="Khmr" typeface="MoolBoran"/>
+        <a:font script="Knda" typeface="Tunga"/>
+        <a:font script="Guru" typeface="Raavi"/>
+        <a:font script="Cans" typeface="Euphemia"/>
+        <a:font script="Cher" typeface="Plantagenet Cherokee"/>
+        <a:font script="Yiii" typeface="Microsoft Yi Baiti"/>
+        <a:font script="Tibt" typeface="Microsoft Himalaya"/>
+        <a:font script="Thaa" typeface="MV Boli"/>
+        <a:font script="Deva" typeface="Mangal"/>
+        <a:font script="Telu" typeface="Gautami"/>
+        <a:font script="Taml" typeface="Latha"/>
+        <a:font script="Syrc" typeface="Estrangelo Edessa"/>
+        <a:font script="Orya" typeface="Kalinga"/>
+        <a:font script="Mlym" typeface="Kartika"/>
+        <a:font script="Laoo" typeface="DokChampa"/>
+        <a:font script="Sinh" typeface="Iskoola Pota"/>
+        <a:font script="Mong" typeface="Mongolian Baiti"/>
+        <a:font script="Viet" typeface="Times New Roman"/>
+        <a:font script="Uigh" typeface="Microsoft Uighur"/>
+        <a:font script="Geor" typeface="Sylfaen"/>
+        <a:font script="Armn" typeface="Arial"/>
+        <a:font script="Bugi" typeface="Leelawadee UI"/>
+        <a:font script="Bopo" typeface="Microsoft JhengHei"/>
+        <a:font script="Java" typeface="Javanese Text"/>
+        <a:font script="Lisu" typeface="Segoe UI"/>
+        <a:font script="Mymr" typeface="Myanmar Text"/>
+        <a:font script="Nkoo" typeface="Ebrima"/>
+        <a:font script="Olck" typeface="Nirmala UI"/>
+        <a:font script="Osma" typeface="Ebrima"/>
+        <a:font script="Phag" typeface="Phagspa"/>
+        <a:font script="Syrn" typeface="Estrangelo Edessa"/>
+        <a:font script="Syrj" typeface="Estrangelo Edessa"/>
+        <a:font script="Syre" typeface="Estrangelo Edessa"/>
+        <a:font script="Sora" typeface="Nirmala UI"/>
+        <a:font script="Tale" typeface="Microsoft Tai Le"/>
+        <a:font script="Talu" typeface="Microsoft New Tai Lue"/>
+        <a:font script="Tfng" typeface="Ebrima"/>
+      </a:majorFont>
+      <a:minorFont>
+        <a:latin typeface="Calibri" panose="020F0502020204030204"/>
+        <a:ea typeface=""/>
+        <a:cs typeface=""/>
+        <a:font script="Jpan" typeface="游ゴシック"/>
+        <a:font script="Hang" typeface="맑은 고딕"/>
+        <a:font script="Hans" typeface="等线"/>
+        <a:font script="Hant" typeface="新細明體"/>
+        <a:font script="Arab" typeface="Arial"/>
+        <a:font script="Hebr" typeface="Arial"/>
+        <a:font script="Thai" typeface="Cordia New"/>
+        <a:font script="Ethi" typeface="Nyala"/>
+        <a:font script="Beng" typeface="Vrinda"/>
+        <a:font script="Gujr" typeface="Shruti"/>
+        <a:font script="Khmr" typeface="DaunPenh"/>
+        <a:font script="Knda" typeface="Tunga"/>
+        <a:font script="Guru" typeface="Raavi"/>
+        <a:font script="Cans" typeface="Euphemia"/>
+        <a:font script="Cher" typeface="Plantagenet Cherokee"/>
+        <a:font script="Yiii" typeface="Microsoft Yi Baiti"/>
+        <a:font script="Tibt" typeface="Microsoft Himalaya"/>
+        <a:font script="Thaa" typeface="MV Boli"/>
+        <a:font script="Deva" typeface="Mangal"/>
+        <a:font script="Telu" typeface="Gautami"/>
+        <a:font script="Taml" typeface="Latha"/>
+        <a:font script="Syrc" typeface="Estrangelo Edessa"/>
+        <a:font script="Orya" typeface="Kalinga"/>
+        <a:font script="Mlym" typeface="Kartika"/>
+        <a:font script="Laoo" typeface="DokChampa"/>
+        <a:font script="Sinh" typeface="Iskoola Pota"/>
+        <a:font script="Mong" typeface="Mongolian Baiti"/>
+        <a:font script="Viet" typeface="Arial"/>
+        <a:font script="Uigh" typeface="Microsoft Uighur"/>
+        <a:font script="Geor" typeface="Sylfaen"/>
+        <a:font script="Armn" typeface="Arial"/>
+        <a:font script="Bugi" typeface="Leelawadee UI"/>
+        <a:font script="Bopo" typeface="Microsoft JhengHei"/>
+        <a:font script="Java" typeface="Javanese Text"/>
+        <a:font script="Lisu" typeface="Segoe UI"/>
+        <a:font script="Mymr" typeface="Myanmar Text"/>
+        <a:font script="Nkoo" typeface="Ebrima"/>
+        <a:font script="Olck" typeface="Nirmala UI"/>
+        <a:font script="Osma" typeface="Ebrima"/>
+        <a:font script="Phag" typeface="Phagspa"/>
+        <a:font script="Syrn" typeface="Estrangelo Edessa"/>
+        <a:font script="Syrj" typeface="Estrangelo Edessa"/>
+        <a:font script="Syre" typeface="Estrangelo Edessa"/>
+        <a:font script="Sora" typeface="Nirmala UI"/>
+        <a:font script="Tale" typeface="Microsoft Tai Le"/>
+        <a:font script="Talu" typeface="Microsoft New Tai Lue"/>
+        <a:font script="Tfng" typeface="Ebrima"/>
+      </a:minorFont>
+    </a:fontScheme>
+    <a:fmtScheme name="Office">
+      <a:fillStyleLst>
+        <a:solidFill>
+          <a:schemeClr val="phClr"/>
+        </a:solidFill>
+        <a:gradFill rotWithShape="1">
+          <a:gsLst>
+            <a:gs pos="0">
+              <a:schemeClr val="phClr">
+                <a:lumMod val="110000"/>
+                <a:satMod val="105000"/>
+                <a:tint val="67000"/>
+              </a:schemeClr>
+            </a:gs>
+            <a:gs pos="50000">
+              <a:schemeClr val="phClr">
+                <a:lumMod val="105000"/>
+                <a:satMod val="103000"/>
+                <a:tint val="73000"/>
+              </a:schemeClr>
+            </a:gs>
+            <a:gs pos="100000">
+              <a:schemeClr val="phClr">
+                <a:lumMod val="105000"/>
+                <a:satMod val="109000"/>
+                <a:tint val="81000"/>
+              </a:schemeClr>
+            </a:gs>
+          </a:gsLst>
+          <a:lin ang="5400000" scaled="0"/>
+        </a:gradFill>
+        <a:gradFill rotWithShape="1">
+          <a:gsLst>
+            <a:gs pos="0">
+              <a:schemeClr val="phClr">
+                <a:satMod val="103000"/>
+                <a:lumMod val="102000"/>
+                <a:tint val="94000"/>
+              </a:schemeClr>
+            </a:gs>
+            <a:gs pos="50000">
+              <a:schemeClr val="phClr">
+                <a:satMod val="110000"/>
+                <a:lumMod val="100000"/>
+                <a:shade val="100000"/>
+              </a:schemeClr>
+            </a:gs>
+            <a:gs pos="100000">
+              <a:schemeClr val="phClr">
+                <a:lumMod val="99000"/>
+                <a:satMod val="120000"/>
+                <a:shade val="78000"/>
+              </a:schemeClr>
+            </a:gs>
+          </a:gsLst>
+          <a:lin ang="5400000" scaled="0"/>
+        </a:gradFill>
+      </a:fillStyleLst>
+      <a:lnStyleLst>
+        <a:ln w="6350" cap="flat" cmpd="sng" algn="ctr">
+          <a:solidFill>
+            <a:schemeClr val="phClr"/>
+          </a:solidFill>
+          <a:prstDash val="solid"/>
+          <a:miter lim="800000"/>
+        </a:ln>
+        <a:ln w="12700" cap="flat" cmpd="sng" algn="ctr">
+          <a:solidFill>
+            <a:schemeClr val="phClr"/>
+          </a:solidFill>
+          <a:prstDash val="solid"/>
+          <a:miter lim="800000"/>
+        </a:ln>
+        <a:ln w="19050" cap="flat" cmpd="sng" algn="ctr">
+          <a:solidFill>
+            <a:schemeClr val="phClr"/>
+          </a:solidFill>
+          <a:prstDash val="solid"/>
+          <a:miter lim="800000"/>
+        </a:ln>
+      </a:lnStyleLst>
+      <a:effectStyleLst>
+        <a:effectStyle>
+          <a:effectLst/>
+        </a:effectStyle>
+        <a:effectStyle>
+          <a:effectLst/>
+        </a:effectStyle>
+        <a:effectStyle>
+          <a:effectLst>
+            <a:outerShdw blurRad="57150" dist="19050" dir="5400000" algn="ctr" rotWithShape="0">
+              <a:srgbClr val="000000">
+                <a:alpha val="63000"/>
+              </a:srgbClr>
+            </a:outerShdw>
+          </a:effectLst>
+        </a:effectStyle>
+      </a:effectStyleLst>
+      <a:bgFillStyleLst>
+        <a:solidFill>
+          <a:schemeClr val="phClr"/>
+        </a:solidFill>
+        <a:solidFill>
+          <a:schemeClr val="phClr">
+            <a:tint val="95000"/>
+            <a:satMod val="170000"/>
+          </a:schemeClr>
+        </a:solidFill>
+        <a:gradFill rotWithShape="1">
+          <a:gsLst>
+            <a:gs pos="0">
+              <a:schemeClr val="phClr">
+                <a:tint val="93000"/>
+                <a:satMod val="150000"/>
+                <a:shade val="98000"/>
+                <a:lumMod val="102000"/>
+              </a:schemeClr>
+            </a:gs>
+            <a:gs pos="50000">
+              <a:schemeClr val="phClr">
+                <a:tint val="98000"/>
+                <a:satMod val="130000"/>
+                <a:shade val="90000"/>
+                <a:lumMod val="103000"/>
+              </a:schemeClr>
+            </a:gs>
+            <a:gs pos="100000">
+              <a:schemeClr val="phClr">
+                <a:shade val="63000"/>
+                <a:satMod val="120000"/>
+              </a:schemeClr>
+            </a:gs>
+          </a:gsLst>
+          <a:lin ang="5400000" scaled="0"/>
+        </a:gradFill>
+      </a:bgFillStyleLst>
+    </a:fmtScheme>
+  </a:themeElements>
+  <a:objectDefaults/>
+  <a:extraClrSchemeLst/>
+  <a:extLst>
+    <a:ext uri="{05A4C25C-085E-4340-85A3-A5531E510DB2}">
+      <thm15:themeFamily xmlns:thm15="http://schemas.microsoft.com/office/thememl/2012/main" name="Office Theme" id="{62F939B6-93AF-4DB8-9C6B-D6C7DFDC589F}" vid="{4A3C46E8-61CC-4603-A589-7422A47A8E4A}"/>
+    </a:ext>
+  </a:extLst>
+</a:theme>
 </file>
</xml_diff>

<commit_message>
PPT change attempt 2
</commit_message>
<xml_diff>
--- a/Capstone3_CJK.pptx
+++ b/Capstone3_CJK.pptx
@@ -5,18 +5,19 @@
     <p:sldMasterId id="2147483648" r:id="rId1"/>
   </p:sldMasterIdLst>
   <p:notesMasterIdLst>
-    <p:notesMasterId r:id="rId11"/>
+    <p:notesMasterId r:id="rId12"/>
   </p:notesMasterIdLst>
   <p:sldIdLst>
     <p:sldId id="259" r:id="rId2"/>
     <p:sldId id="260" r:id="rId3"/>
-    <p:sldId id="261" r:id="rId4"/>
-    <p:sldId id="258" r:id="rId5"/>
-    <p:sldId id="263" r:id="rId6"/>
-    <p:sldId id="256" r:id="rId7"/>
-    <p:sldId id="257" r:id="rId8"/>
-    <p:sldId id="264" r:id="rId9"/>
-    <p:sldId id="265" r:id="rId10"/>
+    <p:sldId id="266" r:id="rId4"/>
+    <p:sldId id="261" r:id="rId5"/>
+    <p:sldId id="267" r:id="rId6"/>
+    <p:sldId id="263" r:id="rId7"/>
+    <p:sldId id="256" r:id="rId8"/>
+    <p:sldId id="257" r:id="rId9"/>
+    <p:sldId id="264" r:id="rId10"/>
+    <p:sldId id="265" r:id="rId11"/>
   </p:sldIdLst>
   <p:sldSz cx="12192000" cy="6858000"/>
   <p:notesSz cx="6858000" cy="9144000"/>
@@ -122,8 +123,9 @@
           <p14:sldIdLst>
             <p14:sldId id="259"/>
             <p14:sldId id="260"/>
+            <p14:sldId id="266"/>
             <p14:sldId id="261"/>
-            <p14:sldId id="258"/>
+            <p14:sldId id="267"/>
             <p14:sldId id="263"/>
             <p14:sldId id="256"/>
             <p14:sldId id="257"/>
@@ -1062,6 +1064,927 @@
 </file>
 
 <file path=ppt/diagrams/colors2.xml><?xml version="1.0" encoding="utf-8"?>
+<dgm:colorsDef xmlns:dgm="http://schemas.openxmlformats.org/drawingml/2006/diagram" xmlns:a="http://schemas.openxmlformats.org/drawingml/2006/main" uniqueId="urn:microsoft.com/office/officeart/2018/5/colors/Iconchunking_neutralbg_colorful1">
+  <dgm:title val=""/>
+  <dgm:desc val=""/>
+  <dgm:catLst>
+    <dgm:cat type="colorful" pri="10100"/>
+  </dgm:catLst>
+  <dgm:styleLbl name="node0">
+    <dgm:fillClrLst meth="repeat">
+      <a:schemeClr val="accent1"/>
+    </dgm:fillClrLst>
+    <dgm:linClrLst meth="repeat">
+      <a:schemeClr val="lt1"/>
+    </dgm:linClrLst>
+    <dgm:effectClrLst/>
+    <dgm:txLinClrLst/>
+    <dgm:txFillClrLst/>
+    <dgm:txEffectClrLst/>
+  </dgm:styleLbl>
+  <dgm:styleLbl name="node1">
+    <dgm:fillClrLst meth="repeat">
+      <a:schemeClr val="accent2"/>
+      <a:schemeClr val="accent3"/>
+      <a:schemeClr val="accent4"/>
+      <a:schemeClr val="accent5"/>
+      <a:schemeClr val="accent6"/>
+    </dgm:fillClrLst>
+    <dgm:linClrLst meth="repeat">
+      <a:schemeClr val="lt1">
+        <a:alpha val="0"/>
+      </a:schemeClr>
+    </dgm:linClrLst>
+    <dgm:effectClrLst/>
+    <dgm:txLinClrLst/>
+    <dgm:txFillClrLst/>
+    <dgm:txEffectClrLst/>
+  </dgm:styleLbl>
+  <dgm:styleLbl name="alignNode1">
+    <dgm:fillClrLst meth="repeat">
+      <a:schemeClr val="accent2"/>
+      <a:schemeClr val="accent3"/>
+      <a:schemeClr val="accent4"/>
+      <a:schemeClr val="accent5"/>
+      <a:schemeClr val="accent6"/>
+    </dgm:fillClrLst>
+    <dgm:linClrLst meth="repeat">
+      <a:schemeClr val="accent2"/>
+      <a:schemeClr val="accent3"/>
+      <a:schemeClr val="accent4"/>
+      <a:schemeClr val="accent5"/>
+      <a:schemeClr val="accent6"/>
+    </dgm:linClrLst>
+    <dgm:effectClrLst/>
+    <dgm:txLinClrLst/>
+    <dgm:txFillClrLst/>
+    <dgm:txEffectClrLst/>
+  </dgm:styleLbl>
+  <dgm:styleLbl name="lnNode1">
+    <dgm:fillClrLst meth="repeat">
+      <a:schemeClr val="accent2"/>
+      <a:schemeClr val="accent3"/>
+      <a:schemeClr val="accent4"/>
+      <a:schemeClr val="accent5"/>
+      <a:schemeClr val="accent6"/>
+    </dgm:fillClrLst>
+    <dgm:linClrLst meth="repeat">
+      <a:schemeClr val="lt1"/>
+    </dgm:linClrLst>
+    <dgm:effectClrLst/>
+    <dgm:txLinClrLst/>
+    <dgm:txFillClrLst/>
+    <dgm:txEffectClrLst/>
+  </dgm:styleLbl>
+  <dgm:styleLbl name="vennNode1">
+    <dgm:fillClrLst meth="repeat">
+      <a:schemeClr val="accent2">
+        <a:alpha val="50000"/>
+      </a:schemeClr>
+      <a:schemeClr val="accent3">
+        <a:alpha val="50000"/>
+      </a:schemeClr>
+      <a:schemeClr val="accent4">
+        <a:alpha val="50000"/>
+      </a:schemeClr>
+      <a:schemeClr val="accent5">
+        <a:alpha val="50000"/>
+      </a:schemeClr>
+      <a:schemeClr val="accent6">
+        <a:alpha val="50000"/>
+      </a:schemeClr>
+    </dgm:fillClrLst>
+    <dgm:linClrLst meth="repeat">
+      <a:schemeClr val="lt1"/>
+    </dgm:linClrLst>
+    <dgm:effectClrLst/>
+    <dgm:txLinClrLst/>
+    <dgm:txFillClrLst/>
+    <dgm:txEffectClrLst/>
+  </dgm:styleLbl>
+  <dgm:styleLbl name="node2">
+    <dgm:fillClrLst>
+      <a:schemeClr val="accent2"/>
+    </dgm:fillClrLst>
+    <dgm:linClrLst meth="repeat">
+      <a:schemeClr val="lt1"/>
+    </dgm:linClrLst>
+    <dgm:effectClrLst/>
+    <dgm:txLinClrLst/>
+    <dgm:txFillClrLst/>
+    <dgm:txEffectClrLst/>
+  </dgm:styleLbl>
+  <dgm:styleLbl name="node3">
+    <dgm:fillClrLst>
+      <a:schemeClr val="accent3"/>
+    </dgm:fillClrLst>
+    <dgm:linClrLst meth="repeat">
+      <a:schemeClr val="lt1"/>
+    </dgm:linClrLst>
+    <dgm:effectClrLst/>
+    <dgm:txLinClrLst/>
+    <dgm:txFillClrLst/>
+    <dgm:txEffectClrLst/>
+  </dgm:styleLbl>
+  <dgm:styleLbl name="node4">
+    <dgm:fillClrLst>
+      <a:schemeClr val="accent4"/>
+    </dgm:fillClrLst>
+    <dgm:linClrLst meth="repeat">
+      <a:schemeClr val="lt1"/>
+    </dgm:linClrLst>
+    <dgm:effectClrLst/>
+    <dgm:txLinClrLst/>
+    <dgm:txFillClrLst/>
+    <dgm:txEffectClrLst/>
+  </dgm:styleLbl>
+  <dgm:styleLbl name="fgImgPlace1">
+    <dgm:fillClrLst meth="repeat">
+      <a:schemeClr val="accent2">
+        <a:tint val="50000"/>
+      </a:schemeClr>
+      <a:schemeClr val="accent3">
+        <a:tint val="50000"/>
+      </a:schemeClr>
+      <a:schemeClr val="accent4">
+        <a:tint val="50000"/>
+      </a:schemeClr>
+      <a:schemeClr val="accent5">
+        <a:tint val="50000"/>
+      </a:schemeClr>
+      <a:schemeClr val="accent6">
+        <a:tint val="50000"/>
+      </a:schemeClr>
+    </dgm:fillClrLst>
+    <dgm:linClrLst meth="repeat">
+      <a:schemeClr val="lt1"/>
+    </dgm:linClrLst>
+    <dgm:effectClrLst/>
+    <dgm:txLinClrLst/>
+    <dgm:txFillClrLst meth="repeat">
+      <a:schemeClr val="lt1"/>
+    </dgm:txFillClrLst>
+    <dgm:txEffectClrLst/>
+  </dgm:styleLbl>
+  <dgm:styleLbl name="alignImgPlace1">
+    <dgm:fillClrLst>
+      <a:schemeClr val="accent1">
+        <a:tint val="50000"/>
+      </a:schemeClr>
+      <a:schemeClr val="accent2">
+        <a:tint val="20000"/>
+      </a:schemeClr>
+    </dgm:fillClrLst>
+    <dgm:linClrLst meth="repeat">
+      <a:schemeClr val="lt1"/>
+    </dgm:linClrLst>
+    <dgm:effectClrLst/>
+    <dgm:txLinClrLst/>
+    <dgm:txFillClrLst meth="repeat">
+      <a:schemeClr val="lt1"/>
+    </dgm:txFillClrLst>
+    <dgm:txEffectClrLst/>
+  </dgm:styleLbl>
+  <dgm:styleLbl name="bgImgPlace1">
+    <dgm:fillClrLst>
+      <a:schemeClr val="accent1">
+        <a:tint val="50000"/>
+      </a:schemeClr>
+      <a:schemeClr val="accent2">
+        <a:tint val="20000"/>
+      </a:schemeClr>
+    </dgm:fillClrLst>
+    <dgm:linClrLst meth="repeat">
+      <a:schemeClr val="lt1"/>
+    </dgm:linClrLst>
+    <dgm:effectClrLst/>
+    <dgm:txLinClrLst/>
+    <dgm:txFillClrLst meth="repeat">
+      <a:schemeClr val="lt1"/>
+    </dgm:txFillClrLst>
+    <dgm:txEffectClrLst/>
+  </dgm:styleLbl>
+  <dgm:styleLbl name="sibTrans2D1">
+    <dgm:fillClrLst meth="repeat">
+      <a:schemeClr val="accent2"/>
+      <a:schemeClr val="accent3"/>
+      <a:schemeClr val="accent4"/>
+      <a:schemeClr val="accent5"/>
+      <a:schemeClr val="accent6"/>
+    </dgm:fillClrLst>
+    <dgm:linClrLst meth="cycle">
+      <a:schemeClr val="lt1"/>
+    </dgm:linClrLst>
+    <dgm:effectClrLst/>
+    <dgm:txLinClrLst/>
+    <dgm:txFillClrLst/>
+    <dgm:txEffectClrLst/>
+  </dgm:styleLbl>
+  <dgm:styleLbl name="fgSibTrans2D1">
+    <dgm:fillClrLst meth="repeat">
+      <a:schemeClr val="accent2"/>
+      <a:schemeClr val="accent3"/>
+      <a:schemeClr val="accent4"/>
+      <a:schemeClr val="accent5"/>
+      <a:schemeClr val="accent6"/>
+    </dgm:fillClrLst>
+    <dgm:linClrLst meth="cycle">
+      <a:schemeClr val="lt1"/>
+    </dgm:linClrLst>
+    <dgm:effectClrLst/>
+    <dgm:txLinClrLst/>
+    <dgm:txFillClrLst meth="repeat">
+      <a:schemeClr val="lt1"/>
+    </dgm:txFillClrLst>
+    <dgm:txEffectClrLst/>
+  </dgm:styleLbl>
+  <dgm:styleLbl name="bgSibTrans2D1">
+    <dgm:fillClrLst meth="repeat">
+      <a:schemeClr val="accent2"/>
+      <a:schemeClr val="accent3"/>
+      <a:schemeClr val="accent4"/>
+      <a:schemeClr val="accent5"/>
+      <a:schemeClr val="accent6"/>
+    </dgm:fillClrLst>
+    <dgm:linClrLst meth="cycle">
+      <a:schemeClr val="lt1"/>
+    </dgm:linClrLst>
+    <dgm:effectClrLst/>
+    <dgm:txLinClrLst/>
+    <dgm:txFillClrLst meth="repeat">
+      <a:schemeClr val="lt1"/>
+    </dgm:txFillClrLst>
+    <dgm:txEffectClrLst/>
+  </dgm:styleLbl>
+  <dgm:styleLbl name="sibTrans1D1">
+    <dgm:fillClrLst meth="repeat">
+      <a:schemeClr val="accent2"/>
+      <a:schemeClr val="accent3"/>
+      <a:schemeClr val="accent4"/>
+      <a:schemeClr val="accent5"/>
+      <a:schemeClr val="accent6"/>
+    </dgm:fillClrLst>
+    <dgm:linClrLst meth="repeat">
+      <a:schemeClr val="accent2"/>
+      <a:schemeClr val="accent3"/>
+      <a:schemeClr val="accent4"/>
+      <a:schemeClr val="accent5"/>
+      <a:schemeClr val="accent6"/>
+    </dgm:linClrLst>
+    <dgm:effectClrLst/>
+    <dgm:txLinClrLst/>
+    <dgm:txFillClrLst meth="repeat">
+      <a:schemeClr val="tx1"/>
+    </dgm:txFillClrLst>
+    <dgm:txEffectClrLst/>
+  </dgm:styleLbl>
+  <dgm:styleLbl name="callout">
+    <dgm:fillClrLst meth="repeat">
+      <a:schemeClr val="accent2"/>
+    </dgm:fillClrLst>
+    <dgm:linClrLst meth="repeat">
+      <a:schemeClr val="accent2">
+        <a:tint val="50000"/>
+      </a:schemeClr>
+    </dgm:linClrLst>
+    <dgm:effectClrLst/>
+    <dgm:txLinClrLst/>
+    <dgm:txFillClrLst meth="repeat">
+      <a:schemeClr val="tx1"/>
+    </dgm:txFillClrLst>
+    <dgm:txEffectClrLst/>
+  </dgm:styleLbl>
+  <dgm:styleLbl name="asst0">
+    <dgm:fillClrLst meth="repeat">
+      <a:schemeClr val="accent1"/>
+    </dgm:fillClrLst>
+    <dgm:linClrLst meth="repeat">
+      <a:schemeClr val="lt1"/>
+    </dgm:linClrLst>
+    <dgm:effectClrLst/>
+    <dgm:txLinClrLst/>
+    <dgm:txFillClrLst/>
+    <dgm:txEffectClrLst/>
+  </dgm:styleLbl>
+  <dgm:styleLbl name="asst1">
+    <dgm:fillClrLst meth="repeat">
+      <a:schemeClr val="accent2"/>
+    </dgm:fillClrLst>
+    <dgm:linClrLst meth="repeat">
+      <a:schemeClr val="lt1"/>
+    </dgm:linClrLst>
+    <dgm:effectClrLst/>
+    <dgm:txLinClrLst/>
+    <dgm:txFillClrLst/>
+    <dgm:txEffectClrLst/>
+  </dgm:styleLbl>
+  <dgm:styleLbl name="asst2">
+    <dgm:fillClrLst>
+      <a:schemeClr val="accent3"/>
+    </dgm:fillClrLst>
+    <dgm:linClrLst meth="repeat">
+      <a:schemeClr val="lt1"/>
+    </dgm:linClrLst>
+    <dgm:effectClrLst/>
+    <dgm:txLinClrLst/>
+    <dgm:txFillClrLst/>
+    <dgm:txEffectClrLst/>
+  </dgm:styleLbl>
+  <dgm:styleLbl name="asst3">
+    <dgm:fillClrLst>
+      <a:schemeClr val="accent4"/>
+    </dgm:fillClrLst>
+    <dgm:linClrLst meth="repeat">
+      <a:schemeClr val="lt1"/>
+    </dgm:linClrLst>
+    <dgm:effectClrLst/>
+    <dgm:txLinClrLst/>
+    <dgm:txFillClrLst/>
+    <dgm:txEffectClrLst/>
+  </dgm:styleLbl>
+  <dgm:styleLbl name="asst4">
+    <dgm:fillClrLst>
+      <a:schemeClr val="accent5"/>
+    </dgm:fillClrLst>
+    <dgm:linClrLst meth="repeat">
+      <a:schemeClr val="lt1"/>
+    </dgm:linClrLst>
+    <dgm:effectClrLst/>
+    <dgm:txLinClrLst/>
+    <dgm:txFillClrLst/>
+    <dgm:txEffectClrLst/>
+  </dgm:styleLbl>
+  <dgm:styleLbl name="parChTrans2D1">
+    <dgm:fillClrLst meth="repeat">
+      <a:schemeClr val="accent2"/>
+    </dgm:fillClrLst>
+    <dgm:linClrLst meth="repeat">
+      <a:schemeClr val="lt1"/>
+    </dgm:linClrLst>
+    <dgm:effectClrLst/>
+    <dgm:txLinClrLst/>
+    <dgm:txFillClrLst meth="repeat">
+      <a:schemeClr val="lt1"/>
+    </dgm:txFillClrLst>
+    <dgm:txEffectClrLst/>
+  </dgm:styleLbl>
+  <dgm:styleLbl name="parChTrans2D2">
+    <dgm:fillClrLst meth="repeat">
+      <a:schemeClr val="accent3"/>
+    </dgm:fillClrLst>
+    <dgm:linClrLst meth="repeat">
+      <a:schemeClr val="lt1"/>
+    </dgm:linClrLst>
+    <dgm:effectClrLst/>
+    <dgm:txLinClrLst/>
+    <dgm:txFillClrLst/>
+    <dgm:txEffectClrLst/>
+  </dgm:styleLbl>
+  <dgm:styleLbl name="parChTrans2D3">
+    <dgm:fillClrLst meth="repeat">
+      <a:schemeClr val="accent4"/>
+    </dgm:fillClrLst>
+    <dgm:linClrLst meth="repeat">
+      <a:schemeClr val="lt1"/>
+    </dgm:linClrLst>
+    <dgm:effectClrLst/>
+    <dgm:txLinClrLst/>
+    <dgm:txFillClrLst/>
+    <dgm:txEffectClrLst/>
+  </dgm:styleLbl>
+  <dgm:styleLbl name="parChTrans2D4">
+    <dgm:fillClrLst meth="repeat">
+      <a:schemeClr val="accent5"/>
+    </dgm:fillClrLst>
+    <dgm:linClrLst meth="repeat">
+      <a:schemeClr val="lt1"/>
+    </dgm:linClrLst>
+    <dgm:effectClrLst/>
+    <dgm:txLinClrLst/>
+    <dgm:txFillClrLst meth="repeat">
+      <a:schemeClr val="lt1"/>
+    </dgm:txFillClrLst>
+    <dgm:txEffectClrLst/>
+  </dgm:styleLbl>
+  <dgm:styleLbl name="parChTrans1D1">
+    <dgm:fillClrLst meth="repeat">
+      <a:schemeClr val="accent2"/>
+    </dgm:fillClrLst>
+    <dgm:linClrLst meth="repeat">
+      <a:schemeClr val="accent1"/>
+    </dgm:linClrLst>
+    <dgm:effectClrLst/>
+    <dgm:txLinClrLst/>
+    <dgm:txFillClrLst meth="repeat">
+      <a:schemeClr val="tx1"/>
+    </dgm:txFillClrLst>
+    <dgm:txEffectClrLst/>
+  </dgm:styleLbl>
+  <dgm:styleLbl name="parChTrans1D2">
+    <dgm:fillClrLst meth="repeat">
+      <a:schemeClr val="accent3">
+        <a:tint val="90000"/>
+      </a:schemeClr>
+    </dgm:fillClrLst>
+    <dgm:linClrLst meth="repeat">
+      <a:schemeClr val="accent2"/>
+    </dgm:linClrLst>
+    <dgm:effectClrLst/>
+    <dgm:txLinClrLst/>
+    <dgm:txFillClrLst meth="repeat">
+      <a:schemeClr val="tx1"/>
+    </dgm:txFillClrLst>
+    <dgm:txEffectClrLst/>
+  </dgm:styleLbl>
+  <dgm:styleLbl name="parChTrans1D3">
+    <dgm:fillClrLst meth="repeat">
+      <a:schemeClr val="accent4">
+        <a:tint val="70000"/>
+      </a:schemeClr>
+    </dgm:fillClrLst>
+    <dgm:linClrLst meth="repeat">
+      <a:schemeClr val="accent3"/>
+    </dgm:linClrLst>
+    <dgm:effectClrLst/>
+    <dgm:txLinClrLst/>
+    <dgm:txFillClrLst meth="repeat">
+      <a:schemeClr val="tx1"/>
+    </dgm:txFillClrLst>
+    <dgm:txEffectClrLst/>
+  </dgm:styleLbl>
+  <dgm:styleLbl name="parChTrans1D4">
+    <dgm:fillClrLst meth="repeat">
+      <a:schemeClr val="accent5">
+        <a:tint val="50000"/>
+      </a:schemeClr>
+    </dgm:fillClrLst>
+    <dgm:linClrLst meth="repeat">
+      <a:schemeClr val="accent4"/>
+    </dgm:linClrLst>
+    <dgm:effectClrLst/>
+    <dgm:txLinClrLst/>
+    <dgm:txFillClrLst meth="repeat">
+      <a:schemeClr val="tx1"/>
+    </dgm:txFillClrLst>
+    <dgm:txEffectClrLst/>
+  </dgm:styleLbl>
+  <dgm:styleLbl name="fgAcc1">
+    <dgm:fillClrLst meth="repeat">
+      <a:schemeClr val="lt1">
+        <a:alpha val="90000"/>
+      </a:schemeClr>
+    </dgm:fillClrLst>
+    <dgm:linClrLst meth="repeat">
+      <a:schemeClr val="accent2"/>
+      <a:schemeClr val="accent3"/>
+      <a:schemeClr val="accent4"/>
+      <a:schemeClr val="accent5"/>
+      <a:schemeClr val="accent6"/>
+    </dgm:linClrLst>
+    <dgm:effectClrLst/>
+    <dgm:txLinClrLst/>
+    <dgm:txFillClrLst meth="repeat">
+      <a:schemeClr val="dk1"/>
+    </dgm:txFillClrLst>
+    <dgm:txEffectClrLst/>
+  </dgm:styleLbl>
+  <dgm:styleLbl name="conFgAcc1">
+    <dgm:fillClrLst meth="repeat">
+      <a:schemeClr val="lt1">
+        <a:alpha val="90000"/>
+      </a:schemeClr>
+    </dgm:fillClrLst>
+    <dgm:linClrLst meth="repeat">
+      <a:schemeClr val="accent2"/>
+      <a:schemeClr val="accent3"/>
+      <a:schemeClr val="accent4"/>
+      <a:schemeClr val="accent5"/>
+      <a:schemeClr val="accent6"/>
+    </dgm:linClrLst>
+    <dgm:effectClrLst/>
+    <dgm:txLinClrLst/>
+    <dgm:txFillClrLst meth="repeat">
+      <a:schemeClr val="dk1"/>
+    </dgm:txFillClrLst>
+    <dgm:txEffectClrLst/>
+  </dgm:styleLbl>
+  <dgm:styleLbl name="alignAcc1">
+    <dgm:fillClrLst meth="repeat">
+      <a:schemeClr val="lt1">
+        <a:alpha val="90000"/>
+      </a:schemeClr>
+    </dgm:fillClrLst>
+    <dgm:linClrLst meth="repeat">
+      <a:schemeClr val="accent2"/>
+      <a:schemeClr val="accent3"/>
+      <a:schemeClr val="accent4"/>
+      <a:schemeClr val="accent5"/>
+      <a:schemeClr val="accent6"/>
+    </dgm:linClrLst>
+    <dgm:effectClrLst/>
+    <dgm:txLinClrLst/>
+    <dgm:txFillClrLst meth="repeat">
+      <a:schemeClr val="dk1"/>
+    </dgm:txFillClrLst>
+    <dgm:txEffectClrLst/>
+  </dgm:styleLbl>
+  <dgm:styleLbl name="trAlignAcc1">
+    <dgm:fillClrLst meth="repeat">
+      <a:schemeClr val="lt1">
+        <a:alpha val="40000"/>
+      </a:schemeClr>
+    </dgm:fillClrLst>
+    <dgm:linClrLst meth="repeat">
+      <a:schemeClr val="accent1"/>
+    </dgm:linClrLst>
+    <dgm:effectClrLst/>
+    <dgm:txLinClrLst/>
+    <dgm:txFillClrLst meth="repeat">
+      <a:schemeClr val="dk1"/>
+    </dgm:txFillClrLst>
+    <dgm:txEffectClrLst/>
+  </dgm:styleLbl>
+  <dgm:styleLbl name="bgAcc1">
+    <dgm:fillClrLst meth="repeat">
+      <a:schemeClr val="lt1">
+        <a:alpha val="90000"/>
+      </a:schemeClr>
+    </dgm:fillClrLst>
+    <dgm:linClrLst meth="repeat">
+      <a:schemeClr val="accent2"/>
+      <a:schemeClr val="accent3"/>
+      <a:schemeClr val="accent4"/>
+      <a:schemeClr val="accent5"/>
+      <a:schemeClr val="accent6"/>
+    </dgm:linClrLst>
+    <dgm:effectClrLst/>
+    <dgm:txLinClrLst/>
+    <dgm:txFillClrLst meth="repeat">
+      <a:schemeClr val="dk1"/>
+    </dgm:txFillClrLst>
+    <dgm:txEffectClrLst/>
+  </dgm:styleLbl>
+  <dgm:styleLbl name="solidFgAcc1">
+    <dgm:fillClrLst meth="repeat">
+      <a:schemeClr val="lt1"/>
+    </dgm:fillClrLst>
+    <dgm:linClrLst meth="repeat">
+      <a:schemeClr val="accent2"/>
+      <a:schemeClr val="accent3"/>
+      <a:schemeClr val="accent4"/>
+      <a:schemeClr val="accent5"/>
+      <a:schemeClr val="accent6"/>
+    </dgm:linClrLst>
+    <dgm:effectClrLst/>
+    <dgm:txLinClrLst/>
+    <dgm:txFillClrLst meth="repeat">
+      <a:schemeClr val="dk1"/>
+    </dgm:txFillClrLst>
+    <dgm:txEffectClrLst/>
+  </dgm:styleLbl>
+  <dgm:styleLbl name="solidAlignAcc1">
+    <dgm:fillClrLst meth="repeat">
+      <a:schemeClr val="lt1"/>
+    </dgm:fillClrLst>
+    <dgm:linClrLst meth="repeat">
+      <a:schemeClr val="accent2"/>
+      <a:schemeClr val="accent3"/>
+      <a:schemeClr val="accent4"/>
+      <a:schemeClr val="accent5"/>
+      <a:schemeClr val="accent6"/>
+    </dgm:linClrLst>
+    <dgm:effectClrLst/>
+    <dgm:txLinClrLst/>
+    <dgm:txFillClrLst meth="repeat">
+      <a:schemeClr val="dk1"/>
+    </dgm:txFillClrLst>
+    <dgm:txEffectClrLst/>
+  </dgm:styleLbl>
+  <dgm:styleLbl name="solidBgAcc1">
+    <dgm:fillClrLst meth="repeat">
+      <a:schemeClr val="lt1"/>
+    </dgm:fillClrLst>
+    <dgm:linClrLst meth="repeat">
+      <a:schemeClr val="accent2"/>
+      <a:schemeClr val="accent3"/>
+      <a:schemeClr val="accent4"/>
+      <a:schemeClr val="accent5"/>
+      <a:schemeClr val="accent6"/>
+    </dgm:linClrLst>
+    <dgm:effectClrLst/>
+    <dgm:txLinClrLst/>
+    <dgm:txFillClrLst meth="repeat">
+      <a:schemeClr val="dk1"/>
+    </dgm:txFillClrLst>
+    <dgm:txEffectClrLst/>
+  </dgm:styleLbl>
+  <dgm:styleLbl name="fgAccFollowNode1">
+    <dgm:fillClrLst meth="repeat">
+      <a:schemeClr val="accent2">
+        <a:tint val="40000"/>
+        <a:alpha val="90000"/>
+      </a:schemeClr>
+      <a:schemeClr val="accent3">
+        <a:tint val="40000"/>
+        <a:alpha val="90000"/>
+      </a:schemeClr>
+      <a:schemeClr val="accent4">
+        <a:tint val="40000"/>
+        <a:alpha val="90000"/>
+      </a:schemeClr>
+      <a:schemeClr val="accent5">
+        <a:tint val="40000"/>
+        <a:alpha val="90000"/>
+      </a:schemeClr>
+      <a:schemeClr val="accent6">
+        <a:tint val="40000"/>
+        <a:alpha val="90000"/>
+      </a:schemeClr>
+    </dgm:fillClrLst>
+    <dgm:linClrLst meth="repeat">
+      <a:schemeClr val="accent2">
+        <a:tint val="40000"/>
+        <a:alpha val="90000"/>
+      </a:schemeClr>
+      <a:schemeClr val="accent3">
+        <a:tint val="40000"/>
+        <a:alpha val="90000"/>
+      </a:schemeClr>
+      <a:schemeClr val="accent4">
+        <a:tint val="40000"/>
+        <a:alpha val="90000"/>
+      </a:schemeClr>
+      <a:schemeClr val="accent5">
+        <a:tint val="40000"/>
+        <a:alpha val="90000"/>
+      </a:schemeClr>
+      <a:schemeClr val="accent6">
+        <a:tint val="40000"/>
+        <a:alpha val="90000"/>
+      </a:schemeClr>
+    </dgm:linClrLst>
+    <dgm:effectClrLst/>
+    <dgm:txLinClrLst/>
+    <dgm:txFillClrLst meth="repeat">
+      <a:schemeClr val="dk1"/>
+    </dgm:txFillClrLst>
+    <dgm:txEffectClrLst/>
+  </dgm:styleLbl>
+  <dgm:styleLbl name="alignAccFollowNode1">
+    <dgm:fillClrLst meth="repeat">
+      <a:schemeClr val="accent2">
+        <a:tint val="40000"/>
+        <a:alpha val="90000"/>
+      </a:schemeClr>
+      <a:schemeClr val="accent3">
+        <a:tint val="40000"/>
+        <a:alpha val="90000"/>
+      </a:schemeClr>
+      <a:schemeClr val="accent4">
+        <a:tint val="40000"/>
+        <a:alpha val="90000"/>
+      </a:schemeClr>
+      <a:schemeClr val="accent5">
+        <a:tint val="40000"/>
+        <a:alpha val="90000"/>
+      </a:schemeClr>
+      <a:schemeClr val="accent6">
+        <a:tint val="40000"/>
+        <a:alpha val="90000"/>
+      </a:schemeClr>
+    </dgm:fillClrLst>
+    <dgm:linClrLst meth="repeat">
+      <a:schemeClr val="accent2">
+        <a:tint val="40000"/>
+        <a:alpha val="90000"/>
+      </a:schemeClr>
+      <a:schemeClr val="accent3">
+        <a:tint val="40000"/>
+        <a:alpha val="90000"/>
+      </a:schemeClr>
+      <a:schemeClr val="accent4">
+        <a:tint val="40000"/>
+        <a:alpha val="90000"/>
+      </a:schemeClr>
+      <a:schemeClr val="accent5">
+        <a:tint val="40000"/>
+        <a:alpha val="90000"/>
+      </a:schemeClr>
+      <a:schemeClr val="accent6">
+        <a:tint val="40000"/>
+        <a:alpha val="90000"/>
+      </a:schemeClr>
+    </dgm:linClrLst>
+    <dgm:effectClrLst/>
+    <dgm:txLinClrLst/>
+    <dgm:txFillClrLst meth="repeat">
+      <a:schemeClr val="dk1"/>
+    </dgm:txFillClrLst>
+    <dgm:txEffectClrLst/>
+  </dgm:styleLbl>
+  <dgm:styleLbl name="bgAccFollowNode1">
+    <dgm:fillClrLst meth="repeat">
+      <a:schemeClr val="accent2">
+        <a:tint val="40000"/>
+        <a:alpha val="90000"/>
+      </a:schemeClr>
+      <a:schemeClr val="accent3">
+        <a:tint val="40000"/>
+        <a:alpha val="90000"/>
+      </a:schemeClr>
+      <a:schemeClr val="accent4">
+        <a:tint val="40000"/>
+        <a:alpha val="90000"/>
+      </a:schemeClr>
+      <a:schemeClr val="accent5">
+        <a:tint val="40000"/>
+        <a:alpha val="90000"/>
+      </a:schemeClr>
+      <a:schemeClr val="accent6">
+        <a:tint val="40000"/>
+        <a:alpha val="90000"/>
+      </a:schemeClr>
+    </dgm:fillClrLst>
+    <dgm:linClrLst meth="repeat">
+      <a:schemeClr val="accent2">
+        <a:tint val="40000"/>
+        <a:alpha val="90000"/>
+      </a:schemeClr>
+      <a:schemeClr val="accent3">
+        <a:tint val="40000"/>
+        <a:alpha val="90000"/>
+      </a:schemeClr>
+      <a:schemeClr val="accent4">
+        <a:tint val="40000"/>
+        <a:alpha val="90000"/>
+      </a:schemeClr>
+      <a:schemeClr val="accent5">
+        <a:tint val="40000"/>
+        <a:alpha val="90000"/>
+      </a:schemeClr>
+      <a:schemeClr val="accent6">
+        <a:tint val="40000"/>
+        <a:alpha val="90000"/>
+      </a:schemeClr>
+    </dgm:linClrLst>
+    <dgm:effectClrLst/>
+    <dgm:txLinClrLst/>
+    <dgm:txFillClrLst meth="repeat">
+      <a:schemeClr val="dk1"/>
+    </dgm:txFillClrLst>
+    <dgm:txEffectClrLst/>
+  </dgm:styleLbl>
+  <dgm:styleLbl name="fgAcc0">
+    <dgm:fillClrLst meth="repeat">
+      <a:schemeClr val="lt1">
+        <a:alpha val="90000"/>
+      </a:schemeClr>
+    </dgm:fillClrLst>
+    <dgm:linClrLst>
+      <a:schemeClr val="accent1"/>
+    </dgm:linClrLst>
+    <dgm:effectClrLst/>
+    <dgm:txLinClrLst/>
+    <dgm:txFillClrLst meth="repeat">
+      <a:schemeClr val="dk1"/>
+    </dgm:txFillClrLst>
+    <dgm:txEffectClrLst/>
+  </dgm:styleLbl>
+  <dgm:styleLbl name="fgAcc2">
+    <dgm:fillClrLst meth="repeat">
+      <a:schemeClr val="lt1">
+        <a:alpha val="90000"/>
+      </a:schemeClr>
+    </dgm:fillClrLst>
+    <dgm:linClrLst>
+      <a:schemeClr val="accent2"/>
+    </dgm:linClrLst>
+    <dgm:effectClrLst/>
+    <dgm:txLinClrLst/>
+    <dgm:txFillClrLst meth="repeat">
+      <a:schemeClr val="dk1"/>
+    </dgm:txFillClrLst>
+    <dgm:txEffectClrLst/>
+  </dgm:styleLbl>
+  <dgm:styleLbl name="fgAcc3">
+    <dgm:fillClrLst meth="repeat">
+      <a:schemeClr val="lt1">
+        <a:alpha val="90000"/>
+      </a:schemeClr>
+    </dgm:fillClrLst>
+    <dgm:linClrLst>
+      <a:schemeClr val="accent3"/>
+    </dgm:linClrLst>
+    <dgm:effectClrLst/>
+    <dgm:txLinClrLst/>
+    <dgm:txFillClrLst meth="repeat">
+      <a:schemeClr val="dk1"/>
+    </dgm:txFillClrLst>
+    <dgm:txEffectClrLst/>
+  </dgm:styleLbl>
+  <dgm:styleLbl name="fgAcc4">
+    <dgm:fillClrLst meth="repeat">
+      <a:schemeClr val="lt1">
+        <a:alpha val="90000"/>
+      </a:schemeClr>
+    </dgm:fillClrLst>
+    <dgm:linClrLst>
+      <a:schemeClr val="accent4"/>
+    </dgm:linClrLst>
+    <dgm:effectClrLst/>
+    <dgm:txLinClrLst/>
+    <dgm:txFillClrLst meth="repeat">
+      <a:schemeClr val="dk1"/>
+    </dgm:txFillClrLst>
+    <dgm:txEffectClrLst/>
+  </dgm:styleLbl>
+  <dgm:styleLbl name="bgShp">
+    <dgm:fillClrLst meth="repeat">
+      <a:schemeClr val="bg1">
+        <a:lumMod val="95000"/>
+      </a:schemeClr>
+    </dgm:fillClrLst>
+    <dgm:linClrLst meth="repeat">
+      <a:schemeClr val="dk1"/>
+    </dgm:linClrLst>
+    <dgm:effectClrLst/>
+    <dgm:txLinClrLst/>
+    <dgm:txFillClrLst meth="repeat">
+      <a:schemeClr val="dk1"/>
+    </dgm:txFillClrLst>
+    <dgm:txEffectClrLst/>
+  </dgm:styleLbl>
+  <dgm:styleLbl name="dkBgShp">
+    <dgm:fillClrLst meth="repeat">
+      <a:schemeClr val="accent2">
+        <a:shade val="90000"/>
+      </a:schemeClr>
+    </dgm:fillClrLst>
+    <dgm:linClrLst meth="repeat">
+      <a:schemeClr val="dk1"/>
+    </dgm:linClrLst>
+    <dgm:effectClrLst/>
+    <dgm:txLinClrLst/>
+    <dgm:txFillClrLst meth="repeat">
+      <a:schemeClr val="lt1"/>
+    </dgm:txFillClrLst>
+    <dgm:txEffectClrLst/>
+  </dgm:styleLbl>
+  <dgm:styleLbl name="trBgShp">
+    <dgm:fillClrLst meth="repeat">
+      <a:schemeClr val="accent1">
+        <a:tint val="50000"/>
+        <a:alpha val="40000"/>
+      </a:schemeClr>
+    </dgm:fillClrLst>
+    <dgm:linClrLst meth="repeat">
+      <a:schemeClr val="accent2"/>
+    </dgm:linClrLst>
+    <dgm:effectClrLst/>
+    <dgm:txLinClrLst/>
+    <dgm:txFillClrLst meth="repeat">
+      <a:schemeClr val="lt1"/>
+    </dgm:txFillClrLst>
+    <dgm:txEffectClrLst/>
+  </dgm:styleLbl>
+  <dgm:styleLbl name="fgShp">
+    <dgm:fillClrLst meth="repeat">
+      <a:schemeClr val="accent2">
+        <a:tint val="40000"/>
+      </a:schemeClr>
+    </dgm:fillClrLst>
+    <dgm:linClrLst meth="repeat">
+      <a:schemeClr val="lt1"/>
+    </dgm:linClrLst>
+    <dgm:effectClrLst/>
+    <dgm:txLinClrLst/>
+    <dgm:txFillClrLst meth="repeat">
+      <a:schemeClr val="dk1"/>
+    </dgm:txFillClrLst>
+    <dgm:txEffectClrLst/>
+  </dgm:styleLbl>
+  <dgm:styleLbl name="revTx">
+    <dgm:fillClrLst meth="repeat">
+      <a:schemeClr val="lt1">
+        <a:alpha val="0"/>
+      </a:schemeClr>
+    </dgm:fillClrLst>
+    <dgm:linClrLst meth="repeat">
+      <a:schemeClr val="dk1">
+        <a:alpha val="0"/>
+      </a:schemeClr>
+    </dgm:linClrLst>
+    <dgm:effectClrLst/>
+    <dgm:txLinClrLst/>
+    <dgm:txFillClrLst meth="repeat">
+      <a:schemeClr val="tx1"/>
+    </dgm:txFillClrLst>
+    <dgm:txEffectClrLst/>
+  </dgm:styleLbl>
+</dgm:colorsDef>
+</file>
+
+<file path=ppt/diagrams/colors3.xml><?xml version="1.0" encoding="utf-8"?>
 <dgm:colorsDef xmlns:dgm="http://schemas.openxmlformats.org/drawingml/2006/diagram" xmlns:a="http://schemas.openxmlformats.org/drawingml/2006/main" uniqueId="urn:microsoft.com/office/officeart/2018/5/colors/Iconchunking_neutralbg_colorful5">
   <dgm:title val=""/>
   <dgm:desc val=""/>
@@ -1846,6 +2769,264 @@
 </file>
 
 <file path=ppt/diagrams/data1.xml><?xml version="1.0" encoding="utf-8"?>
+<dgm:dataModel xmlns:dgm="http://schemas.openxmlformats.org/drawingml/2006/diagram" xmlns:a="http://schemas.openxmlformats.org/drawingml/2006/main">
+  <dgm:ptLst>
+    <dgm:pt modelId="{1D0107FD-77C8-42A1-818A-AB552FCABAC7}" type="doc">
+      <dgm:prSet loTypeId="urn:microsoft.com/office/officeart/2018/5/layout/IconCircleLabelList" loCatId="icon" qsTypeId="urn:microsoft.com/office/officeart/2005/8/quickstyle/simple1" qsCatId="simple" csTypeId="urn:microsoft.com/office/officeart/2018/5/colors/Iconchunking_neutralbg_colorful1" csCatId="colorful" phldr="1"/>
+      <dgm:spPr/>
+      <dgm:t>
+        <a:bodyPr/>
+        <a:lstStyle/>
+        <a:p>
+          <a:endParaRPr lang="en-US"/>
+        </a:p>
+      </dgm:t>
+    </dgm:pt>
+    <dgm:pt modelId="{7BE5A8DC-D8CE-4AA1-9A72-1DFB5785A435}">
+      <dgm:prSet/>
+      <dgm:spPr/>
+      <dgm:t>
+        <a:bodyPr/>
+        <a:lstStyle/>
+        <a:p>
+          <a:pPr>
+            <a:lnSpc>
+              <a:spcPct val="100000"/>
+            </a:lnSpc>
+            <a:defRPr cap="all"/>
+          </a:pPr>
+          <a:r>
+            <a:rPr lang="en-US" dirty="0"/>
+            <a:t>Problem: </a:t>
+          </a:r>
+        </a:p>
+        <a:p>
+          <a:pPr>
+            <a:lnSpc>
+              <a:spcPct val="100000"/>
+            </a:lnSpc>
+            <a:defRPr cap="all"/>
+          </a:pPr>
+          <a:r>
+            <a:rPr lang="en-US" dirty="0"/>
+            <a:t>Craigslist is the leading private party auto Sales platform but leaves a lot to be desired</a:t>
+          </a:r>
+        </a:p>
+      </dgm:t>
+    </dgm:pt>
+    <dgm:pt modelId="{14A321A1-2AD3-4460-9974-2F56F6651EB4}" type="parTrans" cxnId="{BD30A778-5A5F-49B0-AA93-3D8FAA7537BD}">
+      <dgm:prSet/>
+      <dgm:spPr/>
+      <dgm:t>
+        <a:bodyPr/>
+        <a:lstStyle/>
+        <a:p>
+          <a:endParaRPr lang="en-US"/>
+        </a:p>
+      </dgm:t>
+    </dgm:pt>
+    <dgm:pt modelId="{E63DD679-1DB9-4ABB-8326-5C909E8AE8D6}" type="sibTrans" cxnId="{BD30A778-5A5F-49B0-AA93-3D8FAA7537BD}">
+      <dgm:prSet/>
+      <dgm:spPr/>
+      <dgm:t>
+        <a:bodyPr/>
+        <a:lstStyle/>
+        <a:p>
+          <a:endParaRPr lang="en-US"/>
+        </a:p>
+      </dgm:t>
+    </dgm:pt>
+    <dgm:pt modelId="{8C6716B8-D3B5-435F-B6B7-2F546CFE6B31}">
+      <dgm:prSet/>
+      <dgm:spPr/>
+      <dgm:t>
+        <a:bodyPr/>
+        <a:lstStyle/>
+        <a:p>
+          <a:pPr>
+            <a:lnSpc>
+              <a:spcPct val="100000"/>
+            </a:lnSpc>
+            <a:defRPr cap="all"/>
+          </a:pPr>
+          <a:r>
+            <a:rPr lang="en-US" dirty="0"/>
+            <a:t>Solution: </a:t>
+          </a:r>
+        </a:p>
+        <a:p>
+          <a:pPr>
+            <a:lnSpc>
+              <a:spcPct val="100000"/>
+            </a:lnSpc>
+            <a:defRPr cap="all"/>
+          </a:pPr>
+          <a:r>
+            <a:rPr lang="en-US" dirty="0"/>
+            <a:t>Modern application for private party auto Sales &amp; Purchases</a:t>
+          </a:r>
+        </a:p>
+      </dgm:t>
+    </dgm:pt>
+    <dgm:pt modelId="{1C765AC0-2D23-44AE-A31A-43C75EE089D2}" type="parTrans" cxnId="{7E210666-EE1E-4F91-ADBC-AEA6A4B143C0}">
+      <dgm:prSet/>
+      <dgm:spPr/>
+      <dgm:t>
+        <a:bodyPr/>
+        <a:lstStyle/>
+        <a:p>
+          <a:endParaRPr lang="en-US"/>
+        </a:p>
+      </dgm:t>
+    </dgm:pt>
+    <dgm:pt modelId="{365F0EEE-1DC2-4E1F-B465-570B0DA0BD99}" type="sibTrans" cxnId="{7E210666-EE1E-4F91-ADBC-AEA6A4B143C0}">
+      <dgm:prSet/>
+      <dgm:spPr/>
+      <dgm:t>
+        <a:bodyPr/>
+        <a:lstStyle/>
+        <a:p>
+          <a:endParaRPr lang="en-US"/>
+        </a:p>
+      </dgm:t>
+    </dgm:pt>
+    <dgm:pt modelId="{3B0860C2-D0F4-4612-B164-5D28E3AD1D7F}" type="pres">
+      <dgm:prSet presAssocID="{1D0107FD-77C8-42A1-818A-AB552FCABAC7}" presName="root" presStyleCnt="0">
+        <dgm:presLayoutVars>
+          <dgm:dir/>
+          <dgm:resizeHandles val="exact"/>
+        </dgm:presLayoutVars>
+      </dgm:prSet>
+      <dgm:spPr/>
+    </dgm:pt>
+    <dgm:pt modelId="{050666FF-75AD-46EA-89BA-575F8F9E9F57}" type="pres">
+      <dgm:prSet presAssocID="{7BE5A8DC-D8CE-4AA1-9A72-1DFB5785A435}" presName="compNode" presStyleCnt="0"/>
+      <dgm:spPr/>
+    </dgm:pt>
+    <dgm:pt modelId="{7B3209E0-E1E6-496C-85E8-18CA4804FC70}" type="pres">
+      <dgm:prSet presAssocID="{7BE5A8DC-D8CE-4AA1-9A72-1DFB5785A435}" presName="iconBgRect" presStyleLbl="bgShp" presStyleIdx="0" presStyleCnt="2"/>
+      <dgm:spPr/>
+    </dgm:pt>
+    <dgm:pt modelId="{FBEF400F-CE56-46C6-8FDA-0E9950748591}" type="pres">
+      <dgm:prSet presAssocID="{7BE5A8DC-D8CE-4AA1-9A72-1DFB5785A435}" presName="iconRect" presStyleLbl="node1" presStyleIdx="0" presStyleCnt="2"/>
+      <dgm:spPr>
+        <a:blipFill>
+          <a:blip xmlns:r="http://schemas.openxmlformats.org/officeDocument/2006/relationships" r:embed="rId1">
+            <a:extLst>
+              <a:ext uri="{96DAC541-7B7A-43D3-8B79-37D633B846F1}">
+                <asvg:svgBlip xmlns:asvg="http://schemas.microsoft.com/office/drawing/2016/SVG/main" r:embed="rId2"/>
+              </a:ext>
+            </a:extLst>
+          </a:blip>
+          <a:srcRect/>
+          <a:stretch>
+            <a:fillRect/>
+          </a:stretch>
+        </a:blipFill>
+        <a:ln>
+          <a:noFill/>
+        </a:ln>
+      </dgm:spPr>
+      <dgm:extLst>
+        <a:ext uri="{E40237B7-FDA0-4F09-8148-C483321AD2D9}">
+          <dgm14:cNvPr xmlns:dgm14="http://schemas.microsoft.com/office/drawing/2010/diagram" id="0" name="" descr="Brainstorm with solid fill"/>
+        </a:ext>
+      </dgm:extLst>
+    </dgm:pt>
+    <dgm:pt modelId="{BB2A34F7-0A3B-4EE3-B70A-99305690E1BE}" type="pres">
+      <dgm:prSet presAssocID="{7BE5A8DC-D8CE-4AA1-9A72-1DFB5785A435}" presName="spaceRect" presStyleCnt="0"/>
+      <dgm:spPr/>
+    </dgm:pt>
+    <dgm:pt modelId="{3A1FEE47-58ED-481B-8886-E400AE3AB942}" type="pres">
+      <dgm:prSet presAssocID="{7BE5A8DC-D8CE-4AA1-9A72-1DFB5785A435}" presName="textRect" presStyleLbl="revTx" presStyleIdx="0" presStyleCnt="2">
+        <dgm:presLayoutVars>
+          <dgm:chMax val="1"/>
+          <dgm:chPref val="1"/>
+        </dgm:presLayoutVars>
+      </dgm:prSet>
+      <dgm:spPr/>
+    </dgm:pt>
+    <dgm:pt modelId="{925A192B-371F-4944-9417-D079F6C1DF90}" type="pres">
+      <dgm:prSet presAssocID="{E63DD679-1DB9-4ABB-8326-5C909E8AE8D6}" presName="sibTrans" presStyleCnt="0"/>
+      <dgm:spPr/>
+    </dgm:pt>
+    <dgm:pt modelId="{B11F9863-1A64-4AEB-AEAD-E18413F3AFF4}" type="pres">
+      <dgm:prSet presAssocID="{8C6716B8-D3B5-435F-B6B7-2F546CFE6B31}" presName="compNode" presStyleCnt="0"/>
+      <dgm:spPr/>
+    </dgm:pt>
+    <dgm:pt modelId="{992950E9-2385-4636-9008-CD5FF8DF496A}" type="pres">
+      <dgm:prSet presAssocID="{8C6716B8-D3B5-435F-B6B7-2F546CFE6B31}" presName="iconBgRect" presStyleLbl="bgShp" presStyleIdx="1" presStyleCnt="2"/>
+      <dgm:spPr/>
+    </dgm:pt>
+    <dgm:pt modelId="{8ADB9D8E-BEB3-41DA-A6D2-310110A30014}" type="pres">
+      <dgm:prSet presAssocID="{8C6716B8-D3B5-435F-B6B7-2F546CFE6B31}" presName="iconRect" presStyleLbl="node1" presStyleIdx="1" presStyleCnt="2" custFlipHor="1"/>
+      <dgm:spPr>
+        <a:blipFill>
+          <a:blip xmlns:r="http://schemas.openxmlformats.org/officeDocument/2006/relationships" r:embed="rId3">
+            <a:extLst>
+              <a:ext uri="{96DAC541-7B7A-43D3-8B79-37D633B846F1}">
+                <asvg:svgBlip xmlns:asvg="http://schemas.microsoft.com/office/drawing/2016/SVG/main" r:embed="rId4"/>
+              </a:ext>
+            </a:extLst>
+          </a:blip>
+          <a:srcRect/>
+          <a:stretch>
+            <a:fillRect/>
+          </a:stretch>
+        </a:blipFill>
+        <a:ln>
+          <a:noFill/>
+        </a:ln>
+      </dgm:spPr>
+      <dgm:extLst>
+        <a:ext uri="{E40237B7-FDA0-4F09-8148-C483321AD2D9}">
+          <dgm14:cNvPr xmlns:dgm14="http://schemas.microsoft.com/office/drawing/2010/diagram" id="0" name="" descr="Idea with solid fill"/>
+        </a:ext>
+      </dgm:extLst>
+    </dgm:pt>
+    <dgm:pt modelId="{0B5B2A44-EAE9-4620-B559-AC732557E4A0}" type="pres">
+      <dgm:prSet presAssocID="{8C6716B8-D3B5-435F-B6B7-2F546CFE6B31}" presName="spaceRect" presStyleCnt="0"/>
+      <dgm:spPr/>
+    </dgm:pt>
+    <dgm:pt modelId="{297EF269-1D09-4423-82F6-473F3B054C09}" type="pres">
+      <dgm:prSet presAssocID="{8C6716B8-D3B5-435F-B6B7-2F546CFE6B31}" presName="textRect" presStyleLbl="revTx" presStyleIdx="1" presStyleCnt="2">
+        <dgm:presLayoutVars>
+          <dgm:chMax val="1"/>
+          <dgm:chPref val="1"/>
+        </dgm:presLayoutVars>
+      </dgm:prSet>
+      <dgm:spPr/>
+    </dgm:pt>
+  </dgm:ptLst>
+  <dgm:cxnLst>
+    <dgm:cxn modelId="{7E210666-EE1E-4F91-ADBC-AEA6A4B143C0}" srcId="{1D0107FD-77C8-42A1-818A-AB552FCABAC7}" destId="{8C6716B8-D3B5-435F-B6B7-2F546CFE6B31}" srcOrd="1" destOrd="0" parTransId="{1C765AC0-2D23-44AE-A31A-43C75EE089D2}" sibTransId="{365F0EEE-1DC2-4E1F-B465-570B0DA0BD99}"/>
+    <dgm:cxn modelId="{BD30A778-5A5F-49B0-AA93-3D8FAA7537BD}" srcId="{1D0107FD-77C8-42A1-818A-AB552FCABAC7}" destId="{7BE5A8DC-D8CE-4AA1-9A72-1DFB5785A435}" srcOrd="0" destOrd="0" parTransId="{14A321A1-2AD3-4460-9974-2F56F6651EB4}" sibTransId="{E63DD679-1DB9-4ABB-8326-5C909E8AE8D6}"/>
+    <dgm:cxn modelId="{2ABA5A90-AB7F-4841-B1A2-01C26B89CE9B}" type="presOf" srcId="{8C6716B8-D3B5-435F-B6B7-2F546CFE6B31}" destId="{297EF269-1D09-4423-82F6-473F3B054C09}" srcOrd="0" destOrd="0" presId="urn:microsoft.com/office/officeart/2018/5/layout/IconCircleLabelList"/>
+    <dgm:cxn modelId="{CD69ABBB-31D4-40CE-9914-68C509236598}" type="presOf" srcId="{1D0107FD-77C8-42A1-818A-AB552FCABAC7}" destId="{3B0860C2-D0F4-4612-B164-5D28E3AD1D7F}" srcOrd="0" destOrd="0" presId="urn:microsoft.com/office/officeart/2018/5/layout/IconCircleLabelList"/>
+    <dgm:cxn modelId="{7DB608EC-638A-48C6-8BFD-DED8DFA38D83}" type="presOf" srcId="{7BE5A8DC-D8CE-4AA1-9A72-1DFB5785A435}" destId="{3A1FEE47-58ED-481B-8886-E400AE3AB942}" srcOrd="0" destOrd="0" presId="urn:microsoft.com/office/officeart/2018/5/layout/IconCircleLabelList"/>
+    <dgm:cxn modelId="{381EAD43-851D-4862-900D-8890586C1513}" type="presParOf" srcId="{3B0860C2-D0F4-4612-B164-5D28E3AD1D7F}" destId="{050666FF-75AD-46EA-89BA-575F8F9E9F57}" srcOrd="0" destOrd="0" presId="urn:microsoft.com/office/officeart/2018/5/layout/IconCircleLabelList"/>
+    <dgm:cxn modelId="{71C59259-461E-4B3E-858A-6B7A942D4EAE}" type="presParOf" srcId="{050666FF-75AD-46EA-89BA-575F8F9E9F57}" destId="{7B3209E0-E1E6-496C-85E8-18CA4804FC70}" srcOrd="0" destOrd="0" presId="urn:microsoft.com/office/officeart/2018/5/layout/IconCircleLabelList"/>
+    <dgm:cxn modelId="{FF38DD25-E79D-492E-9E45-593A5C717BDE}" type="presParOf" srcId="{050666FF-75AD-46EA-89BA-575F8F9E9F57}" destId="{FBEF400F-CE56-46C6-8FDA-0E9950748591}" srcOrd="1" destOrd="0" presId="urn:microsoft.com/office/officeart/2018/5/layout/IconCircleLabelList"/>
+    <dgm:cxn modelId="{7D49AAEA-0EFD-471F-B21E-155CE1083C40}" type="presParOf" srcId="{050666FF-75AD-46EA-89BA-575F8F9E9F57}" destId="{BB2A34F7-0A3B-4EE3-B70A-99305690E1BE}" srcOrd="2" destOrd="0" presId="urn:microsoft.com/office/officeart/2018/5/layout/IconCircleLabelList"/>
+    <dgm:cxn modelId="{B6E02EA3-E5CC-4133-9BC1-75ADECF3B45D}" type="presParOf" srcId="{050666FF-75AD-46EA-89BA-575F8F9E9F57}" destId="{3A1FEE47-58ED-481B-8886-E400AE3AB942}" srcOrd="3" destOrd="0" presId="urn:microsoft.com/office/officeart/2018/5/layout/IconCircleLabelList"/>
+    <dgm:cxn modelId="{CC562CEE-13BB-4294-85A3-007E65C47F04}" type="presParOf" srcId="{3B0860C2-D0F4-4612-B164-5D28E3AD1D7F}" destId="{925A192B-371F-4944-9417-D079F6C1DF90}" srcOrd="1" destOrd="0" presId="urn:microsoft.com/office/officeart/2018/5/layout/IconCircleLabelList"/>
+    <dgm:cxn modelId="{7795E4DB-7F75-4AAF-BBCB-150A1CB3D6F9}" type="presParOf" srcId="{3B0860C2-D0F4-4612-B164-5D28E3AD1D7F}" destId="{B11F9863-1A64-4AEB-AEAD-E18413F3AFF4}" srcOrd="2" destOrd="0" presId="urn:microsoft.com/office/officeart/2018/5/layout/IconCircleLabelList"/>
+    <dgm:cxn modelId="{0D104AAD-6E6E-42CE-88E2-E9C2632ACE2E}" type="presParOf" srcId="{B11F9863-1A64-4AEB-AEAD-E18413F3AFF4}" destId="{992950E9-2385-4636-9008-CD5FF8DF496A}" srcOrd="0" destOrd="0" presId="urn:microsoft.com/office/officeart/2018/5/layout/IconCircleLabelList"/>
+    <dgm:cxn modelId="{BFA32E31-BF53-4F62-98EC-20E8B44B3A22}" type="presParOf" srcId="{B11F9863-1A64-4AEB-AEAD-E18413F3AFF4}" destId="{8ADB9D8E-BEB3-41DA-A6D2-310110A30014}" srcOrd="1" destOrd="0" presId="urn:microsoft.com/office/officeart/2018/5/layout/IconCircleLabelList"/>
+    <dgm:cxn modelId="{065F90FF-D183-4AB9-9062-D43379564D41}" type="presParOf" srcId="{B11F9863-1A64-4AEB-AEAD-E18413F3AFF4}" destId="{0B5B2A44-EAE9-4620-B559-AC732557E4A0}" srcOrd="2" destOrd="0" presId="urn:microsoft.com/office/officeart/2018/5/layout/IconCircleLabelList"/>
+    <dgm:cxn modelId="{3922B62D-31A6-4FE8-9D57-7B902649DFCE}" type="presParOf" srcId="{B11F9863-1A64-4AEB-AEAD-E18413F3AFF4}" destId="{297EF269-1D09-4423-82F6-473F3B054C09}" srcOrd="3" destOrd="0" presId="urn:microsoft.com/office/officeart/2018/5/layout/IconCircleLabelList"/>
+  </dgm:cxnLst>
+  <dgm:bg/>
+  <dgm:whole/>
+  <dgm:extLst>
+    <a:ext uri="http://schemas.microsoft.com/office/drawing/2008/diagram">
+      <dsp:dataModelExt xmlns:dsp="http://schemas.microsoft.com/office/drawing/2008/diagram" relId="rId6" minVer="http://schemas.openxmlformats.org/drawingml/2006/diagram"/>
+    </a:ext>
+  </dgm:extLst>
+</dgm:dataModel>
+</file>
+
+<file path=ppt/diagrams/data2.xml><?xml version="1.0" encoding="utf-8"?>
 <dgm:dataModel xmlns:dgm="http://schemas.openxmlformats.org/drawingml/2006/diagram" xmlns:a="http://schemas.openxmlformats.org/drawingml/2006/main">
   <dgm:ptLst>
     <dgm:pt modelId="{1D0107FD-77C8-42A1-818A-AB552FCABAC7}" type="doc">
@@ -1976,7 +3157,7 @@
           </a:pPr>
           <a:r>
             <a:rPr lang="en-US" dirty="0"/>
-            <a:t>These technologies are new to the three of us.  Completing a project involving them all is challenging and interesting – regardless of the unoriginal topic.</a:t>
+            <a:t>These technologies re new to the three of us.  Completing a project involving them all is challenging and interesting – regardless of the unoriginal topic.</a:t>
           </a:r>
         </a:p>
       </dgm:t>
@@ -2200,7 +3381,7 @@
 </dgm:dataModel>
 </file>
 
-<file path=ppt/diagrams/data2.xml><?xml version="1.0" encoding="utf-8"?>
+<file path=ppt/diagrams/data3.xml><?xml version="1.0" encoding="utf-8"?>
 <dgm:dataModel xmlns:dgm="http://schemas.openxmlformats.org/drawingml/2006/diagram" xmlns:a="http://schemas.openxmlformats.org/drawingml/2006/main">
   <dgm:ptLst>
     <dgm:pt modelId="{BA876136-0C15-4DA6-B7F3-E3283AB2C719}" type="doc">
@@ -2420,7 +3601,7 @@
       <dgm:spPr/>
     </dgm:pt>
     <dgm:pt modelId="{82C8596F-96C7-4F30-9F6C-C71C5954EC2A}" type="pres">
-      <dgm:prSet presAssocID="{58D22F6A-59BF-40ED-914E-7D4B96D41FED}" presName="parTx" presStyleLbl="revTx" presStyleIdx="0" presStyleCnt="4" custAng="0" custLinFactY="-5225" custLinFactNeighborX="1476" custLinFactNeighborY="-100000">
+      <dgm:prSet presAssocID="{58D22F6A-59BF-40ED-914E-7D4B96D41FED}" presName="parTx" presStyleLbl="revTx" presStyleIdx="0" presStyleCnt="4" custAng="0" custLinFactY="-13014" custLinFactNeighborX="-4501" custLinFactNeighborY="-100000">
         <dgm:presLayoutVars>
           <dgm:chMax val="0"/>
           <dgm:chPref val="0"/>
@@ -2447,7 +3628,7 @@
       <dgm:spPr/>
     </dgm:pt>
     <dgm:pt modelId="{CE52A116-F7D3-4A95-A497-94687AEFE950}" type="pres">
-      <dgm:prSet presAssocID="{D5092FE7-65BD-44F0-BE84-EE2FB79D62FF}" presName="iconRect" presStyleLbl="node1" presStyleIdx="1" presStyleCnt="2" custLinFactX="3440" custLinFactNeighborX="100000" custLinFactNeighborY="-17702"/>
+      <dgm:prSet presAssocID="{D5092FE7-65BD-44F0-BE84-EE2FB79D62FF}" presName="iconRect" presStyleLbl="node1" presStyleIdx="1" presStyleCnt="2" custLinFactX="4160" custLinFactNeighborX="100000" custLinFactNeighborY="-30552"/>
       <dgm:spPr>
         <a:blipFill>
           <a:blip xmlns:r="http://schemas.openxmlformats.org/officeDocument/2006/relationships" r:embed="rId3">
@@ -2477,7 +3658,7 @@
       <dgm:spPr/>
     </dgm:pt>
     <dgm:pt modelId="{3B1B8C72-C876-4811-B55B-53EB31E4EF8C}" type="pres">
-      <dgm:prSet presAssocID="{D5092FE7-65BD-44F0-BE84-EE2FB79D62FF}" presName="parTx" presStyleLbl="revTx" presStyleIdx="2" presStyleCnt="4" custLinFactNeighborX="2783" custLinFactNeighborY="-97443">
+      <dgm:prSet presAssocID="{D5092FE7-65BD-44F0-BE84-EE2FB79D62FF}" presName="parTx" presStyleLbl="revTx" presStyleIdx="2" presStyleCnt="4" custLinFactY="-21052" custLinFactNeighborX="3221" custLinFactNeighborY="-100000">
         <dgm:presLayoutVars>
           <dgm:chMax val="0"/>
           <dgm:chPref val="0"/>
@@ -2531,6 +3712,354 @@
 </file>
 
 <file path=ppt/diagrams/drawing1.xml><?xml version="1.0" encoding="utf-8"?>
+<dsp:drawing xmlns:dgm="http://schemas.openxmlformats.org/drawingml/2006/diagram" xmlns:dsp="http://schemas.microsoft.com/office/drawing/2008/diagram" xmlns:a="http://schemas.openxmlformats.org/drawingml/2006/main">
+  <dsp:spTree>
+    <dsp:nvGrpSpPr>
+      <dsp:cNvPr id="0" name=""/>
+      <dsp:cNvGrpSpPr/>
+    </dsp:nvGrpSpPr>
+    <dsp:grpSpPr/>
+    <dsp:sp modelId="{7B3209E0-E1E6-496C-85E8-18CA4804FC70}">
+      <dsp:nvSpPr>
+        <dsp:cNvPr id="0" name=""/>
+        <dsp:cNvSpPr/>
+      </dsp:nvSpPr>
+      <dsp:spPr>
+        <a:xfrm>
+          <a:off x="2040228" y="467711"/>
+          <a:ext cx="2196000" cy="2196000"/>
+        </a:xfrm>
+        <a:prstGeom prst="ellipse">
+          <a:avLst/>
+        </a:prstGeom>
+        <a:solidFill>
+          <a:schemeClr val="bg1">
+            <a:lumMod val="95000"/>
+            <a:hueOff val="0"/>
+            <a:satOff val="0"/>
+            <a:lumOff val="0"/>
+            <a:alphaOff val="0"/>
+          </a:schemeClr>
+        </a:solidFill>
+        <a:ln>
+          <a:noFill/>
+        </a:ln>
+        <a:effectLst/>
+      </dsp:spPr>
+      <dsp:style>
+        <a:lnRef idx="0">
+          <a:scrgbClr r="0" g="0" b="0"/>
+        </a:lnRef>
+        <a:fillRef idx="1">
+          <a:scrgbClr r="0" g="0" b="0"/>
+        </a:fillRef>
+        <a:effectRef idx="0">
+          <a:scrgbClr r="0" g="0" b="0"/>
+        </a:effectRef>
+        <a:fontRef idx="minor"/>
+      </dsp:style>
+    </dsp:sp>
+    <dsp:sp modelId="{FBEF400F-CE56-46C6-8FDA-0E9950748591}">
+      <dsp:nvSpPr>
+        <dsp:cNvPr id="0" name=""/>
+        <dsp:cNvSpPr/>
+      </dsp:nvSpPr>
+      <dsp:spPr>
+        <a:xfrm>
+          <a:off x="2508228" y="935711"/>
+          <a:ext cx="1260000" cy="1260000"/>
+        </a:xfrm>
+        <a:prstGeom prst="rect">
+          <a:avLst/>
+        </a:prstGeom>
+        <a:blipFill>
+          <a:blip xmlns:r="http://schemas.openxmlformats.org/officeDocument/2006/relationships" r:embed="rId1">
+            <a:extLst>
+              <a:ext uri="{96DAC541-7B7A-43D3-8B79-37D633B846F1}">
+                <asvg:svgBlip xmlns:asvg="http://schemas.microsoft.com/office/drawing/2016/SVG/main" r:embed="rId2"/>
+              </a:ext>
+            </a:extLst>
+          </a:blip>
+          <a:srcRect/>
+          <a:stretch>
+            <a:fillRect/>
+          </a:stretch>
+        </a:blipFill>
+        <a:ln w="12700" cap="flat" cmpd="sng" algn="ctr">
+          <a:noFill/>
+          <a:prstDash val="solid"/>
+          <a:miter lim="800000"/>
+        </a:ln>
+        <a:effectLst/>
+      </dsp:spPr>
+      <dsp:style>
+        <a:lnRef idx="2">
+          <a:scrgbClr r="0" g="0" b="0"/>
+        </a:lnRef>
+        <a:fillRef idx="1">
+          <a:scrgbClr r="0" g="0" b="0"/>
+        </a:fillRef>
+        <a:effectRef idx="0">
+          <a:scrgbClr r="0" g="0" b="0"/>
+        </a:effectRef>
+        <a:fontRef idx="minor">
+          <a:schemeClr val="lt1"/>
+        </a:fontRef>
+      </dsp:style>
+    </dsp:sp>
+    <dsp:sp modelId="{3A1FEE47-58ED-481B-8886-E400AE3AB942}">
+      <dsp:nvSpPr>
+        <dsp:cNvPr id="0" name=""/>
+        <dsp:cNvSpPr/>
+      </dsp:nvSpPr>
+      <dsp:spPr>
+        <a:xfrm>
+          <a:off x="1338228" y="3347712"/>
+          <a:ext cx="3600000" cy="720000"/>
+        </a:xfrm>
+        <a:prstGeom prst="rect">
+          <a:avLst/>
+        </a:prstGeom>
+        <a:noFill/>
+        <a:ln>
+          <a:noFill/>
+        </a:ln>
+        <a:effectLst/>
+      </dsp:spPr>
+      <dsp:style>
+        <a:lnRef idx="0">
+          <a:scrgbClr r="0" g="0" b="0"/>
+        </a:lnRef>
+        <a:fillRef idx="0">
+          <a:scrgbClr r="0" g="0" b="0"/>
+        </a:fillRef>
+        <a:effectRef idx="0">
+          <a:scrgbClr r="0" g="0" b="0"/>
+        </a:effectRef>
+        <a:fontRef idx="minor"/>
+      </dsp:style>
+      <dsp:txBody>
+        <a:bodyPr spcFirstLastPara="0" vert="horz" wrap="square" lIns="0" tIns="0" rIns="0" bIns="0" numCol="1" spcCol="1270" anchor="t" anchorCtr="0">
+          <a:noAutofit/>
+        </a:bodyPr>
+        <a:lstStyle/>
+        <a:p>
+          <a:pPr marL="0" lvl="0" indent="0" algn="ctr" defTabSz="577850">
+            <a:lnSpc>
+              <a:spcPct val="100000"/>
+            </a:lnSpc>
+            <a:spcBef>
+              <a:spcPct val="0"/>
+            </a:spcBef>
+            <a:spcAft>
+              <a:spcPct val="35000"/>
+            </a:spcAft>
+            <a:buNone/>
+            <a:defRPr cap="all"/>
+          </a:pPr>
+          <a:r>
+            <a:rPr lang="en-US" sz="1300" kern="1200" dirty="0"/>
+            <a:t>Problem: </a:t>
+          </a:r>
+        </a:p>
+        <a:p>
+          <a:pPr marL="0" lvl="0" indent="0" algn="ctr" defTabSz="577850">
+            <a:lnSpc>
+              <a:spcPct val="100000"/>
+            </a:lnSpc>
+            <a:spcBef>
+              <a:spcPct val="0"/>
+            </a:spcBef>
+            <a:spcAft>
+              <a:spcPct val="35000"/>
+            </a:spcAft>
+            <a:buNone/>
+            <a:defRPr cap="all"/>
+          </a:pPr>
+          <a:r>
+            <a:rPr lang="en-US" sz="1300" kern="1200" dirty="0"/>
+            <a:t>Craigslist is the leading private party auto Sales platform but leaves a lot to be desired</a:t>
+          </a:r>
+        </a:p>
+      </dsp:txBody>
+      <dsp:txXfrm>
+        <a:off x="1338228" y="3347712"/>
+        <a:ext cx="3600000" cy="720000"/>
+      </dsp:txXfrm>
+    </dsp:sp>
+    <dsp:sp modelId="{992950E9-2385-4636-9008-CD5FF8DF496A}">
+      <dsp:nvSpPr>
+        <dsp:cNvPr id="0" name=""/>
+        <dsp:cNvSpPr/>
+      </dsp:nvSpPr>
+      <dsp:spPr>
+        <a:xfrm>
+          <a:off x="6270228" y="467711"/>
+          <a:ext cx="2196000" cy="2196000"/>
+        </a:xfrm>
+        <a:prstGeom prst="ellipse">
+          <a:avLst/>
+        </a:prstGeom>
+        <a:solidFill>
+          <a:schemeClr val="bg1">
+            <a:lumMod val="95000"/>
+            <a:hueOff val="0"/>
+            <a:satOff val="0"/>
+            <a:lumOff val="0"/>
+            <a:alphaOff val="0"/>
+          </a:schemeClr>
+        </a:solidFill>
+        <a:ln>
+          <a:noFill/>
+        </a:ln>
+        <a:effectLst/>
+      </dsp:spPr>
+      <dsp:style>
+        <a:lnRef idx="0">
+          <a:scrgbClr r="0" g="0" b="0"/>
+        </a:lnRef>
+        <a:fillRef idx="1">
+          <a:scrgbClr r="0" g="0" b="0"/>
+        </a:fillRef>
+        <a:effectRef idx="0">
+          <a:scrgbClr r="0" g="0" b="0"/>
+        </a:effectRef>
+        <a:fontRef idx="minor"/>
+      </dsp:style>
+    </dsp:sp>
+    <dsp:sp modelId="{8ADB9D8E-BEB3-41DA-A6D2-310110A30014}">
+      <dsp:nvSpPr>
+        <dsp:cNvPr id="0" name=""/>
+        <dsp:cNvSpPr/>
+      </dsp:nvSpPr>
+      <dsp:spPr>
+        <a:xfrm flipH="1">
+          <a:off x="6738228" y="935711"/>
+          <a:ext cx="1260000" cy="1260000"/>
+        </a:xfrm>
+        <a:prstGeom prst="rect">
+          <a:avLst/>
+        </a:prstGeom>
+        <a:blipFill>
+          <a:blip xmlns:r="http://schemas.openxmlformats.org/officeDocument/2006/relationships" r:embed="rId3">
+            <a:extLst>
+              <a:ext uri="{96DAC541-7B7A-43D3-8B79-37D633B846F1}">
+                <asvg:svgBlip xmlns:asvg="http://schemas.microsoft.com/office/drawing/2016/SVG/main" r:embed="rId4"/>
+              </a:ext>
+            </a:extLst>
+          </a:blip>
+          <a:srcRect/>
+          <a:stretch>
+            <a:fillRect/>
+          </a:stretch>
+        </a:blipFill>
+        <a:ln w="12700" cap="flat" cmpd="sng" algn="ctr">
+          <a:noFill/>
+          <a:prstDash val="solid"/>
+          <a:miter lim="800000"/>
+        </a:ln>
+        <a:effectLst/>
+      </dsp:spPr>
+      <dsp:style>
+        <a:lnRef idx="2">
+          <a:scrgbClr r="0" g="0" b="0"/>
+        </a:lnRef>
+        <a:fillRef idx="1">
+          <a:scrgbClr r="0" g="0" b="0"/>
+        </a:fillRef>
+        <a:effectRef idx="0">
+          <a:scrgbClr r="0" g="0" b="0"/>
+        </a:effectRef>
+        <a:fontRef idx="minor">
+          <a:schemeClr val="lt1"/>
+        </a:fontRef>
+      </dsp:style>
+    </dsp:sp>
+    <dsp:sp modelId="{297EF269-1D09-4423-82F6-473F3B054C09}">
+      <dsp:nvSpPr>
+        <dsp:cNvPr id="0" name=""/>
+        <dsp:cNvSpPr/>
+      </dsp:nvSpPr>
+      <dsp:spPr>
+        <a:xfrm>
+          <a:off x="5568228" y="3347712"/>
+          <a:ext cx="3600000" cy="720000"/>
+        </a:xfrm>
+        <a:prstGeom prst="rect">
+          <a:avLst/>
+        </a:prstGeom>
+        <a:noFill/>
+        <a:ln>
+          <a:noFill/>
+        </a:ln>
+        <a:effectLst/>
+      </dsp:spPr>
+      <dsp:style>
+        <a:lnRef idx="0">
+          <a:scrgbClr r="0" g="0" b="0"/>
+        </a:lnRef>
+        <a:fillRef idx="0">
+          <a:scrgbClr r="0" g="0" b="0"/>
+        </a:fillRef>
+        <a:effectRef idx="0">
+          <a:scrgbClr r="0" g="0" b="0"/>
+        </a:effectRef>
+        <a:fontRef idx="minor"/>
+      </dsp:style>
+      <dsp:txBody>
+        <a:bodyPr spcFirstLastPara="0" vert="horz" wrap="square" lIns="0" tIns="0" rIns="0" bIns="0" numCol="1" spcCol="1270" anchor="t" anchorCtr="0">
+          <a:noAutofit/>
+        </a:bodyPr>
+        <a:lstStyle/>
+        <a:p>
+          <a:pPr marL="0" lvl="0" indent="0" algn="ctr" defTabSz="577850">
+            <a:lnSpc>
+              <a:spcPct val="100000"/>
+            </a:lnSpc>
+            <a:spcBef>
+              <a:spcPct val="0"/>
+            </a:spcBef>
+            <a:spcAft>
+              <a:spcPct val="35000"/>
+            </a:spcAft>
+            <a:buNone/>
+            <a:defRPr cap="all"/>
+          </a:pPr>
+          <a:r>
+            <a:rPr lang="en-US" sz="1300" kern="1200" dirty="0"/>
+            <a:t>Solution: </a:t>
+          </a:r>
+        </a:p>
+        <a:p>
+          <a:pPr marL="0" lvl="0" indent="0" algn="ctr" defTabSz="577850">
+            <a:lnSpc>
+              <a:spcPct val="100000"/>
+            </a:lnSpc>
+            <a:spcBef>
+              <a:spcPct val="0"/>
+            </a:spcBef>
+            <a:spcAft>
+              <a:spcPct val="35000"/>
+            </a:spcAft>
+            <a:buNone/>
+            <a:defRPr cap="all"/>
+          </a:pPr>
+          <a:r>
+            <a:rPr lang="en-US" sz="1300" kern="1200" dirty="0"/>
+            <a:t>Modern application for private party auto Sales &amp; Purchases</a:t>
+          </a:r>
+        </a:p>
+      </dsp:txBody>
+      <dsp:txXfrm>
+        <a:off x="5568228" y="3347712"/>
+        <a:ext cx="3600000" cy="720000"/>
+      </dsp:txXfrm>
+    </dsp:sp>
+  </dsp:spTree>
+</dsp:drawing>
+</file>
+
+<file path=ppt/diagrams/drawing2.xml><?xml version="1.0" encoding="utf-8"?>
 <dsp:drawing xmlns:dgm="http://schemas.openxmlformats.org/drawingml/2006/diagram" xmlns:dsp="http://schemas.microsoft.com/office/drawing/2008/diagram" xmlns:a="http://schemas.openxmlformats.org/drawingml/2006/main">
   <dsp:spTree>
     <dsp:nvGrpSpPr>
@@ -3035,7 +4564,7 @@
           </a:pPr>
           <a:r>
             <a:rPr lang="en-US" sz="1100" kern="1200" dirty="0"/>
-            <a:t>These technologies are new to the three of us.  Completing a project involving them all is challenging and interesting – regardless of the unoriginal topic.</a:t>
+            <a:t>These technologies re new to the three of us.  Completing a project involving them all is challenging and interesting – regardless of the unoriginal topic.</a:t>
           </a:r>
         </a:p>
       </dsp:txBody>
@@ -3048,7 +4577,7 @@
 </dsp:drawing>
 </file>
 
-<file path=ppt/diagrams/drawing2.xml><?xml version="1.0" encoding="utf-8"?>
+<file path=ppt/diagrams/drawing3.xml><?xml version="1.0" encoding="utf-8"?>
 <dsp:drawing xmlns:dgm="http://schemas.openxmlformats.org/drawingml/2006/diagram" xmlns:dsp="http://schemas.microsoft.com/office/drawing/2008/diagram" xmlns:a="http://schemas.openxmlformats.org/drawingml/2006/main">
   <dsp:spTree>
     <dsp:nvGrpSpPr>
@@ -3113,7 +4642,7 @@
       </dsp:nvSpPr>
       <dsp:spPr>
         <a:xfrm>
-          <a:off x="623563" y="1792866"/>
+          <a:off x="365356" y="1742393"/>
           <a:ext cx="4320000" cy="648000"/>
         </a:xfrm>
         <a:prstGeom prst="rect">
@@ -3163,7 +4692,7 @@
         </a:p>
       </dsp:txBody>
       <dsp:txXfrm>
-        <a:off x="623563" y="1792866"/>
+        <a:off x="365356" y="1742393"/>
         <a:ext cx="4320000" cy="648000"/>
       </dsp:txXfrm>
     </dsp:sp>
@@ -3231,7 +4760,7 @@
       </dsp:nvSpPr>
       <dsp:spPr>
         <a:xfrm>
-          <a:off x="7199812" y="580941"/>
+          <a:off x="7210699" y="386649"/>
           <a:ext cx="1512000" cy="1512000"/>
         </a:xfrm>
         <a:prstGeom prst="rect">
@@ -3279,7 +4808,7 @@
       </dsp:nvSpPr>
       <dsp:spPr>
         <a:xfrm>
-          <a:off x="5756025" y="1843293"/>
+          <a:off x="5774947" y="1690307"/>
           <a:ext cx="4320000" cy="648000"/>
         </a:xfrm>
         <a:prstGeom prst="rect">
@@ -3329,7 +4858,7 @@
         </a:p>
       </dsp:txBody>
       <dsp:txXfrm>
-        <a:off x="5756025" y="1843293"/>
+        <a:off x="5774947" y="1690307"/>
         <a:ext cx="4320000" cy="648000"/>
       </dsp:txXfrm>
     </dsp:sp>
@@ -3610,6 +5139,221 @@
 </file>
 
 <file path=ppt/diagrams/layout2.xml><?xml version="1.0" encoding="utf-8"?>
+<dgm:layoutDef xmlns:dgm="http://schemas.openxmlformats.org/drawingml/2006/diagram" xmlns:a="http://schemas.openxmlformats.org/drawingml/2006/main" uniqueId="urn:microsoft.com/office/officeart/2018/5/layout/IconCircleLabelList">
+  <dgm:title val="Icon Circle Label List"/>
+  <dgm:desc val="Use to show non-sequential or grouped chunks of information accompanied by a related visuals. Works best with icons or small pictures with short text captions."/>
+  <dgm:catLst>
+    <dgm:cat type="icon" pri="500"/>
+  </dgm:catLst>
+  <dgm:sampData useDef="1">
+    <dgm:dataModel>
+      <dgm:ptLst/>
+      <dgm:bg/>
+      <dgm:whole/>
+    </dgm:dataModel>
+  </dgm:sampData>
+  <dgm:styleData useDef="1">
+    <dgm:dataModel>
+      <dgm:ptLst/>
+      <dgm:bg/>
+      <dgm:whole/>
+    </dgm:dataModel>
+  </dgm:styleData>
+  <dgm:clrData useDef="1">
+    <dgm:dataModel>
+      <dgm:ptLst/>
+      <dgm:bg/>
+      <dgm:whole/>
+    </dgm:dataModel>
+  </dgm:clrData>
+  <dgm:layoutNode name="root">
+    <dgm:varLst>
+      <dgm:dir/>
+      <dgm:resizeHandles val="exact"/>
+    </dgm:varLst>
+    <dgm:choose name="Name0">
+      <dgm:if name="Name1" axis="self" func="var" arg="dir" op="equ" val="norm">
+        <dgm:alg type="snake">
+          <dgm:param type="grDir" val="tL"/>
+          <dgm:param type="flowDir" val="row"/>
+          <dgm:param type="contDir" val="sameDir"/>
+          <dgm:param type="off" val="ctr"/>
+          <dgm:param type="vertAlign" val="mid"/>
+          <dgm:param type="horzAlign" val="ctr"/>
+        </dgm:alg>
+      </dgm:if>
+      <dgm:else name="Name2">
+        <dgm:alg type="snake">
+          <dgm:param type="grDir" val="tR"/>
+          <dgm:param type="flowDir" val="row"/>
+          <dgm:param type="contDir" val="sameDir"/>
+          <dgm:param type="off" val="ctr"/>
+          <dgm:param type="vertAlign" val="mid"/>
+          <dgm:param type="horzAlign" val="ctr"/>
+        </dgm:alg>
+      </dgm:else>
+    </dgm:choose>
+    <dgm:shape xmlns:r="http://schemas.openxmlformats.org/officeDocument/2006/relationships" r:blip="">
+      <dgm:adjLst/>
+    </dgm:shape>
+    <dgm:presOf/>
+    <dgm:choose name="Name3">
+      <dgm:if name="Name4" axis="ch" ptType="node" func="cnt" op="lte" val="2">
+        <dgm:constrLst>
+          <dgm:constr type="h" for="ch" forName="compNode" refType="h" fact="0.4"/>
+          <dgm:constr type="w" for="ch" forName="compNode" val="100"/>
+          <dgm:constr type="w" for="ch" forName="sibTrans" refType="w" refFor="ch" refForName="compNode" fact="0.175"/>
+          <dgm:constr type="sp" refType="w" refFor="ch" refForName="compNode" op="equ" fact="0.25"/>
+          <dgm:constr type="primFontSz" for="des" ptType="node" op="equ" val="44"/>
+          <dgm:constr type="h" for="des" forName="compNode" op="equ"/>
+          <dgm:constr type="h" for="des" forName="textRect" op="equ"/>
+        </dgm:constrLst>
+      </dgm:if>
+      <dgm:if name="Name5" axis="ch" ptType="node" func="cnt" op="lte" val="3">
+        <dgm:constrLst>
+          <dgm:constr type="h" for="ch" forName="compNode" refType="h" fact="0.4"/>
+          <dgm:constr type="w" for="ch" forName="compNode" val="100"/>
+          <dgm:constr type="w" for="ch" forName="sibTrans" refType="w" refFor="ch" refForName="compNode" fact="0.175"/>
+          <dgm:constr type="sp" refType="w" refFor="ch" refForName="compNode" op="equ" fact="0.25"/>
+          <dgm:constr type="primFontSz" for="des" ptType="node" op="equ" val="40"/>
+          <dgm:constr type="h" for="des" forName="compNode" op="equ"/>
+          <dgm:constr type="h" for="des" forName="textRect" op="equ"/>
+        </dgm:constrLst>
+      </dgm:if>
+      <dgm:if name="Name6" axis="ch" ptType="node" func="cnt" op="lte" val="4">
+        <dgm:constrLst>
+          <dgm:constr type="h" for="ch" forName="compNode" refType="h" fact="0.4"/>
+          <dgm:constr type="w" for="ch" forName="compNode" refType="w"/>
+          <dgm:constr type="w" for="ch" forName="sibTrans" refType="w" refFor="ch" refForName="compNode" fact="0.175"/>
+          <dgm:constr type="sp" refType="w" refFor="ch" refForName="compNode" op="equ" fact="0.25"/>
+          <dgm:constr type="primFontSz" for="des" ptType="node" op="equ" val="32"/>
+          <dgm:constr type="h" for="des" forName="compNode" op="equ"/>
+          <dgm:constr type="h" for="des" forName="textRect" op="equ"/>
+        </dgm:constrLst>
+      </dgm:if>
+      <dgm:else name="Name7">
+        <dgm:constrLst>
+          <dgm:constr type="h" for="ch" forName="compNode" refType="h" fact="0.4"/>
+          <dgm:constr type="w" for="ch" forName="compNode" refType="w"/>
+          <dgm:constr type="w" for="ch" forName="sibTrans" refType="w" refFor="ch" refForName="compNode" fact="0.175"/>
+          <dgm:constr type="sp" refType="w" refFor="ch" refForName="compNode" op="equ" fact="0.25"/>
+          <dgm:constr type="primFontSz" for="des" ptType="node" op="equ" val="24"/>
+          <dgm:constr type="h" for="des" forName="compNode" op="equ"/>
+          <dgm:constr type="h" for="des" forName="textRect" op="equ"/>
+        </dgm:constrLst>
+      </dgm:else>
+    </dgm:choose>
+    <dgm:ruleLst>
+      <dgm:rule type="w" for="ch" forName="compNode" val="50" fact="NaN" max="NaN"/>
+    </dgm:ruleLst>
+    <dgm:forEach name="Name8" axis="ch" ptType="node">
+      <dgm:layoutNode name="compNode">
+        <dgm:alg type="composite"/>
+        <dgm:shape xmlns:r="http://schemas.openxmlformats.org/officeDocument/2006/relationships" r:blip="">
+          <dgm:adjLst/>
+        </dgm:shape>
+        <dgm:presOf axis="self"/>
+        <dgm:constrLst>
+          <dgm:constr type="w" for="ch" forName="iconBgRect" refType="w" fact="0.61"/>
+          <dgm:constr type="h" for="ch" forName="iconBgRect" refType="w" refFor="ch" refForName="iconBgRect"/>
+          <dgm:constr type="t" for="ch" forName="iconBgRect"/>
+          <dgm:constr type="ctrX" for="ch" forName="iconBgRect" refType="w" fact="0.5"/>
+          <dgm:constr type="w" for="ch" forName="iconRect" refType="w" fact="0.35"/>
+          <dgm:constr type="h" for="ch" forName="iconRect" refType="w" refFor="ch" refForName="iconRect"/>
+          <dgm:constr type="ctrX" for="ch" forName="iconRect" refType="ctrX" refFor="ch" refForName="iconBgRect"/>
+          <dgm:constr type="ctrY" for="ch" forName="iconRect" refType="ctrY" refFor="ch" refForName="iconBgRect"/>
+          <dgm:constr type="h" for="ch" forName="spaceRect" refType="w" fact="0.19"/>
+          <dgm:constr type="w" for="ch" forName="spaceRect" refType="w"/>
+          <dgm:constr type="l" for="ch" forName="spaceRect"/>
+          <dgm:constr type="t" for="ch" forName="spaceRect" refType="b" refFor="ch" refForName="iconBgRect"/>
+          <dgm:constr type="h" for="ch" forName="textRect" val="20"/>
+          <dgm:constr type="w" for="ch" forName="textRect" refType="w"/>
+          <dgm:constr type="l" for="ch" forName="textRect"/>
+          <dgm:constr type="t" for="ch" forName="textRect" refType="b" refFor="ch" refForName="spaceRect"/>
+        </dgm:constrLst>
+        <dgm:ruleLst>
+          <dgm:rule type="h" val="INF" fact="NaN" max="NaN"/>
+        </dgm:ruleLst>
+        <dgm:layoutNode name="iconBgRect" styleLbl="bgShp">
+          <dgm:alg type="sp"/>
+          <dgm:shape xmlns:r="http://schemas.openxmlformats.org/officeDocument/2006/relationships" type="ellipse" r:blip="">
+            <dgm:adjLst/>
+          </dgm:shape>
+          <dgm:presOf/>
+          <dgm:constrLst/>
+          <dgm:ruleLst/>
+        </dgm:layoutNode>
+        <dgm:layoutNode name="iconRect" styleLbl="node1">
+          <dgm:alg type="sp"/>
+          <dgm:shape xmlns:r="http://schemas.openxmlformats.org/officeDocument/2006/relationships" type="rect" r:blip="" blipPhldr="1">
+            <dgm:adjLst/>
+          </dgm:shape>
+          <dgm:presOf/>
+          <dgm:constrLst/>
+          <dgm:ruleLst/>
+        </dgm:layoutNode>
+        <dgm:layoutNode name="spaceRect">
+          <dgm:alg type="sp"/>
+          <dgm:shape xmlns:r="http://schemas.openxmlformats.org/officeDocument/2006/relationships" r:blip="">
+            <dgm:adjLst/>
+          </dgm:shape>
+          <dgm:presOf/>
+          <dgm:constrLst/>
+          <dgm:ruleLst/>
+        </dgm:layoutNode>
+        <dgm:layoutNode name="textRect" styleLbl="revTx">
+          <dgm:varLst>
+            <dgm:chMax val="1"/>
+            <dgm:chPref val="1"/>
+          </dgm:varLst>
+          <dgm:alg type="tx">
+            <dgm:param type="txAnchorVert" val="t"/>
+          </dgm:alg>
+          <dgm:shape xmlns:r="http://schemas.openxmlformats.org/officeDocument/2006/relationships" type="rect" r:blip="">
+            <dgm:adjLst/>
+          </dgm:shape>
+          <dgm:presOf axis="self" ptType="node"/>
+          <dgm:constrLst>
+            <dgm:constr type="lMarg"/>
+            <dgm:constr type="rMarg"/>
+            <dgm:constr type="tMarg"/>
+            <dgm:constr type="bMarg"/>
+          </dgm:constrLst>
+          <dgm:ruleLst>
+            <dgm:rule type="primFontSz" val="11" fact="NaN" max="NaN"/>
+            <dgm:rule type="h" val="INF" fact="NaN" max="NaN"/>
+          </dgm:ruleLst>
+        </dgm:layoutNode>
+      </dgm:layoutNode>
+      <dgm:forEach name="Name9" axis="followSib" ptType="sibTrans" cnt="1">
+        <dgm:layoutNode name="sibTrans">
+          <dgm:alg type="sp"/>
+          <dgm:shape xmlns:r="http://schemas.openxmlformats.org/officeDocument/2006/relationships" r:blip="">
+            <dgm:adjLst/>
+          </dgm:shape>
+          <dgm:presOf axis="self"/>
+          <dgm:constrLst/>
+          <dgm:ruleLst/>
+        </dgm:layoutNode>
+      </dgm:forEach>
+    </dgm:forEach>
+  </dgm:layoutNode>
+  <dgm:extLst>
+    <a:ext uri="{68A01E43-0DF5-4B5B-8FA6-DAF915123BFB}">
+      <dgm1612:lstStyle xmlns:dgm1612="http://schemas.microsoft.com/office/drawing/2016/12/diagram">
+        <a:lvl1pPr>
+          <a:lnSpc>
+            <a:spcPct val="100000"/>
+          </a:lnSpc>
+          <a:defRPr cap="all"/>
+        </a:lvl1pPr>
+      </dgm1612:lstStyle>
+    </a:ext>
+  </dgm:extLst>
+</dgm:layoutDef>
+</file>
+
+<file path=ppt/diagrams/layout3.xml><?xml version="1.0" encoding="utf-8"?>
 <dgm:layoutDef xmlns:dgm="http://schemas.openxmlformats.org/drawingml/2006/diagram" xmlns:a="http://schemas.openxmlformats.org/drawingml/2006/main" uniqueId="urn:microsoft.com/office/officeart/2018/2/layout/IconLabelDescriptionList">
   <dgm:title val="Icon Label Description List"/>
   <dgm:desc val="Use to show non-sequential or grouped chunks of information. The placeholder holds an icon or small picture, and corresponding text boxes show Level 1 and Level 2 text respectively. Works well for minimal Level 1 text accompanied by lengthier Level two text."/>
@@ -5886,6 +7630,1040 @@
 </dgm:styleDef>
 </file>
 
+<file path=ppt/diagrams/quickStyle3.xml><?xml version="1.0" encoding="utf-8"?>
+<dgm:styleDef xmlns:dgm="http://schemas.openxmlformats.org/drawingml/2006/diagram" xmlns:a="http://schemas.openxmlformats.org/drawingml/2006/main" uniqueId="urn:microsoft.com/office/officeart/2005/8/quickstyle/simple1">
+  <dgm:title val=""/>
+  <dgm:desc val=""/>
+  <dgm:catLst>
+    <dgm:cat type="simple" pri="10100"/>
+  </dgm:catLst>
+  <dgm:scene3d>
+    <a:camera prst="orthographicFront"/>
+    <a:lightRig rig="threePt" dir="t"/>
+  </dgm:scene3d>
+  <dgm:styleLbl name="node0">
+    <dgm:scene3d>
+      <a:camera prst="orthographicFront"/>
+      <a:lightRig rig="threePt" dir="t"/>
+    </dgm:scene3d>
+    <dgm:sp3d/>
+    <dgm:txPr/>
+    <dgm:style>
+      <a:lnRef idx="2">
+        <a:scrgbClr r="0" g="0" b="0"/>
+      </a:lnRef>
+      <a:fillRef idx="1">
+        <a:scrgbClr r="0" g="0" b="0"/>
+      </a:fillRef>
+      <a:effectRef idx="0">
+        <a:scrgbClr r="0" g="0" b="0"/>
+      </a:effectRef>
+      <a:fontRef idx="minor">
+        <a:schemeClr val="lt1"/>
+      </a:fontRef>
+    </dgm:style>
+  </dgm:styleLbl>
+  <dgm:styleLbl name="lnNode1">
+    <dgm:scene3d>
+      <a:camera prst="orthographicFront"/>
+      <a:lightRig rig="threePt" dir="t"/>
+    </dgm:scene3d>
+    <dgm:sp3d/>
+    <dgm:txPr/>
+    <dgm:style>
+      <a:lnRef idx="2">
+        <a:scrgbClr r="0" g="0" b="0"/>
+      </a:lnRef>
+      <a:fillRef idx="1">
+        <a:scrgbClr r="0" g="0" b="0"/>
+      </a:fillRef>
+      <a:effectRef idx="0">
+        <a:scrgbClr r="0" g="0" b="0"/>
+      </a:effectRef>
+      <a:fontRef idx="minor">
+        <a:schemeClr val="lt1"/>
+      </a:fontRef>
+    </dgm:style>
+  </dgm:styleLbl>
+  <dgm:styleLbl name="vennNode1">
+    <dgm:scene3d>
+      <a:camera prst="orthographicFront"/>
+      <a:lightRig rig="threePt" dir="t"/>
+    </dgm:scene3d>
+    <dgm:sp3d/>
+    <dgm:txPr/>
+    <dgm:style>
+      <a:lnRef idx="2">
+        <a:scrgbClr r="0" g="0" b="0"/>
+      </a:lnRef>
+      <a:fillRef idx="1">
+        <a:scrgbClr r="0" g="0" b="0"/>
+      </a:fillRef>
+      <a:effectRef idx="0">
+        <a:scrgbClr r="0" g="0" b="0"/>
+      </a:effectRef>
+      <a:fontRef idx="minor">
+        <a:schemeClr val="tx1"/>
+      </a:fontRef>
+    </dgm:style>
+  </dgm:styleLbl>
+  <dgm:styleLbl name="alignNode1">
+    <dgm:scene3d>
+      <a:camera prst="orthographicFront"/>
+      <a:lightRig rig="threePt" dir="t"/>
+    </dgm:scene3d>
+    <dgm:sp3d/>
+    <dgm:txPr/>
+    <dgm:style>
+      <a:lnRef idx="2">
+        <a:scrgbClr r="0" g="0" b="0"/>
+      </a:lnRef>
+      <a:fillRef idx="1">
+        <a:scrgbClr r="0" g="0" b="0"/>
+      </a:fillRef>
+      <a:effectRef idx="0">
+        <a:scrgbClr r="0" g="0" b="0"/>
+      </a:effectRef>
+      <a:fontRef idx="minor">
+        <a:schemeClr val="lt1"/>
+      </a:fontRef>
+    </dgm:style>
+  </dgm:styleLbl>
+  <dgm:styleLbl name="node1">
+    <dgm:scene3d>
+      <a:camera prst="orthographicFront"/>
+      <a:lightRig rig="threePt" dir="t"/>
+    </dgm:scene3d>
+    <dgm:sp3d/>
+    <dgm:txPr/>
+    <dgm:style>
+      <a:lnRef idx="2">
+        <a:scrgbClr r="0" g="0" b="0"/>
+      </a:lnRef>
+      <a:fillRef idx="1">
+        <a:scrgbClr r="0" g="0" b="0"/>
+      </a:fillRef>
+      <a:effectRef idx="0">
+        <a:scrgbClr r="0" g="0" b="0"/>
+      </a:effectRef>
+      <a:fontRef idx="minor">
+        <a:schemeClr val="lt1"/>
+      </a:fontRef>
+    </dgm:style>
+  </dgm:styleLbl>
+  <dgm:styleLbl name="node2">
+    <dgm:scene3d>
+      <a:camera prst="orthographicFront"/>
+      <a:lightRig rig="threePt" dir="t"/>
+    </dgm:scene3d>
+    <dgm:sp3d/>
+    <dgm:txPr/>
+    <dgm:style>
+      <a:lnRef idx="2">
+        <a:scrgbClr r="0" g="0" b="0"/>
+      </a:lnRef>
+      <a:fillRef idx="1">
+        <a:scrgbClr r="0" g="0" b="0"/>
+      </a:fillRef>
+      <a:effectRef idx="0">
+        <a:scrgbClr r="0" g="0" b="0"/>
+      </a:effectRef>
+      <a:fontRef idx="minor">
+        <a:schemeClr val="lt1"/>
+      </a:fontRef>
+    </dgm:style>
+  </dgm:styleLbl>
+  <dgm:styleLbl name="node3">
+    <dgm:scene3d>
+      <a:camera prst="orthographicFront"/>
+      <a:lightRig rig="threePt" dir="t"/>
+    </dgm:scene3d>
+    <dgm:sp3d/>
+    <dgm:txPr/>
+    <dgm:style>
+      <a:lnRef idx="2">
+        <a:scrgbClr r="0" g="0" b="0"/>
+      </a:lnRef>
+      <a:fillRef idx="1">
+        <a:scrgbClr r="0" g="0" b="0"/>
+      </a:fillRef>
+      <a:effectRef idx="0">
+        <a:scrgbClr r="0" g="0" b="0"/>
+      </a:effectRef>
+      <a:fontRef idx="minor">
+        <a:schemeClr val="lt1"/>
+      </a:fontRef>
+    </dgm:style>
+  </dgm:styleLbl>
+  <dgm:styleLbl name="node4">
+    <dgm:scene3d>
+      <a:camera prst="orthographicFront"/>
+      <a:lightRig rig="threePt" dir="t"/>
+    </dgm:scene3d>
+    <dgm:sp3d/>
+    <dgm:txPr/>
+    <dgm:style>
+      <a:lnRef idx="2">
+        <a:scrgbClr r="0" g="0" b="0"/>
+      </a:lnRef>
+      <a:fillRef idx="1">
+        <a:scrgbClr r="0" g="0" b="0"/>
+      </a:fillRef>
+      <a:effectRef idx="0">
+        <a:scrgbClr r="0" g="0" b="0"/>
+      </a:effectRef>
+      <a:fontRef idx="minor">
+        <a:schemeClr val="lt1"/>
+      </a:fontRef>
+    </dgm:style>
+  </dgm:styleLbl>
+  <dgm:styleLbl name="fgImgPlace1">
+    <dgm:scene3d>
+      <a:camera prst="orthographicFront"/>
+      <a:lightRig rig="threePt" dir="t"/>
+    </dgm:scene3d>
+    <dgm:sp3d/>
+    <dgm:txPr/>
+    <dgm:style>
+      <a:lnRef idx="2">
+        <a:scrgbClr r="0" g="0" b="0"/>
+      </a:lnRef>
+      <a:fillRef idx="1">
+        <a:scrgbClr r="0" g="0" b="0"/>
+      </a:fillRef>
+      <a:effectRef idx="0">
+        <a:scrgbClr r="0" g="0" b="0"/>
+      </a:effectRef>
+      <a:fontRef idx="minor"/>
+    </dgm:style>
+  </dgm:styleLbl>
+  <dgm:styleLbl name="alignImgPlace1">
+    <dgm:scene3d>
+      <a:camera prst="orthographicFront"/>
+      <a:lightRig rig="threePt" dir="t"/>
+    </dgm:scene3d>
+    <dgm:sp3d/>
+    <dgm:txPr/>
+    <dgm:style>
+      <a:lnRef idx="2">
+        <a:scrgbClr r="0" g="0" b="0"/>
+      </a:lnRef>
+      <a:fillRef idx="1">
+        <a:scrgbClr r="0" g="0" b="0"/>
+      </a:fillRef>
+      <a:effectRef idx="0">
+        <a:scrgbClr r="0" g="0" b="0"/>
+      </a:effectRef>
+      <a:fontRef idx="minor"/>
+    </dgm:style>
+  </dgm:styleLbl>
+  <dgm:styleLbl name="bgImgPlace1">
+    <dgm:scene3d>
+      <a:camera prst="orthographicFront"/>
+      <a:lightRig rig="threePt" dir="t"/>
+    </dgm:scene3d>
+    <dgm:sp3d/>
+    <dgm:txPr/>
+    <dgm:style>
+      <a:lnRef idx="2">
+        <a:scrgbClr r="0" g="0" b="0"/>
+      </a:lnRef>
+      <a:fillRef idx="1">
+        <a:scrgbClr r="0" g="0" b="0"/>
+      </a:fillRef>
+      <a:effectRef idx="0">
+        <a:scrgbClr r="0" g="0" b="0"/>
+      </a:effectRef>
+      <a:fontRef idx="minor"/>
+    </dgm:style>
+  </dgm:styleLbl>
+  <dgm:styleLbl name="sibTrans2D1">
+    <dgm:scene3d>
+      <a:camera prst="orthographicFront"/>
+      <a:lightRig rig="threePt" dir="t"/>
+    </dgm:scene3d>
+    <dgm:sp3d/>
+    <dgm:txPr/>
+    <dgm:style>
+      <a:lnRef idx="0">
+        <a:scrgbClr r="0" g="0" b="0"/>
+      </a:lnRef>
+      <a:fillRef idx="1">
+        <a:scrgbClr r="0" g="0" b="0"/>
+      </a:fillRef>
+      <a:effectRef idx="0">
+        <a:scrgbClr r="0" g="0" b="0"/>
+      </a:effectRef>
+      <a:fontRef idx="minor">
+        <a:schemeClr val="lt1"/>
+      </a:fontRef>
+    </dgm:style>
+  </dgm:styleLbl>
+  <dgm:styleLbl name="fgSibTrans2D1">
+    <dgm:scene3d>
+      <a:camera prst="orthographicFront"/>
+      <a:lightRig rig="threePt" dir="t"/>
+    </dgm:scene3d>
+    <dgm:sp3d/>
+    <dgm:txPr/>
+    <dgm:style>
+      <a:lnRef idx="0">
+        <a:scrgbClr r="0" g="0" b="0"/>
+      </a:lnRef>
+      <a:fillRef idx="1">
+        <a:scrgbClr r="0" g="0" b="0"/>
+      </a:fillRef>
+      <a:effectRef idx="0">
+        <a:scrgbClr r="0" g="0" b="0"/>
+      </a:effectRef>
+      <a:fontRef idx="minor">
+        <a:schemeClr val="lt1"/>
+      </a:fontRef>
+    </dgm:style>
+  </dgm:styleLbl>
+  <dgm:styleLbl name="bgSibTrans2D1">
+    <dgm:scene3d>
+      <a:camera prst="orthographicFront"/>
+      <a:lightRig rig="threePt" dir="t"/>
+    </dgm:scene3d>
+    <dgm:sp3d/>
+    <dgm:txPr/>
+    <dgm:style>
+      <a:lnRef idx="0">
+        <a:scrgbClr r="0" g="0" b="0"/>
+      </a:lnRef>
+      <a:fillRef idx="1">
+        <a:scrgbClr r="0" g="0" b="0"/>
+      </a:fillRef>
+      <a:effectRef idx="0">
+        <a:scrgbClr r="0" g="0" b="0"/>
+      </a:effectRef>
+      <a:fontRef idx="minor">
+        <a:schemeClr val="lt1"/>
+      </a:fontRef>
+    </dgm:style>
+  </dgm:styleLbl>
+  <dgm:styleLbl name="sibTrans1D1">
+    <dgm:scene3d>
+      <a:camera prst="orthographicFront"/>
+      <a:lightRig rig="threePt" dir="t"/>
+    </dgm:scene3d>
+    <dgm:sp3d/>
+    <dgm:txPr/>
+    <dgm:style>
+      <a:lnRef idx="1">
+        <a:scrgbClr r="0" g="0" b="0"/>
+      </a:lnRef>
+      <a:fillRef idx="0">
+        <a:scrgbClr r="0" g="0" b="0"/>
+      </a:fillRef>
+      <a:effectRef idx="0">
+        <a:scrgbClr r="0" g="0" b="0"/>
+      </a:effectRef>
+      <a:fontRef idx="minor"/>
+    </dgm:style>
+  </dgm:styleLbl>
+  <dgm:styleLbl name="callout">
+    <dgm:scene3d>
+      <a:camera prst="orthographicFront"/>
+      <a:lightRig rig="threePt" dir="t"/>
+    </dgm:scene3d>
+    <dgm:sp3d/>
+    <dgm:txPr/>
+    <dgm:style>
+      <a:lnRef idx="2">
+        <a:scrgbClr r="0" g="0" b="0"/>
+      </a:lnRef>
+      <a:fillRef idx="1">
+        <a:scrgbClr r="0" g="0" b="0"/>
+      </a:fillRef>
+      <a:effectRef idx="0">
+        <a:scrgbClr r="0" g="0" b="0"/>
+      </a:effectRef>
+      <a:fontRef idx="minor"/>
+    </dgm:style>
+  </dgm:styleLbl>
+  <dgm:styleLbl name="asst0">
+    <dgm:scene3d>
+      <a:camera prst="orthographicFront"/>
+      <a:lightRig rig="threePt" dir="t"/>
+    </dgm:scene3d>
+    <dgm:sp3d/>
+    <dgm:txPr/>
+    <dgm:style>
+      <a:lnRef idx="2">
+        <a:scrgbClr r="0" g="0" b="0"/>
+      </a:lnRef>
+      <a:fillRef idx="1">
+        <a:scrgbClr r="0" g="0" b="0"/>
+      </a:fillRef>
+      <a:effectRef idx="0">
+        <a:scrgbClr r="0" g="0" b="0"/>
+      </a:effectRef>
+      <a:fontRef idx="minor">
+        <a:schemeClr val="lt1"/>
+      </a:fontRef>
+    </dgm:style>
+  </dgm:styleLbl>
+  <dgm:styleLbl name="asst1">
+    <dgm:scene3d>
+      <a:camera prst="orthographicFront"/>
+      <a:lightRig rig="threePt" dir="t"/>
+    </dgm:scene3d>
+    <dgm:sp3d/>
+    <dgm:txPr/>
+    <dgm:style>
+      <a:lnRef idx="2">
+        <a:scrgbClr r="0" g="0" b="0"/>
+      </a:lnRef>
+      <a:fillRef idx="1">
+        <a:scrgbClr r="0" g="0" b="0"/>
+      </a:fillRef>
+      <a:effectRef idx="0">
+        <a:scrgbClr r="0" g="0" b="0"/>
+      </a:effectRef>
+      <a:fontRef idx="minor">
+        <a:schemeClr val="lt1"/>
+      </a:fontRef>
+    </dgm:style>
+  </dgm:styleLbl>
+  <dgm:styleLbl name="asst2">
+    <dgm:scene3d>
+      <a:camera prst="orthographicFront"/>
+      <a:lightRig rig="threePt" dir="t"/>
+    </dgm:scene3d>
+    <dgm:sp3d/>
+    <dgm:txPr/>
+    <dgm:style>
+      <a:lnRef idx="2">
+        <a:scrgbClr r="0" g="0" b="0"/>
+      </a:lnRef>
+      <a:fillRef idx="1">
+        <a:scrgbClr r="0" g="0" b="0"/>
+      </a:fillRef>
+      <a:effectRef idx="0">
+        <a:scrgbClr r="0" g="0" b="0"/>
+      </a:effectRef>
+      <a:fontRef idx="minor">
+        <a:schemeClr val="lt1"/>
+      </a:fontRef>
+    </dgm:style>
+  </dgm:styleLbl>
+  <dgm:styleLbl name="asst3">
+    <dgm:scene3d>
+      <a:camera prst="orthographicFront"/>
+      <a:lightRig rig="threePt" dir="t"/>
+    </dgm:scene3d>
+    <dgm:sp3d/>
+    <dgm:txPr/>
+    <dgm:style>
+      <a:lnRef idx="2">
+        <a:scrgbClr r="0" g="0" b="0"/>
+      </a:lnRef>
+      <a:fillRef idx="1">
+        <a:scrgbClr r="0" g="0" b="0"/>
+      </a:fillRef>
+      <a:effectRef idx="0">
+        <a:scrgbClr r="0" g="0" b="0"/>
+      </a:effectRef>
+      <a:fontRef idx="minor">
+        <a:schemeClr val="lt1"/>
+      </a:fontRef>
+    </dgm:style>
+  </dgm:styleLbl>
+  <dgm:styleLbl name="asst4">
+    <dgm:scene3d>
+      <a:camera prst="orthographicFront"/>
+      <a:lightRig rig="threePt" dir="t"/>
+    </dgm:scene3d>
+    <dgm:sp3d/>
+    <dgm:txPr/>
+    <dgm:style>
+      <a:lnRef idx="2">
+        <a:scrgbClr r="0" g="0" b="0"/>
+      </a:lnRef>
+      <a:fillRef idx="1">
+        <a:scrgbClr r="0" g="0" b="0"/>
+      </a:fillRef>
+      <a:effectRef idx="0">
+        <a:scrgbClr r="0" g="0" b="0"/>
+      </a:effectRef>
+      <a:fontRef idx="minor">
+        <a:schemeClr val="lt1"/>
+      </a:fontRef>
+    </dgm:style>
+  </dgm:styleLbl>
+  <dgm:styleLbl name="parChTrans2D1">
+    <dgm:scene3d>
+      <a:camera prst="orthographicFront"/>
+      <a:lightRig rig="threePt" dir="t"/>
+    </dgm:scene3d>
+    <dgm:sp3d/>
+    <dgm:txPr/>
+    <dgm:style>
+      <a:lnRef idx="2">
+        <a:scrgbClr r="0" g="0" b="0"/>
+      </a:lnRef>
+      <a:fillRef idx="1">
+        <a:scrgbClr r="0" g="0" b="0"/>
+      </a:fillRef>
+      <a:effectRef idx="0">
+        <a:scrgbClr r="0" g="0" b="0"/>
+      </a:effectRef>
+      <a:fontRef idx="minor">
+        <a:schemeClr val="lt1"/>
+      </a:fontRef>
+    </dgm:style>
+  </dgm:styleLbl>
+  <dgm:styleLbl name="parChTrans2D2">
+    <dgm:scene3d>
+      <a:camera prst="orthographicFront"/>
+      <a:lightRig rig="threePt" dir="t"/>
+    </dgm:scene3d>
+    <dgm:sp3d/>
+    <dgm:txPr/>
+    <dgm:style>
+      <a:lnRef idx="2">
+        <a:scrgbClr r="0" g="0" b="0"/>
+      </a:lnRef>
+      <a:fillRef idx="1">
+        <a:scrgbClr r="0" g="0" b="0"/>
+      </a:fillRef>
+      <a:effectRef idx="0">
+        <a:scrgbClr r="0" g="0" b="0"/>
+      </a:effectRef>
+      <a:fontRef idx="minor">
+        <a:schemeClr val="lt1"/>
+      </a:fontRef>
+    </dgm:style>
+  </dgm:styleLbl>
+  <dgm:styleLbl name="parChTrans2D3">
+    <dgm:scene3d>
+      <a:camera prst="orthographicFront"/>
+      <a:lightRig rig="threePt" dir="t"/>
+    </dgm:scene3d>
+    <dgm:sp3d/>
+    <dgm:txPr/>
+    <dgm:style>
+      <a:lnRef idx="2">
+        <a:scrgbClr r="0" g="0" b="0"/>
+      </a:lnRef>
+      <a:fillRef idx="1">
+        <a:scrgbClr r="0" g="0" b="0"/>
+      </a:fillRef>
+      <a:effectRef idx="0">
+        <a:scrgbClr r="0" g="0" b="0"/>
+      </a:effectRef>
+      <a:fontRef idx="minor">
+        <a:schemeClr val="lt1"/>
+      </a:fontRef>
+    </dgm:style>
+  </dgm:styleLbl>
+  <dgm:styleLbl name="parChTrans2D4">
+    <dgm:scene3d>
+      <a:camera prst="orthographicFront"/>
+      <a:lightRig rig="threePt" dir="t"/>
+    </dgm:scene3d>
+    <dgm:sp3d/>
+    <dgm:txPr/>
+    <dgm:style>
+      <a:lnRef idx="2">
+        <a:scrgbClr r="0" g="0" b="0"/>
+      </a:lnRef>
+      <a:fillRef idx="1">
+        <a:scrgbClr r="0" g="0" b="0"/>
+      </a:fillRef>
+      <a:effectRef idx="0">
+        <a:scrgbClr r="0" g="0" b="0"/>
+      </a:effectRef>
+      <a:fontRef idx="minor">
+        <a:schemeClr val="lt1"/>
+      </a:fontRef>
+    </dgm:style>
+  </dgm:styleLbl>
+  <dgm:styleLbl name="parChTrans1D1">
+    <dgm:scene3d>
+      <a:camera prst="orthographicFront"/>
+      <a:lightRig rig="threePt" dir="t"/>
+    </dgm:scene3d>
+    <dgm:sp3d/>
+    <dgm:txPr/>
+    <dgm:style>
+      <a:lnRef idx="2">
+        <a:scrgbClr r="0" g="0" b="0"/>
+      </a:lnRef>
+      <a:fillRef idx="0">
+        <a:scrgbClr r="0" g="0" b="0"/>
+      </a:fillRef>
+      <a:effectRef idx="0">
+        <a:scrgbClr r="0" g="0" b="0"/>
+      </a:effectRef>
+      <a:fontRef idx="minor"/>
+    </dgm:style>
+  </dgm:styleLbl>
+  <dgm:styleLbl name="parChTrans1D2">
+    <dgm:scene3d>
+      <a:camera prst="orthographicFront"/>
+      <a:lightRig rig="threePt" dir="t"/>
+    </dgm:scene3d>
+    <dgm:sp3d/>
+    <dgm:txPr/>
+    <dgm:style>
+      <a:lnRef idx="2">
+        <a:scrgbClr r="0" g="0" b="0"/>
+      </a:lnRef>
+      <a:fillRef idx="0">
+        <a:scrgbClr r="0" g="0" b="0"/>
+      </a:fillRef>
+      <a:effectRef idx="0">
+        <a:scrgbClr r="0" g="0" b="0"/>
+      </a:effectRef>
+      <a:fontRef idx="minor"/>
+    </dgm:style>
+  </dgm:styleLbl>
+  <dgm:styleLbl name="parChTrans1D3">
+    <dgm:scene3d>
+      <a:camera prst="orthographicFront"/>
+      <a:lightRig rig="threePt" dir="t"/>
+    </dgm:scene3d>
+    <dgm:sp3d/>
+    <dgm:txPr/>
+    <dgm:style>
+      <a:lnRef idx="2">
+        <a:scrgbClr r="0" g="0" b="0"/>
+      </a:lnRef>
+      <a:fillRef idx="0">
+        <a:scrgbClr r="0" g="0" b="0"/>
+      </a:fillRef>
+      <a:effectRef idx="0">
+        <a:scrgbClr r="0" g="0" b="0"/>
+      </a:effectRef>
+      <a:fontRef idx="minor"/>
+    </dgm:style>
+  </dgm:styleLbl>
+  <dgm:styleLbl name="parChTrans1D4">
+    <dgm:scene3d>
+      <a:camera prst="orthographicFront"/>
+      <a:lightRig rig="threePt" dir="t"/>
+    </dgm:scene3d>
+    <dgm:sp3d/>
+    <dgm:txPr/>
+    <dgm:style>
+      <a:lnRef idx="2">
+        <a:scrgbClr r="0" g="0" b="0"/>
+      </a:lnRef>
+      <a:fillRef idx="0">
+        <a:scrgbClr r="0" g="0" b="0"/>
+      </a:fillRef>
+      <a:effectRef idx="0">
+        <a:scrgbClr r="0" g="0" b="0"/>
+      </a:effectRef>
+      <a:fontRef idx="minor"/>
+    </dgm:style>
+  </dgm:styleLbl>
+  <dgm:styleLbl name="fgAcc1">
+    <dgm:scene3d>
+      <a:camera prst="orthographicFront"/>
+      <a:lightRig rig="threePt" dir="t"/>
+    </dgm:scene3d>
+    <dgm:sp3d/>
+    <dgm:txPr/>
+    <dgm:style>
+      <a:lnRef idx="2">
+        <a:scrgbClr r="0" g="0" b="0"/>
+      </a:lnRef>
+      <a:fillRef idx="1">
+        <a:scrgbClr r="0" g="0" b="0"/>
+      </a:fillRef>
+      <a:effectRef idx="0">
+        <a:scrgbClr r="0" g="0" b="0"/>
+      </a:effectRef>
+      <a:fontRef idx="minor"/>
+    </dgm:style>
+  </dgm:styleLbl>
+  <dgm:styleLbl name="conFgAcc1">
+    <dgm:scene3d>
+      <a:camera prst="orthographicFront"/>
+      <a:lightRig rig="threePt" dir="t"/>
+    </dgm:scene3d>
+    <dgm:sp3d/>
+    <dgm:txPr/>
+    <dgm:style>
+      <a:lnRef idx="2">
+        <a:scrgbClr r="0" g="0" b="0"/>
+      </a:lnRef>
+      <a:fillRef idx="1">
+        <a:scrgbClr r="0" g="0" b="0"/>
+      </a:fillRef>
+      <a:effectRef idx="0">
+        <a:scrgbClr r="0" g="0" b="0"/>
+      </a:effectRef>
+      <a:fontRef idx="minor"/>
+    </dgm:style>
+  </dgm:styleLbl>
+  <dgm:styleLbl name="alignAcc1">
+    <dgm:scene3d>
+      <a:camera prst="orthographicFront"/>
+      <a:lightRig rig="threePt" dir="t"/>
+    </dgm:scene3d>
+    <dgm:sp3d/>
+    <dgm:txPr/>
+    <dgm:style>
+      <a:lnRef idx="2">
+        <a:scrgbClr r="0" g="0" b="0"/>
+      </a:lnRef>
+      <a:fillRef idx="1">
+        <a:scrgbClr r="0" g="0" b="0"/>
+      </a:fillRef>
+      <a:effectRef idx="0">
+        <a:scrgbClr r="0" g="0" b="0"/>
+      </a:effectRef>
+      <a:fontRef idx="minor"/>
+    </dgm:style>
+  </dgm:styleLbl>
+  <dgm:styleLbl name="trAlignAcc1">
+    <dgm:scene3d>
+      <a:camera prst="orthographicFront"/>
+      <a:lightRig rig="threePt" dir="t"/>
+    </dgm:scene3d>
+    <dgm:sp3d/>
+    <dgm:txPr/>
+    <dgm:style>
+      <a:lnRef idx="1">
+        <a:scrgbClr r="0" g="0" b="0"/>
+      </a:lnRef>
+      <a:fillRef idx="1">
+        <a:scrgbClr r="0" g="0" b="0"/>
+      </a:fillRef>
+      <a:effectRef idx="0">
+        <a:scrgbClr r="0" g="0" b="0"/>
+      </a:effectRef>
+      <a:fontRef idx="minor"/>
+    </dgm:style>
+  </dgm:styleLbl>
+  <dgm:styleLbl name="bgAcc1">
+    <dgm:scene3d>
+      <a:camera prst="orthographicFront"/>
+      <a:lightRig rig="threePt" dir="t"/>
+    </dgm:scene3d>
+    <dgm:sp3d/>
+    <dgm:txPr/>
+    <dgm:style>
+      <a:lnRef idx="2">
+        <a:scrgbClr r="0" g="0" b="0"/>
+      </a:lnRef>
+      <a:fillRef idx="1">
+        <a:scrgbClr r="0" g="0" b="0"/>
+      </a:fillRef>
+      <a:effectRef idx="0">
+        <a:scrgbClr r="0" g="0" b="0"/>
+      </a:effectRef>
+      <a:fontRef idx="minor"/>
+    </dgm:style>
+  </dgm:styleLbl>
+  <dgm:styleLbl name="solidFgAcc1">
+    <dgm:scene3d>
+      <a:camera prst="orthographicFront"/>
+      <a:lightRig rig="threePt" dir="t"/>
+    </dgm:scene3d>
+    <dgm:sp3d/>
+    <dgm:txPr/>
+    <dgm:style>
+      <a:lnRef idx="2">
+        <a:scrgbClr r="0" g="0" b="0"/>
+      </a:lnRef>
+      <a:fillRef idx="1">
+        <a:scrgbClr r="0" g="0" b="0"/>
+      </a:fillRef>
+      <a:effectRef idx="0">
+        <a:scrgbClr r="0" g="0" b="0"/>
+      </a:effectRef>
+      <a:fontRef idx="minor"/>
+    </dgm:style>
+  </dgm:styleLbl>
+  <dgm:styleLbl name="solidAlignAcc1">
+    <dgm:scene3d>
+      <a:camera prst="orthographicFront"/>
+      <a:lightRig rig="threePt" dir="t"/>
+    </dgm:scene3d>
+    <dgm:sp3d/>
+    <dgm:txPr/>
+    <dgm:style>
+      <a:lnRef idx="2">
+        <a:scrgbClr r="0" g="0" b="0"/>
+      </a:lnRef>
+      <a:fillRef idx="1">
+        <a:scrgbClr r="0" g="0" b="0"/>
+      </a:fillRef>
+      <a:effectRef idx="0">
+        <a:scrgbClr r="0" g="0" b="0"/>
+      </a:effectRef>
+      <a:fontRef idx="minor"/>
+    </dgm:style>
+  </dgm:styleLbl>
+  <dgm:styleLbl name="solidBgAcc1">
+    <dgm:scene3d>
+      <a:camera prst="orthographicFront"/>
+      <a:lightRig rig="threePt" dir="t"/>
+    </dgm:scene3d>
+    <dgm:sp3d/>
+    <dgm:txPr/>
+    <dgm:style>
+      <a:lnRef idx="2">
+        <a:scrgbClr r="0" g="0" b="0"/>
+      </a:lnRef>
+      <a:fillRef idx="1">
+        <a:scrgbClr r="0" g="0" b="0"/>
+      </a:fillRef>
+      <a:effectRef idx="0">
+        <a:scrgbClr r="0" g="0" b="0"/>
+      </a:effectRef>
+      <a:fontRef idx="minor"/>
+    </dgm:style>
+  </dgm:styleLbl>
+  <dgm:styleLbl name="fgAccFollowNode1">
+    <dgm:scene3d>
+      <a:camera prst="orthographicFront"/>
+      <a:lightRig rig="threePt" dir="t"/>
+    </dgm:scene3d>
+    <dgm:sp3d/>
+    <dgm:txPr/>
+    <dgm:style>
+      <a:lnRef idx="2">
+        <a:scrgbClr r="0" g="0" b="0"/>
+      </a:lnRef>
+      <a:fillRef idx="1">
+        <a:scrgbClr r="0" g="0" b="0"/>
+      </a:fillRef>
+      <a:effectRef idx="0">
+        <a:scrgbClr r="0" g="0" b="0"/>
+      </a:effectRef>
+      <a:fontRef idx="minor"/>
+    </dgm:style>
+  </dgm:styleLbl>
+  <dgm:styleLbl name="alignAccFollowNode1">
+    <dgm:scene3d>
+      <a:camera prst="orthographicFront"/>
+      <a:lightRig rig="threePt" dir="t"/>
+    </dgm:scene3d>
+    <dgm:sp3d/>
+    <dgm:txPr/>
+    <dgm:style>
+      <a:lnRef idx="2">
+        <a:scrgbClr r="0" g="0" b="0"/>
+      </a:lnRef>
+      <a:fillRef idx="1">
+        <a:scrgbClr r="0" g="0" b="0"/>
+      </a:fillRef>
+      <a:effectRef idx="0">
+        <a:scrgbClr r="0" g="0" b="0"/>
+      </a:effectRef>
+      <a:fontRef idx="minor"/>
+    </dgm:style>
+  </dgm:styleLbl>
+  <dgm:styleLbl name="bgAccFollowNode1">
+    <dgm:scene3d>
+      <a:camera prst="orthographicFront"/>
+      <a:lightRig rig="threePt" dir="t"/>
+    </dgm:scene3d>
+    <dgm:sp3d/>
+    <dgm:txPr/>
+    <dgm:style>
+      <a:lnRef idx="2">
+        <a:scrgbClr r="0" g="0" b="0"/>
+      </a:lnRef>
+      <a:fillRef idx="1">
+        <a:scrgbClr r="0" g="0" b="0"/>
+      </a:fillRef>
+      <a:effectRef idx="0">
+        <a:scrgbClr r="0" g="0" b="0"/>
+      </a:effectRef>
+      <a:fontRef idx="minor"/>
+    </dgm:style>
+  </dgm:styleLbl>
+  <dgm:styleLbl name="fgAcc0">
+    <dgm:scene3d>
+      <a:camera prst="orthographicFront"/>
+      <a:lightRig rig="threePt" dir="t"/>
+    </dgm:scene3d>
+    <dgm:sp3d/>
+    <dgm:txPr/>
+    <dgm:style>
+      <a:lnRef idx="2">
+        <a:scrgbClr r="0" g="0" b="0"/>
+      </a:lnRef>
+      <a:fillRef idx="1">
+        <a:scrgbClr r="0" g="0" b="0"/>
+      </a:fillRef>
+      <a:effectRef idx="0">
+        <a:scrgbClr r="0" g="0" b="0"/>
+      </a:effectRef>
+      <a:fontRef idx="minor"/>
+    </dgm:style>
+  </dgm:styleLbl>
+  <dgm:styleLbl name="fgAcc2">
+    <dgm:scene3d>
+      <a:camera prst="orthographicFront"/>
+      <a:lightRig rig="threePt" dir="t"/>
+    </dgm:scene3d>
+    <dgm:sp3d/>
+    <dgm:txPr/>
+    <dgm:style>
+      <a:lnRef idx="2">
+        <a:scrgbClr r="0" g="0" b="0"/>
+      </a:lnRef>
+      <a:fillRef idx="1">
+        <a:scrgbClr r="0" g="0" b="0"/>
+      </a:fillRef>
+      <a:effectRef idx="0">
+        <a:scrgbClr r="0" g="0" b="0"/>
+      </a:effectRef>
+      <a:fontRef idx="minor"/>
+    </dgm:style>
+  </dgm:styleLbl>
+  <dgm:styleLbl name="fgAcc3">
+    <dgm:scene3d>
+      <a:camera prst="orthographicFront"/>
+      <a:lightRig rig="threePt" dir="t"/>
+    </dgm:scene3d>
+    <dgm:sp3d/>
+    <dgm:txPr/>
+    <dgm:style>
+      <a:lnRef idx="2">
+        <a:scrgbClr r="0" g="0" b="0"/>
+      </a:lnRef>
+      <a:fillRef idx="1">
+        <a:scrgbClr r="0" g="0" b="0"/>
+      </a:fillRef>
+      <a:effectRef idx="0">
+        <a:scrgbClr r="0" g="0" b="0"/>
+      </a:effectRef>
+      <a:fontRef idx="minor"/>
+    </dgm:style>
+  </dgm:styleLbl>
+  <dgm:styleLbl name="fgAcc4">
+    <dgm:scene3d>
+      <a:camera prst="orthographicFront"/>
+      <a:lightRig rig="threePt" dir="t"/>
+    </dgm:scene3d>
+    <dgm:sp3d/>
+    <dgm:txPr/>
+    <dgm:style>
+      <a:lnRef idx="2">
+        <a:scrgbClr r="0" g="0" b="0"/>
+      </a:lnRef>
+      <a:fillRef idx="1">
+        <a:scrgbClr r="0" g="0" b="0"/>
+      </a:fillRef>
+      <a:effectRef idx="0">
+        <a:scrgbClr r="0" g="0" b="0"/>
+      </a:effectRef>
+      <a:fontRef idx="minor"/>
+    </dgm:style>
+  </dgm:styleLbl>
+  <dgm:styleLbl name="bgShp">
+    <dgm:scene3d>
+      <a:camera prst="orthographicFront"/>
+      <a:lightRig rig="threePt" dir="t"/>
+    </dgm:scene3d>
+    <dgm:sp3d/>
+    <dgm:txPr/>
+    <dgm:style>
+      <a:lnRef idx="0">
+        <a:scrgbClr r="0" g="0" b="0"/>
+      </a:lnRef>
+      <a:fillRef idx="1">
+        <a:scrgbClr r="0" g="0" b="0"/>
+      </a:fillRef>
+      <a:effectRef idx="0">
+        <a:scrgbClr r="0" g="0" b="0"/>
+      </a:effectRef>
+      <a:fontRef idx="minor"/>
+    </dgm:style>
+  </dgm:styleLbl>
+  <dgm:styleLbl name="dkBgShp">
+    <dgm:scene3d>
+      <a:camera prst="orthographicFront"/>
+      <a:lightRig rig="threePt" dir="t"/>
+    </dgm:scene3d>
+    <dgm:sp3d/>
+    <dgm:txPr/>
+    <dgm:style>
+      <a:lnRef idx="0">
+        <a:scrgbClr r="0" g="0" b="0"/>
+      </a:lnRef>
+      <a:fillRef idx="1">
+        <a:scrgbClr r="0" g="0" b="0"/>
+      </a:fillRef>
+      <a:effectRef idx="0">
+        <a:scrgbClr r="0" g="0" b="0"/>
+      </a:effectRef>
+      <a:fontRef idx="minor"/>
+    </dgm:style>
+  </dgm:styleLbl>
+  <dgm:styleLbl name="trBgShp">
+    <dgm:scene3d>
+      <a:camera prst="orthographicFront"/>
+      <a:lightRig rig="threePt" dir="t"/>
+    </dgm:scene3d>
+    <dgm:sp3d/>
+    <dgm:txPr/>
+    <dgm:style>
+      <a:lnRef idx="0">
+        <a:scrgbClr r="0" g="0" b="0"/>
+      </a:lnRef>
+      <a:fillRef idx="1">
+        <a:scrgbClr r="0" g="0" b="0"/>
+      </a:fillRef>
+      <a:effectRef idx="0">
+        <a:scrgbClr r="0" g="0" b="0"/>
+      </a:effectRef>
+      <a:fontRef idx="minor"/>
+    </dgm:style>
+  </dgm:styleLbl>
+  <dgm:styleLbl name="fgShp">
+    <dgm:scene3d>
+      <a:camera prst="orthographicFront"/>
+      <a:lightRig rig="threePt" dir="t"/>
+    </dgm:scene3d>
+    <dgm:sp3d/>
+    <dgm:txPr/>
+    <dgm:style>
+      <a:lnRef idx="2">
+        <a:scrgbClr r="0" g="0" b="0"/>
+      </a:lnRef>
+      <a:fillRef idx="1">
+        <a:scrgbClr r="0" g="0" b="0"/>
+      </a:fillRef>
+      <a:effectRef idx="0">
+        <a:scrgbClr r="0" g="0" b="0"/>
+      </a:effectRef>
+      <a:fontRef idx="minor"/>
+    </dgm:style>
+  </dgm:styleLbl>
+  <dgm:styleLbl name="revTx">
+    <dgm:scene3d>
+      <a:camera prst="orthographicFront"/>
+      <a:lightRig rig="threePt" dir="t"/>
+    </dgm:scene3d>
+    <dgm:sp3d/>
+    <dgm:txPr/>
+    <dgm:style>
+      <a:lnRef idx="0">
+        <a:scrgbClr r="0" g="0" b="0"/>
+      </a:lnRef>
+      <a:fillRef idx="0">
+        <a:scrgbClr r="0" g="0" b="0"/>
+      </a:fillRef>
+      <a:effectRef idx="0">
+        <a:scrgbClr r="0" g="0" b="0"/>
+      </a:effectRef>
+      <a:fontRef idx="minor"/>
+    </dgm:style>
+  </dgm:styleLbl>
+</dgm:styleDef>
+</file>
+
 <file path=ppt/notesMasters/notesMaster1.xml><?xml version="1.0" encoding="utf-8"?>
 <p:notesMaster xmlns:a="http://schemas.openxmlformats.org/drawingml/2006/main" xmlns:r="http://schemas.openxmlformats.org/officeDocument/2006/relationships" xmlns:p="http://schemas.openxmlformats.org/presentationml/2006/main">
   <p:cSld>
@@ -5968,7 +8746,7 @@
           <a:p>
             <a:fld id="{8418364D-2D75-47C5-80C2-90F31B92226A}" type="datetimeFigureOut">
               <a:rPr lang="en-US" smtClean="0"/>
-              <a:t>8/25/2023</a:t>
+              <a:t>8/28/2023</a:t>
             </a:fld>
             <a:endParaRPr lang="en-US"/>
           </a:p>
@@ -6300,7 +9078,7 @@
           <a:p>
             <a:fld id="{914556D5-6B52-4582-8BBE-AD7D33DC4150}" type="slidenum">
               <a:rPr lang="en-US" smtClean="0"/>
-              <a:t>9</a:t>
+              <a:t>10</a:t>
             </a:fld>
             <a:endParaRPr lang="en-US"/>
           </a:p>
@@ -6466,7 +9244,7 @@
           <a:p>
             <a:fld id="{8E1B361F-AF8B-8048-AD58-40D4EF99588B}" type="datetimeFigureOut">
               <a:rPr lang="en-US" smtClean="0"/>
-              <a:t>8/25/2023</a:t>
+              <a:t>8/28/2023</a:t>
             </a:fld>
             <a:endParaRPr lang="en-US"/>
           </a:p>
@@ -6664,7 +9442,7 @@
           <a:p>
             <a:fld id="{8E1B361F-AF8B-8048-AD58-40D4EF99588B}" type="datetimeFigureOut">
               <a:rPr lang="en-US" smtClean="0"/>
-              <a:t>8/25/2023</a:t>
+              <a:t>8/28/2023</a:t>
             </a:fld>
             <a:endParaRPr lang="en-US"/>
           </a:p>
@@ -6872,7 +9650,7 @@
           <a:p>
             <a:fld id="{8E1B361F-AF8B-8048-AD58-40D4EF99588B}" type="datetimeFigureOut">
               <a:rPr lang="en-US" smtClean="0"/>
-              <a:t>8/25/2023</a:t>
+              <a:t>8/28/2023</a:t>
             </a:fld>
             <a:endParaRPr lang="en-US"/>
           </a:p>
@@ -7070,7 +9848,7 @@
           <a:p>
             <a:fld id="{8E1B361F-AF8B-8048-AD58-40D4EF99588B}" type="datetimeFigureOut">
               <a:rPr lang="en-US" smtClean="0"/>
-              <a:t>8/25/2023</a:t>
+              <a:t>8/28/2023</a:t>
             </a:fld>
             <a:endParaRPr lang="en-US"/>
           </a:p>
@@ -7345,7 +10123,7 @@
           <a:p>
             <a:fld id="{8E1B361F-AF8B-8048-AD58-40D4EF99588B}" type="datetimeFigureOut">
               <a:rPr lang="en-US" smtClean="0"/>
-              <a:t>8/25/2023</a:t>
+              <a:t>8/28/2023</a:t>
             </a:fld>
             <a:endParaRPr lang="en-US"/>
           </a:p>
@@ -7610,7 +10388,7 @@
           <a:p>
             <a:fld id="{8E1B361F-AF8B-8048-AD58-40D4EF99588B}" type="datetimeFigureOut">
               <a:rPr lang="en-US" smtClean="0"/>
-              <a:t>8/25/2023</a:t>
+              <a:t>8/28/2023</a:t>
             </a:fld>
             <a:endParaRPr lang="en-US"/>
           </a:p>
@@ -8022,7 +10800,7 @@
           <a:p>
             <a:fld id="{8E1B361F-AF8B-8048-AD58-40D4EF99588B}" type="datetimeFigureOut">
               <a:rPr lang="en-US" smtClean="0"/>
-              <a:t>8/25/2023</a:t>
+              <a:t>8/28/2023</a:t>
             </a:fld>
             <a:endParaRPr lang="en-US"/>
           </a:p>
@@ -8163,7 +10941,7 @@
           <a:p>
             <a:fld id="{8E1B361F-AF8B-8048-AD58-40D4EF99588B}" type="datetimeFigureOut">
               <a:rPr lang="en-US" smtClean="0"/>
-              <a:t>8/25/2023</a:t>
+              <a:t>8/28/2023</a:t>
             </a:fld>
             <a:endParaRPr lang="en-US"/>
           </a:p>
@@ -8276,7 +11054,7 @@
           <a:p>
             <a:fld id="{8E1B361F-AF8B-8048-AD58-40D4EF99588B}" type="datetimeFigureOut">
               <a:rPr lang="en-US" smtClean="0"/>
-              <a:t>8/25/2023</a:t>
+              <a:t>8/28/2023</a:t>
             </a:fld>
             <a:endParaRPr lang="en-US"/>
           </a:p>
@@ -8587,7 +11365,7 @@
           <a:p>
             <a:fld id="{8E1B361F-AF8B-8048-AD58-40D4EF99588B}" type="datetimeFigureOut">
               <a:rPr lang="en-US" smtClean="0"/>
-              <a:t>8/25/2023</a:t>
+              <a:t>8/28/2023</a:t>
             </a:fld>
             <a:endParaRPr lang="en-US"/>
           </a:p>
@@ -8875,7 +11653,7 @@
           <a:p>
             <a:fld id="{8E1B361F-AF8B-8048-AD58-40D4EF99588B}" type="datetimeFigureOut">
               <a:rPr lang="en-US" smtClean="0"/>
-              <a:t>8/25/2023</a:t>
+              <a:t>8/28/2023</a:t>
             </a:fld>
             <a:endParaRPr lang="en-US"/>
           </a:p>
@@ -9116,7 +11894,7 @@
           <a:p>
             <a:fld id="{8E1B361F-AF8B-8048-AD58-40D4EF99588B}" type="datetimeFigureOut">
               <a:rPr lang="en-US" smtClean="0"/>
-              <a:t>8/25/2023</a:t>
+              <a:t>8/28/2023</a:t>
             </a:fld>
             <a:endParaRPr lang="en-US"/>
           </a:p>
@@ -9632,7 +12410,7 @@
             <a:pPr algn="l"/>
             <a:r>
               <a:rPr lang="en-US" sz="3200" dirty="0"/>
-              <a:t>Buying and Selling Vehicles made easy</a:t>
+              <a:t>Buying and Selling Vehicles Made Easy</a:t>
             </a:r>
           </a:p>
         </p:txBody>
@@ -9770,35 +12548,6 @@
           </a:p>
         </p:txBody>
       </p:sp>
-      <p:pic>
-        <p:nvPicPr>
-          <p:cNvPr id="2" name="Picture 1">
-            <a:extLst>
-              <a:ext uri="{FF2B5EF4-FFF2-40B4-BE49-F238E27FC236}">
-                <a16:creationId xmlns:a16="http://schemas.microsoft.com/office/drawing/2014/main" id="{F9AA5E6A-A48D-8D8F-02E2-2CB557902E21}"/>
-              </a:ext>
-            </a:extLst>
-          </p:cNvPr>
-          <p:cNvPicPr>
-            <a:picLocks noChangeAspect="1"/>
-          </p:cNvPicPr>
-          <p:nvPr/>
-        </p:nvPicPr>
-        <p:blipFill rotWithShape="1">
-          <a:blip r:embed="rId2"/>
-          <a:srcRect t="10118"/>
-          <a:stretch/>
-        </p:blipFill>
-        <p:spPr>
-          <a:xfrm>
-            <a:off x="959206" y="1077713"/>
-            <a:ext cx="8456644" cy="3154422"/>
-          </a:xfrm>
-          <a:prstGeom prst="rect">
-            <a:avLst/>
-          </a:prstGeom>
-        </p:spPr>
-      </p:pic>
       <p:sp>
         <p:nvSpPr>
           <p:cNvPr id="25" name="Rectangle 24">
@@ -9890,17 +12639,7 @@
           </a:bodyPr>
           <a:lstStyle/>
           <a:p>
-            <a:pPr indent="-228600" algn="l">
-              <a:buFont typeface="Arial" panose="020B0604020202020204" pitchFamily="34" charset="0"/>
-              <a:buChar char="•"/>
-            </a:pPr>
-            <a:r>
-              <a:rPr lang="en-US" sz="1800" dirty="0"/>
-              <a:t>…It’s a lot!!!</a:t>
-            </a:r>
-          </a:p>
-          <a:p>
-            <a:pPr indent="-228600" algn="l">
+            <a:pPr marL="285750" indent="-285750" algn="l">
               <a:buFont typeface="Arial" panose="020B0604020202020204" pitchFamily="34" charset="0"/>
               <a:buChar char="•"/>
             </a:pPr>
@@ -9910,7 +12649,7 @@
             </a:r>
           </a:p>
           <a:p>
-            <a:pPr indent="-228600" algn="l">
+            <a:pPr marL="285750" indent="-285750" algn="l">
               <a:buFont typeface="Arial" panose="020B0604020202020204" pitchFamily="34" charset="0"/>
               <a:buChar char="•"/>
             </a:pPr>
@@ -9920,21 +12659,724 @@
             </a:r>
           </a:p>
           <a:p>
-            <a:pPr indent="-228600" algn="l">
+            <a:pPr marL="285750" indent="-285750" algn="l">
               <a:buFont typeface="Arial" panose="020B0604020202020204" pitchFamily="34" charset="0"/>
               <a:buChar char="•"/>
             </a:pPr>
             <a:r>
               <a:rPr lang="en-US" sz="1800" dirty="0"/>
-              <a:t>Joshua Benedict </a:t>
+              <a:t>Joshua Benedict</a:t>
             </a:r>
           </a:p>
         </p:txBody>
       </p:sp>
+      <p:pic>
+        <p:nvPicPr>
+          <p:cNvPr id="1026" name="Picture 2" descr="Logo">
+            <a:extLst>
+              <a:ext uri="{FF2B5EF4-FFF2-40B4-BE49-F238E27FC236}">
+                <a16:creationId xmlns:a16="http://schemas.microsoft.com/office/drawing/2014/main" id="{8740A592-64AB-CEA8-F38C-224DA0A5CE35}"/>
+              </a:ext>
+            </a:extLst>
+          </p:cNvPr>
+          <p:cNvPicPr>
+            <a:picLocks noChangeAspect="1" noChangeArrowheads="1"/>
+          </p:cNvPicPr>
+          <p:nvPr/>
+        </p:nvPicPr>
+        <p:blipFill>
+          <a:blip r:embed="rId2">
+            <a:extLst>
+              <a:ext uri="{28A0092B-C50C-407E-A947-70E740481C1C}">
+                <a14:useLocalDpi xmlns:a14="http://schemas.microsoft.com/office/drawing/2010/main" val="0"/>
+              </a:ext>
+            </a:extLst>
+          </a:blip>
+          <a:srcRect/>
+          <a:stretch>
+            <a:fillRect/>
+          </a:stretch>
+        </p:blipFill>
+        <p:spPr bwMode="auto">
+          <a:xfrm>
+            <a:off x="2186693" y="1605336"/>
+            <a:ext cx="6946422" cy="1678068"/>
+          </a:xfrm>
+          <a:prstGeom prst="rect">
+            <a:avLst/>
+          </a:prstGeom>
+          <a:noFill/>
+          <a:extLst>
+            <a:ext uri="{909E8E84-426E-40DD-AFC4-6F175D3DCCD1}">
+              <a14:hiddenFill xmlns:a14="http://schemas.microsoft.com/office/drawing/2010/main">
+                <a:solidFill>
+                  <a:srgbClr val="FFFFFF"/>
+                </a:solidFill>
+              </a14:hiddenFill>
+            </a:ext>
+          </a:extLst>
+        </p:spPr>
+      </p:pic>
     </p:spTree>
     <p:extLst>
       <p:ext uri="{BB962C8B-B14F-4D97-AF65-F5344CB8AC3E}">
         <p14:creationId xmlns:p14="http://schemas.microsoft.com/office/powerpoint/2010/main" val="2132091590"/>
+      </p:ext>
+    </p:extLst>
+  </p:cSld>
+  <p:clrMapOvr>
+    <a:masterClrMapping/>
+  </p:clrMapOvr>
+</p:sld>
+</file>
+
+<file path=ppt/slides/slide10.xml><?xml version="1.0" encoding="utf-8"?>
+<p:sld xmlns:a="http://schemas.openxmlformats.org/drawingml/2006/main" xmlns:r="http://schemas.openxmlformats.org/officeDocument/2006/relationships" xmlns:p="http://schemas.openxmlformats.org/presentationml/2006/main">
+  <p:cSld>
+    <p:spTree>
+      <p:nvGrpSpPr>
+        <p:cNvPr id="1" name=""/>
+        <p:cNvGrpSpPr/>
+        <p:nvPr/>
+      </p:nvGrpSpPr>
+      <p:grpSpPr>
+        <a:xfrm>
+          <a:off x="0" y="0"/>
+          <a:ext cx="0" cy="0"/>
+          <a:chOff x="0" y="0"/>
+          <a:chExt cx="0" cy="0"/>
+        </a:xfrm>
+      </p:grpSpPr>
+      <p:sp>
+        <p:nvSpPr>
+          <p:cNvPr id="17" name="Rectangle 16">
+            <a:extLst>
+              <a:ext uri="{FF2B5EF4-FFF2-40B4-BE49-F238E27FC236}">
+                <a16:creationId xmlns:a16="http://schemas.microsoft.com/office/drawing/2014/main" id="{4B14899B-4AE4-D583-40E2-253AE557B774}"/>
+              </a:ext>
+            </a:extLst>
+          </p:cNvPr>
+          <p:cNvSpPr/>
+          <p:nvPr/>
+        </p:nvSpPr>
+        <p:spPr>
+          <a:xfrm>
+            <a:off x="3004457" y="163285"/>
+            <a:ext cx="7173686" cy="6531430"/>
+          </a:xfrm>
+          <a:prstGeom prst="rect">
+            <a:avLst/>
+          </a:prstGeom>
+          <a:solidFill>
+            <a:schemeClr val="accent4">
+              <a:lumMod val="60000"/>
+              <a:lumOff val="40000"/>
+            </a:schemeClr>
+          </a:solidFill>
+        </p:spPr>
+        <p:style>
+          <a:lnRef idx="2">
+            <a:schemeClr val="accent1">
+              <a:shade val="15000"/>
+            </a:schemeClr>
+          </a:lnRef>
+          <a:fillRef idx="1">
+            <a:schemeClr val="accent1"/>
+          </a:fillRef>
+          <a:effectRef idx="0">
+            <a:schemeClr val="accent1"/>
+          </a:effectRef>
+          <a:fontRef idx="minor">
+            <a:schemeClr val="lt1"/>
+          </a:fontRef>
+        </p:style>
+        <p:txBody>
+          <a:bodyPr rtlCol="0" anchor="ctr"/>
+          <a:lstStyle/>
+          <a:p>
+            <a:pPr algn="ctr"/>
+            <a:endParaRPr lang="en-US" dirty="0"/>
+          </a:p>
+        </p:txBody>
+      </p:sp>
+      <p:sp>
+        <p:nvSpPr>
+          <p:cNvPr id="5" name="Rectangle 4">
+            <a:extLst>
+              <a:ext uri="{FF2B5EF4-FFF2-40B4-BE49-F238E27FC236}">
+                <a16:creationId xmlns:a16="http://schemas.microsoft.com/office/drawing/2014/main" id="{79875C78-E69B-D6EE-9FAD-29CB8952770E}"/>
+              </a:ext>
+            </a:extLst>
+          </p:cNvPr>
+          <p:cNvSpPr/>
+          <p:nvPr/>
+        </p:nvSpPr>
+        <p:spPr>
+          <a:xfrm>
+            <a:off x="283029" y="163285"/>
+            <a:ext cx="2449285" cy="6291943"/>
+          </a:xfrm>
+          <a:prstGeom prst="rect">
+            <a:avLst/>
+          </a:prstGeom>
+        </p:spPr>
+        <p:style>
+          <a:lnRef idx="2">
+            <a:schemeClr val="accent1">
+              <a:shade val="15000"/>
+            </a:schemeClr>
+          </a:lnRef>
+          <a:fillRef idx="1">
+            <a:schemeClr val="accent1"/>
+          </a:fillRef>
+          <a:effectRef idx="0">
+            <a:schemeClr val="accent1"/>
+          </a:effectRef>
+          <a:fontRef idx="minor">
+            <a:schemeClr val="lt1"/>
+          </a:fontRef>
+        </p:style>
+        <p:txBody>
+          <a:bodyPr rtlCol="0" anchor="ctr"/>
+          <a:lstStyle/>
+          <a:p>
+            <a:pPr algn="ctr"/>
+            <a:r>
+              <a:rPr lang="en-US" dirty="0"/>
+              <a:t>Filters</a:t>
+            </a:r>
+          </a:p>
+          <a:p>
+            <a:pPr algn="ctr"/>
+            <a:br>
+              <a:rPr lang="en-US" dirty="0"/>
+            </a:br>
+            <a:r>
+              <a:rPr lang="en-US" dirty="0"/>
+              <a:t>make</a:t>
+            </a:r>
+            <a:br>
+              <a:rPr lang="en-US" dirty="0"/>
+            </a:br>
+            <a:r>
+              <a:rPr lang="en-US" dirty="0"/>
+              <a:t>model</a:t>
+            </a:r>
+          </a:p>
+          <a:p>
+            <a:pPr algn="ctr"/>
+            <a:r>
+              <a:rPr lang="en-US" dirty="0"/>
+              <a:t>year</a:t>
+            </a:r>
+          </a:p>
+          <a:p>
+            <a:pPr algn="ctr"/>
+            <a:r>
+              <a:rPr lang="en-US" dirty="0"/>
+              <a:t>Mileage</a:t>
+            </a:r>
+          </a:p>
+          <a:p>
+            <a:pPr algn="ctr"/>
+            <a:r>
+              <a:rPr lang="en-US" dirty="0"/>
+              <a:t>price</a:t>
+            </a:r>
+          </a:p>
+          <a:p>
+            <a:pPr algn="ctr"/>
+            <a:endParaRPr lang="en-US" dirty="0"/>
+          </a:p>
+        </p:txBody>
+      </p:sp>
+      <p:sp>
+        <p:nvSpPr>
+          <p:cNvPr id="6" name="Rectangle 5">
+            <a:extLst>
+              <a:ext uri="{FF2B5EF4-FFF2-40B4-BE49-F238E27FC236}">
+                <a16:creationId xmlns:a16="http://schemas.microsoft.com/office/drawing/2014/main" id="{6CE48759-9931-EEB7-C1FF-FC530709E99C}"/>
+              </a:ext>
+            </a:extLst>
+          </p:cNvPr>
+          <p:cNvSpPr/>
+          <p:nvPr/>
+        </p:nvSpPr>
+        <p:spPr>
+          <a:xfrm>
+            <a:off x="3271156" y="163285"/>
+            <a:ext cx="1807029" cy="1240971"/>
+          </a:xfrm>
+          <a:prstGeom prst="rect">
+            <a:avLst/>
+          </a:prstGeom>
+          <a:solidFill>
+            <a:schemeClr val="accent2"/>
+          </a:solidFill>
+        </p:spPr>
+        <p:style>
+          <a:lnRef idx="2">
+            <a:schemeClr val="accent1">
+              <a:shade val="15000"/>
+            </a:schemeClr>
+          </a:lnRef>
+          <a:fillRef idx="1">
+            <a:schemeClr val="accent1"/>
+          </a:fillRef>
+          <a:effectRef idx="0">
+            <a:schemeClr val="accent1"/>
+          </a:effectRef>
+          <a:fontRef idx="minor">
+            <a:schemeClr val="lt1"/>
+          </a:fontRef>
+        </p:style>
+        <p:txBody>
+          <a:bodyPr rtlCol="0" anchor="ctr"/>
+          <a:lstStyle/>
+          <a:p>
+            <a:pPr algn="ctr"/>
+            <a:r>
+              <a:rPr lang="en-US" dirty="0"/>
+              <a:t>Car Component</a:t>
+            </a:r>
+          </a:p>
+        </p:txBody>
+      </p:sp>
+      <p:sp>
+        <p:nvSpPr>
+          <p:cNvPr id="7" name="Rectangle 6">
+            <a:extLst>
+              <a:ext uri="{FF2B5EF4-FFF2-40B4-BE49-F238E27FC236}">
+                <a16:creationId xmlns:a16="http://schemas.microsoft.com/office/drawing/2014/main" id="{45CB8103-B658-5DFA-D4B3-BD1D2AB49CF9}"/>
+              </a:ext>
+            </a:extLst>
+          </p:cNvPr>
+          <p:cNvSpPr/>
+          <p:nvPr/>
+        </p:nvSpPr>
+        <p:spPr>
+          <a:xfrm>
+            <a:off x="5617027" y="163285"/>
+            <a:ext cx="1807029" cy="1240971"/>
+          </a:xfrm>
+          <a:prstGeom prst="rect">
+            <a:avLst/>
+          </a:prstGeom>
+          <a:solidFill>
+            <a:schemeClr val="accent2"/>
+          </a:solidFill>
+        </p:spPr>
+        <p:style>
+          <a:lnRef idx="2">
+            <a:schemeClr val="accent1">
+              <a:shade val="15000"/>
+            </a:schemeClr>
+          </a:lnRef>
+          <a:fillRef idx="1">
+            <a:schemeClr val="accent1"/>
+          </a:fillRef>
+          <a:effectRef idx="0">
+            <a:schemeClr val="accent1"/>
+          </a:effectRef>
+          <a:fontRef idx="minor">
+            <a:schemeClr val="lt1"/>
+          </a:fontRef>
+        </p:style>
+        <p:txBody>
+          <a:bodyPr rtlCol="0" anchor="ctr"/>
+          <a:lstStyle/>
+          <a:p>
+            <a:pPr algn="ctr"/>
+            <a:r>
+              <a:rPr lang="en-US" dirty="0"/>
+              <a:t>Car Component</a:t>
+            </a:r>
+          </a:p>
+        </p:txBody>
+      </p:sp>
+      <p:sp>
+        <p:nvSpPr>
+          <p:cNvPr id="8" name="Rectangle 7">
+            <a:extLst>
+              <a:ext uri="{FF2B5EF4-FFF2-40B4-BE49-F238E27FC236}">
+                <a16:creationId xmlns:a16="http://schemas.microsoft.com/office/drawing/2014/main" id="{102A67EF-FA44-9603-9385-E8B4A882F5C2}"/>
+              </a:ext>
+            </a:extLst>
+          </p:cNvPr>
+          <p:cNvSpPr/>
+          <p:nvPr/>
+        </p:nvSpPr>
+        <p:spPr>
+          <a:xfrm>
+            <a:off x="7962898" y="163285"/>
+            <a:ext cx="1807029" cy="1240971"/>
+          </a:xfrm>
+          <a:prstGeom prst="rect">
+            <a:avLst/>
+          </a:prstGeom>
+          <a:solidFill>
+            <a:schemeClr val="accent2"/>
+          </a:solidFill>
+        </p:spPr>
+        <p:style>
+          <a:lnRef idx="2">
+            <a:schemeClr val="accent1">
+              <a:shade val="15000"/>
+            </a:schemeClr>
+          </a:lnRef>
+          <a:fillRef idx="1">
+            <a:schemeClr val="accent1"/>
+          </a:fillRef>
+          <a:effectRef idx="0">
+            <a:schemeClr val="accent1"/>
+          </a:effectRef>
+          <a:fontRef idx="minor">
+            <a:schemeClr val="lt1"/>
+          </a:fontRef>
+        </p:style>
+        <p:txBody>
+          <a:bodyPr rtlCol="0" anchor="ctr"/>
+          <a:lstStyle/>
+          <a:p>
+            <a:pPr algn="ctr"/>
+            <a:r>
+              <a:rPr lang="en-US" dirty="0"/>
+              <a:t>Car Component</a:t>
+            </a:r>
+          </a:p>
+        </p:txBody>
+      </p:sp>
+      <p:sp>
+        <p:nvSpPr>
+          <p:cNvPr id="9" name="Rectangle 8">
+            <a:extLst>
+              <a:ext uri="{FF2B5EF4-FFF2-40B4-BE49-F238E27FC236}">
+                <a16:creationId xmlns:a16="http://schemas.microsoft.com/office/drawing/2014/main" id="{ED515557-C263-9720-C52B-E98604E71EB2}"/>
+              </a:ext>
+            </a:extLst>
+          </p:cNvPr>
+          <p:cNvSpPr/>
+          <p:nvPr/>
+        </p:nvSpPr>
+        <p:spPr>
+          <a:xfrm>
+            <a:off x="3271156" y="1861456"/>
+            <a:ext cx="1807029" cy="1328058"/>
+          </a:xfrm>
+          <a:prstGeom prst="rect">
+            <a:avLst/>
+          </a:prstGeom>
+          <a:solidFill>
+            <a:schemeClr val="accent2"/>
+          </a:solidFill>
+        </p:spPr>
+        <p:style>
+          <a:lnRef idx="2">
+            <a:schemeClr val="accent1">
+              <a:shade val="15000"/>
+            </a:schemeClr>
+          </a:lnRef>
+          <a:fillRef idx="1">
+            <a:schemeClr val="accent1"/>
+          </a:fillRef>
+          <a:effectRef idx="0">
+            <a:schemeClr val="accent1"/>
+          </a:effectRef>
+          <a:fontRef idx="minor">
+            <a:schemeClr val="lt1"/>
+          </a:fontRef>
+        </p:style>
+        <p:txBody>
+          <a:bodyPr rtlCol="0" anchor="ctr"/>
+          <a:lstStyle/>
+          <a:p>
+            <a:pPr algn="ctr"/>
+            <a:r>
+              <a:rPr lang="en-US" dirty="0"/>
+              <a:t>Car Component</a:t>
+            </a:r>
+          </a:p>
+        </p:txBody>
+      </p:sp>
+      <p:sp>
+        <p:nvSpPr>
+          <p:cNvPr id="10" name="Rectangle 9">
+            <a:extLst>
+              <a:ext uri="{FF2B5EF4-FFF2-40B4-BE49-F238E27FC236}">
+                <a16:creationId xmlns:a16="http://schemas.microsoft.com/office/drawing/2014/main" id="{DABDB437-D5AA-9367-764E-1FF9D059956F}"/>
+              </a:ext>
+            </a:extLst>
+          </p:cNvPr>
+          <p:cNvSpPr/>
+          <p:nvPr/>
+        </p:nvSpPr>
+        <p:spPr>
+          <a:xfrm>
+            <a:off x="5617026" y="1904999"/>
+            <a:ext cx="1807029" cy="1240971"/>
+          </a:xfrm>
+          <a:prstGeom prst="rect">
+            <a:avLst/>
+          </a:prstGeom>
+          <a:solidFill>
+            <a:schemeClr val="accent2"/>
+          </a:solidFill>
+        </p:spPr>
+        <p:style>
+          <a:lnRef idx="2">
+            <a:schemeClr val="accent1">
+              <a:shade val="15000"/>
+            </a:schemeClr>
+          </a:lnRef>
+          <a:fillRef idx="1">
+            <a:schemeClr val="accent1"/>
+          </a:fillRef>
+          <a:effectRef idx="0">
+            <a:schemeClr val="accent1"/>
+          </a:effectRef>
+          <a:fontRef idx="minor">
+            <a:schemeClr val="lt1"/>
+          </a:fontRef>
+        </p:style>
+        <p:txBody>
+          <a:bodyPr rtlCol="0" anchor="ctr"/>
+          <a:lstStyle/>
+          <a:p>
+            <a:pPr algn="ctr"/>
+            <a:r>
+              <a:rPr lang="en-US" dirty="0"/>
+              <a:t>Car Component</a:t>
+            </a:r>
+          </a:p>
+        </p:txBody>
+      </p:sp>
+      <p:sp>
+        <p:nvSpPr>
+          <p:cNvPr id="11" name="Rectangle 10">
+            <a:extLst>
+              <a:ext uri="{FF2B5EF4-FFF2-40B4-BE49-F238E27FC236}">
+                <a16:creationId xmlns:a16="http://schemas.microsoft.com/office/drawing/2014/main" id="{0058A4D3-9314-0200-8C5E-15F14E7B1734}"/>
+              </a:ext>
+            </a:extLst>
+          </p:cNvPr>
+          <p:cNvSpPr/>
+          <p:nvPr/>
+        </p:nvSpPr>
+        <p:spPr>
+          <a:xfrm>
+            <a:off x="7962896" y="1861456"/>
+            <a:ext cx="1807029" cy="1240971"/>
+          </a:xfrm>
+          <a:prstGeom prst="rect">
+            <a:avLst/>
+          </a:prstGeom>
+          <a:solidFill>
+            <a:schemeClr val="accent2"/>
+          </a:solidFill>
+        </p:spPr>
+        <p:style>
+          <a:lnRef idx="2">
+            <a:schemeClr val="accent1">
+              <a:shade val="15000"/>
+            </a:schemeClr>
+          </a:lnRef>
+          <a:fillRef idx="1">
+            <a:schemeClr val="accent1"/>
+          </a:fillRef>
+          <a:effectRef idx="0">
+            <a:schemeClr val="accent1"/>
+          </a:effectRef>
+          <a:fontRef idx="minor">
+            <a:schemeClr val="lt1"/>
+          </a:fontRef>
+        </p:style>
+        <p:txBody>
+          <a:bodyPr rtlCol="0" anchor="ctr"/>
+          <a:lstStyle/>
+          <a:p>
+            <a:pPr algn="ctr"/>
+            <a:r>
+              <a:rPr lang="en-US" dirty="0"/>
+              <a:t>…</a:t>
+            </a:r>
+          </a:p>
+        </p:txBody>
+      </p:sp>
+      <p:sp>
+        <p:nvSpPr>
+          <p:cNvPr id="12" name="Rectangle 11">
+            <a:extLst>
+              <a:ext uri="{FF2B5EF4-FFF2-40B4-BE49-F238E27FC236}">
+                <a16:creationId xmlns:a16="http://schemas.microsoft.com/office/drawing/2014/main" id="{47C704A6-1BA3-7086-755C-966BB6600F9D}"/>
+              </a:ext>
+            </a:extLst>
+          </p:cNvPr>
+          <p:cNvSpPr/>
+          <p:nvPr/>
+        </p:nvSpPr>
+        <p:spPr>
+          <a:xfrm>
+            <a:off x="4735286" y="3646714"/>
+            <a:ext cx="4953000" cy="2939143"/>
+          </a:xfrm>
+          <a:prstGeom prst="rect">
+            <a:avLst/>
+          </a:prstGeom>
+          <a:solidFill>
+            <a:schemeClr val="accent6">
+              <a:lumMod val="60000"/>
+              <a:lumOff val="40000"/>
+            </a:schemeClr>
+          </a:solidFill>
+        </p:spPr>
+        <p:style>
+          <a:lnRef idx="2">
+            <a:schemeClr val="accent1">
+              <a:shade val="15000"/>
+            </a:schemeClr>
+          </a:lnRef>
+          <a:fillRef idx="1">
+            <a:schemeClr val="accent1"/>
+          </a:fillRef>
+          <a:effectRef idx="0">
+            <a:schemeClr val="accent1"/>
+          </a:effectRef>
+          <a:fontRef idx="minor">
+            <a:schemeClr val="lt1"/>
+          </a:fontRef>
+        </p:style>
+        <p:txBody>
+          <a:bodyPr rtlCol="0" anchor="ctr"/>
+          <a:lstStyle/>
+          <a:p>
+            <a:pPr algn="ctr"/>
+            <a:r>
+              <a:rPr lang="en-US" dirty="0"/>
+              <a:t>Make</a:t>
+            </a:r>
+          </a:p>
+          <a:p>
+            <a:pPr algn="ctr"/>
+            <a:r>
+              <a:rPr lang="en-US" dirty="0"/>
+              <a:t>Model</a:t>
+            </a:r>
+          </a:p>
+          <a:p>
+            <a:pPr algn="ctr"/>
+            <a:r>
+              <a:rPr lang="en-US" dirty="0"/>
+              <a:t>Year</a:t>
+            </a:r>
+          </a:p>
+          <a:p>
+            <a:pPr algn="ctr"/>
+            <a:r>
+              <a:rPr lang="en-US" dirty="0"/>
+              <a:t>Mileage</a:t>
+            </a:r>
+            <a:br>
+              <a:rPr lang="en-US" dirty="0"/>
+            </a:br>
+            <a:r>
+              <a:rPr lang="en-US" dirty="0"/>
+              <a:t>Price</a:t>
+            </a:r>
+          </a:p>
+          <a:p>
+            <a:pPr algn="ctr"/>
+            <a:r>
+              <a:rPr lang="en-US" dirty="0"/>
+              <a:t>Contact Button</a:t>
+            </a:r>
+            <a:br>
+              <a:rPr lang="en-US" dirty="0"/>
+            </a:br>
+            <a:r>
+              <a:rPr lang="en-US" dirty="0"/>
+              <a:t>[image… API?]</a:t>
+            </a:r>
+          </a:p>
+        </p:txBody>
+      </p:sp>
+      <p:cxnSp>
+        <p:nvCxnSpPr>
+          <p:cNvPr id="14" name="Straight Connector 13">
+            <a:extLst>
+              <a:ext uri="{FF2B5EF4-FFF2-40B4-BE49-F238E27FC236}">
+                <a16:creationId xmlns:a16="http://schemas.microsoft.com/office/drawing/2014/main" id="{8BC294AD-01C9-D036-AC19-DB6692D59230}"/>
+              </a:ext>
+            </a:extLst>
+          </p:cNvPr>
+          <p:cNvCxnSpPr/>
+          <p:nvPr/>
+        </p:nvCxnSpPr>
+        <p:spPr>
+          <a:xfrm>
+            <a:off x="3271156" y="3298371"/>
+            <a:ext cx="1377044" cy="3156857"/>
+          </a:xfrm>
+          <a:prstGeom prst="line">
+            <a:avLst/>
+          </a:prstGeom>
+        </p:spPr>
+        <p:style>
+          <a:lnRef idx="1">
+            <a:schemeClr val="accent1"/>
+          </a:lnRef>
+          <a:fillRef idx="0">
+            <a:schemeClr val="accent1"/>
+          </a:fillRef>
+          <a:effectRef idx="0">
+            <a:schemeClr val="accent1"/>
+          </a:effectRef>
+          <a:fontRef idx="minor">
+            <a:schemeClr val="tx1"/>
+          </a:fontRef>
+        </p:style>
+      </p:cxnSp>
+      <p:cxnSp>
+        <p:nvCxnSpPr>
+          <p:cNvPr id="15" name="Straight Connector 14">
+            <a:extLst>
+              <a:ext uri="{FF2B5EF4-FFF2-40B4-BE49-F238E27FC236}">
+                <a16:creationId xmlns:a16="http://schemas.microsoft.com/office/drawing/2014/main" id="{2A9F7BD2-B595-D8E0-DEA2-F1BB5AE45E98}"/>
+              </a:ext>
+            </a:extLst>
+          </p:cNvPr>
+          <p:cNvCxnSpPr>
+            <a:cxnSpLocks/>
+          </p:cNvCxnSpPr>
+          <p:nvPr/>
+        </p:nvCxnSpPr>
+        <p:spPr>
+          <a:xfrm>
+            <a:off x="5080905" y="1850571"/>
+            <a:ext cx="4607381" cy="1796143"/>
+          </a:xfrm>
+          <a:prstGeom prst="line">
+            <a:avLst/>
+          </a:prstGeom>
+        </p:spPr>
+        <p:style>
+          <a:lnRef idx="1">
+            <a:schemeClr val="accent1"/>
+          </a:lnRef>
+          <a:fillRef idx="0">
+            <a:schemeClr val="accent1"/>
+          </a:fillRef>
+          <a:effectRef idx="0">
+            <a:schemeClr val="accent1"/>
+          </a:effectRef>
+          <a:fontRef idx="minor">
+            <a:schemeClr val="tx1"/>
+          </a:fontRef>
+        </p:style>
+      </p:cxnSp>
+    </p:spTree>
+    <p:extLst>
+      <p:ext uri="{BB962C8B-B14F-4D97-AF65-F5344CB8AC3E}">
+        <p14:creationId xmlns:p14="http://schemas.microsoft.com/office/powerpoint/2010/main" val="2258453339"/>
       </p:ext>
     </p:extLst>
   </p:cSld>
@@ -10206,7 +13648,7 @@
             <p:ph idx="1"/>
             <p:extLst>
               <p:ext uri="{D42A27DB-BD31-4B8C-83A1-F6EECF244321}">
-                <p14:modId xmlns:p14="http://schemas.microsoft.com/office/powerpoint/2010/main" val="543631603"/>
+                <p14:modId xmlns:p14="http://schemas.microsoft.com/office/powerpoint/2010/main" val="1289354378"/>
               </p:ext>
             </p:extLst>
           </p:nvPr>
@@ -10223,32 +13665,49 @@
       </p:graphicFrame>
       <p:pic>
         <p:nvPicPr>
-          <p:cNvPr id="4" name="Picture 3">
+          <p:cNvPr id="2" name="Picture 2" descr="Logo">
             <a:extLst>
               <a:ext uri="{FF2B5EF4-FFF2-40B4-BE49-F238E27FC236}">
-                <a16:creationId xmlns:a16="http://schemas.microsoft.com/office/drawing/2014/main" id="{96DBA591-30C7-56EC-B73A-DCB602FA6D27}"/>
+                <a16:creationId xmlns:a16="http://schemas.microsoft.com/office/drawing/2014/main" id="{A34664E2-05A0-3F9C-008B-563FBD6B03D1}"/>
               </a:ext>
             </a:extLst>
           </p:cNvPr>
           <p:cNvPicPr>
-            <a:picLocks noChangeAspect="1"/>
+            <a:picLocks noChangeAspect="1" noChangeArrowheads="1"/>
           </p:cNvPicPr>
           <p:nvPr/>
         </p:nvPicPr>
         <p:blipFill>
-          <a:blip r:embed="rId7"/>
+          <a:blip r:embed="rId7">
+            <a:extLst>
+              <a:ext uri="{28A0092B-C50C-407E-A947-70E740481C1C}">
+                <a14:useLocalDpi xmlns:a14="http://schemas.microsoft.com/office/drawing/2010/main" val="0"/>
+              </a:ext>
+            </a:extLst>
+          </a:blip>
+          <a:srcRect/>
           <a:stretch>
             <a:fillRect/>
           </a:stretch>
         </p:blipFill>
-        <p:spPr>
+        <p:spPr bwMode="auto">
           <a:xfrm>
-            <a:off x="838200" y="191386"/>
-            <a:ext cx="3056667" cy="1267255"/>
+            <a:off x="662693" y="440573"/>
+            <a:ext cx="3407802" cy="823233"/>
           </a:xfrm>
           <a:prstGeom prst="rect">
             <a:avLst/>
           </a:prstGeom>
+          <a:noFill/>
+          <a:extLst>
+            <a:ext uri="{909E8E84-426E-40DD-AFC4-6F175D3DCCD1}">
+              <a14:hiddenFill xmlns:a14="http://schemas.microsoft.com/office/drawing/2010/main">
+                <a:solidFill>
+                  <a:srgbClr val="FFFFFF"/>
+                </a:solidFill>
+              </a14:hiddenFill>
+            </a:ext>
+          </a:extLst>
         </p:spPr>
       </p:pic>
     </p:spTree>
@@ -10265,6 +13724,109 @@
 </file>
 
 <file path=ppt/slides/slide3.xml><?xml version="1.0" encoding="utf-8"?>
+<p:sld xmlns:a="http://schemas.openxmlformats.org/drawingml/2006/main" xmlns:r="http://schemas.openxmlformats.org/officeDocument/2006/relationships" xmlns:p="http://schemas.openxmlformats.org/presentationml/2006/main" show="0">
+  <p:cSld>
+    <p:spTree>
+      <p:nvGrpSpPr>
+        <p:cNvPr id="1" name=""/>
+        <p:cNvGrpSpPr/>
+        <p:nvPr/>
+      </p:nvGrpSpPr>
+      <p:grpSpPr>
+        <a:xfrm>
+          <a:off x="0" y="0"/>
+          <a:ext cx="0" cy="0"/>
+          <a:chOff x="0" y="0"/>
+          <a:chExt cx="0" cy="0"/>
+        </a:xfrm>
+      </p:grpSpPr>
+      <p:graphicFrame>
+        <p:nvGraphicFramePr>
+          <p:cNvPr id="5" name="Content Placeholder 2">
+            <a:extLst>
+              <a:ext uri="{FF2B5EF4-FFF2-40B4-BE49-F238E27FC236}">
+                <a16:creationId xmlns:a16="http://schemas.microsoft.com/office/drawing/2014/main" id="{52346320-6909-C3CB-E128-8F126DCA193E}"/>
+              </a:ext>
+            </a:extLst>
+          </p:cNvPr>
+          <p:cNvGraphicFramePr>
+            <a:graphicFrameLocks noGrp="1"/>
+          </p:cNvGraphicFramePr>
+          <p:nvPr>
+            <p:ph idx="1"/>
+          </p:nvPr>
+        </p:nvGraphicFramePr>
+        <p:xfrm>
+          <a:off x="838200" y="1737360"/>
+          <a:ext cx="10506456" cy="4535424"/>
+        </p:xfrm>
+        <a:graphic>
+          <a:graphicData uri="http://schemas.openxmlformats.org/drawingml/2006/diagram">
+            <dgm:relIds xmlns:dgm="http://schemas.openxmlformats.org/drawingml/2006/diagram" xmlns:r="http://schemas.openxmlformats.org/officeDocument/2006/relationships" r:dm="rId2" r:lo="rId3" r:qs="rId4" r:cs="rId5"/>
+          </a:graphicData>
+        </a:graphic>
+      </p:graphicFrame>
+      <p:pic>
+        <p:nvPicPr>
+          <p:cNvPr id="2" name="Picture 2" descr="Logo">
+            <a:extLst>
+              <a:ext uri="{FF2B5EF4-FFF2-40B4-BE49-F238E27FC236}">
+                <a16:creationId xmlns:a16="http://schemas.microsoft.com/office/drawing/2014/main" id="{A34664E2-05A0-3F9C-008B-563FBD6B03D1}"/>
+              </a:ext>
+            </a:extLst>
+          </p:cNvPr>
+          <p:cNvPicPr>
+            <a:picLocks noChangeAspect="1" noChangeArrowheads="1"/>
+          </p:cNvPicPr>
+          <p:nvPr/>
+        </p:nvPicPr>
+        <p:blipFill>
+          <a:blip r:embed="rId7">
+            <a:extLst>
+              <a:ext uri="{28A0092B-C50C-407E-A947-70E740481C1C}">
+                <a14:useLocalDpi xmlns:a14="http://schemas.microsoft.com/office/drawing/2010/main" val="0"/>
+              </a:ext>
+            </a:extLst>
+          </a:blip>
+          <a:srcRect/>
+          <a:stretch>
+            <a:fillRect/>
+          </a:stretch>
+        </p:blipFill>
+        <p:spPr bwMode="auto">
+          <a:xfrm>
+            <a:off x="662693" y="440573"/>
+            <a:ext cx="3407802" cy="823233"/>
+          </a:xfrm>
+          <a:prstGeom prst="rect">
+            <a:avLst/>
+          </a:prstGeom>
+          <a:noFill/>
+          <a:extLst>
+            <a:ext uri="{909E8E84-426E-40DD-AFC4-6F175D3DCCD1}">
+              <a14:hiddenFill xmlns:a14="http://schemas.microsoft.com/office/drawing/2010/main">
+                <a:solidFill>
+                  <a:srgbClr val="FFFFFF"/>
+                </a:solidFill>
+              </a14:hiddenFill>
+            </a:ext>
+          </a:extLst>
+        </p:spPr>
+      </p:pic>
+    </p:spTree>
+    <p:extLst>
+      <p:ext uri="{BB962C8B-B14F-4D97-AF65-F5344CB8AC3E}">
+        <p14:creationId xmlns:p14="http://schemas.microsoft.com/office/powerpoint/2010/main" val="3612100350"/>
+      </p:ext>
+    </p:extLst>
+  </p:cSld>
+  <p:clrMapOvr>
+    <a:masterClrMapping/>
+  </p:clrMapOvr>
+</p:sld>
+</file>
+
+<file path=ppt/slides/slide4.xml><?xml version="1.0" encoding="utf-8"?>
 <p:sld xmlns:a="http://schemas.openxmlformats.org/drawingml/2006/main" xmlns:r="http://schemas.openxmlformats.org/officeDocument/2006/relationships" xmlns:p="http://schemas.openxmlformats.org/presentationml/2006/main">
   <p:cSld>
     <p:bg>
@@ -10729,7 +14291,7 @@
 </p:sld>
 </file>
 
-<file path=ppt/slides/slide4.xml><?xml version="1.0" encoding="utf-8"?>
+<file path=ppt/slides/slide5.xml><?xml version="1.0" encoding="utf-8"?>
 <p:sld xmlns:a="http://schemas.openxmlformats.org/drawingml/2006/main" xmlns:r="http://schemas.openxmlformats.org/officeDocument/2006/relationships" xmlns:p="http://schemas.openxmlformats.org/presentationml/2006/main">
   <p:cSld>
     <p:bg>
@@ -10812,8 +14374,37 @@
           <a:bodyPr rtlCol="0" anchor="ctr"/>
           <a:lstStyle/>
           <a:p>
-            <a:pPr algn="ctr"/>
-            <a:endParaRPr lang="en-US"/>
+            <a:pPr marL="0" marR="0" lvl="0" indent="0" algn="ctr" defTabSz="914400" rtl="0" eaLnBrk="1" fontAlgn="auto" latinLnBrk="0" hangingPunct="1">
+              <a:lnSpc>
+                <a:spcPct val="100000"/>
+              </a:lnSpc>
+              <a:spcBef>
+                <a:spcPts val="0"/>
+              </a:spcBef>
+              <a:spcAft>
+                <a:spcPts val="0"/>
+              </a:spcAft>
+              <a:buClrTx/>
+              <a:buSzTx/>
+              <a:buFontTx/>
+              <a:buNone/>
+              <a:tabLst/>
+              <a:defRPr/>
+            </a:pPr>
+            <a:endParaRPr kumimoji="0" lang="en-US" sz="1800" b="0" i="0" u="none" strike="noStrike" kern="1200" cap="none" spc="0" normalizeH="0" baseline="0" noProof="0">
+              <a:ln>
+                <a:noFill/>
+              </a:ln>
+              <a:solidFill>
+                <a:prstClr val="white"/>
+              </a:solidFill>
+              <a:effectLst/>
+              <a:uLnTx/>
+              <a:uFillTx/>
+              <a:latin typeface="Calibri" panose="020F0502020204030204"/>
+              <a:ea typeface="+mn-ea"/>
+              <a:cs typeface="+mn-cs"/>
+            </a:endParaRPr>
           </a:p>
         </p:txBody>
       </p:sp>
@@ -10919,8 +14510,37 @@
           <a:bodyPr rtlCol="0" anchor="ctr"/>
           <a:lstStyle/>
           <a:p>
-            <a:pPr algn="ctr"/>
-            <a:endParaRPr lang="en-US"/>
+            <a:pPr marL="0" marR="0" lvl="0" indent="0" algn="ctr" defTabSz="914400" rtl="0" eaLnBrk="1" fontAlgn="auto" latinLnBrk="0" hangingPunct="1">
+              <a:lnSpc>
+                <a:spcPct val="100000"/>
+              </a:lnSpc>
+              <a:spcBef>
+                <a:spcPts val="0"/>
+              </a:spcBef>
+              <a:spcAft>
+                <a:spcPts val="0"/>
+              </a:spcAft>
+              <a:buClrTx/>
+              <a:buSzTx/>
+              <a:buFontTx/>
+              <a:buNone/>
+              <a:tabLst/>
+              <a:defRPr/>
+            </a:pPr>
+            <a:endParaRPr kumimoji="0" lang="en-US" sz="1800" b="0" i="0" u="none" strike="noStrike" kern="1200" cap="none" spc="0" normalizeH="0" baseline="0" noProof="0">
+              <a:ln>
+                <a:noFill/>
+              </a:ln>
+              <a:solidFill>
+                <a:prstClr val="white"/>
+              </a:solidFill>
+              <a:effectLst/>
+              <a:uLnTx/>
+              <a:uFillTx/>
+              <a:latin typeface="Calibri" panose="020F0502020204030204"/>
+              <a:ea typeface="+mn-ea"/>
+              <a:cs typeface="+mn-cs"/>
+            </a:endParaRPr>
           </a:p>
         </p:txBody>
       </p:sp>
@@ -10938,11 +14558,6 @@
           </p:cNvGraphicFramePr>
           <p:nvPr>
             <p:ph idx="1"/>
-            <p:extLst>
-              <p:ext uri="{D42A27DB-BD31-4B8C-83A1-F6EECF244321}">
-                <p14:modId xmlns:p14="http://schemas.microsoft.com/office/powerpoint/2010/main" val="402121594"/>
-              </p:ext>
-            </p:extLst>
           </p:nvPr>
         </p:nvGraphicFramePr>
         <p:xfrm>
@@ -11354,7 +14969,7 @@
     </p:spTree>
     <p:extLst>
       <p:ext uri="{BB962C8B-B14F-4D97-AF65-F5344CB8AC3E}">
-        <p14:creationId xmlns:p14="http://schemas.microsoft.com/office/powerpoint/2010/main" val="4214501867"/>
+        <p14:creationId xmlns:p14="http://schemas.microsoft.com/office/powerpoint/2010/main" val="2277023890"/>
       </p:ext>
     </p:extLst>
   </p:cSld>
@@ -11364,7 +14979,7 @@
 </p:sld>
 </file>
 
-<file path=ppt/slides/slide5.xml><?xml version="1.0" encoding="utf-8"?>
+<file path=ppt/slides/slide6.xml><?xml version="1.0" encoding="utf-8"?>
 <p:sld xmlns:a="http://schemas.openxmlformats.org/drawingml/2006/main" xmlns:r="http://schemas.openxmlformats.org/officeDocument/2006/relationships" xmlns:p="http://schemas.openxmlformats.org/presentationml/2006/main">
   <p:cSld>
     <p:bg>
@@ -11977,7 +15592,7 @@
 </p:sld>
 </file>
 
-<file path=ppt/slides/slide6.xml><?xml version="1.0" encoding="utf-8"?>
+<file path=ppt/slides/slide7.xml><?xml version="1.0" encoding="utf-8"?>
 <p:sld xmlns:a="http://schemas.openxmlformats.org/drawingml/2006/main" xmlns:r="http://schemas.openxmlformats.org/officeDocument/2006/relationships" xmlns:p="http://schemas.openxmlformats.org/presentationml/2006/main">
   <p:cSld>
     <p:spTree>
@@ -12105,7 +15720,7 @@
 </p:sld>
 </file>
 
-<file path=ppt/slides/slide7.xml><?xml version="1.0" encoding="utf-8"?>
+<file path=ppt/slides/slide8.xml><?xml version="1.0" encoding="utf-8"?>
 <p:sld xmlns:a="http://schemas.openxmlformats.org/drawingml/2006/main" xmlns:r="http://schemas.openxmlformats.org/officeDocument/2006/relationships" xmlns:p="http://schemas.openxmlformats.org/presentationml/2006/main">
   <p:cSld>
     <p:spTree>
@@ -12739,7 +16354,7 @@
 </p:sld>
 </file>
 
-<file path=ppt/slides/slide8.xml><?xml version="1.0" encoding="utf-8"?>
+<file path=ppt/slides/slide9.xml><?xml version="1.0" encoding="utf-8"?>
 <p:sld xmlns:a="http://schemas.openxmlformats.org/drawingml/2006/main" xmlns:r="http://schemas.openxmlformats.org/officeDocument/2006/relationships" xmlns:p="http://schemas.openxmlformats.org/presentationml/2006/main">
   <p:cSld>
     <p:spTree>
@@ -13030,662 +16645,6 @@
     <p:extLst>
       <p:ext uri="{BB962C8B-B14F-4D97-AF65-F5344CB8AC3E}">
         <p14:creationId xmlns:p14="http://schemas.microsoft.com/office/powerpoint/2010/main" val="2381792123"/>
-      </p:ext>
-    </p:extLst>
-  </p:cSld>
-  <p:clrMapOvr>
-    <a:masterClrMapping/>
-  </p:clrMapOvr>
-</p:sld>
-</file>
-
-<file path=ppt/slides/slide9.xml><?xml version="1.0" encoding="utf-8"?>
-<p:sld xmlns:a="http://schemas.openxmlformats.org/drawingml/2006/main" xmlns:r="http://schemas.openxmlformats.org/officeDocument/2006/relationships" xmlns:p="http://schemas.openxmlformats.org/presentationml/2006/main">
-  <p:cSld>
-    <p:spTree>
-      <p:nvGrpSpPr>
-        <p:cNvPr id="1" name=""/>
-        <p:cNvGrpSpPr/>
-        <p:nvPr/>
-      </p:nvGrpSpPr>
-      <p:grpSpPr>
-        <a:xfrm>
-          <a:off x="0" y="0"/>
-          <a:ext cx="0" cy="0"/>
-          <a:chOff x="0" y="0"/>
-          <a:chExt cx="0" cy="0"/>
-        </a:xfrm>
-      </p:grpSpPr>
-      <p:sp>
-        <p:nvSpPr>
-          <p:cNvPr id="17" name="Rectangle 16">
-            <a:extLst>
-              <a:ext uri="{FF2B5EF4-FFF2-40B4-BE49-F238E27FC236}">
-                <a16:creationId xmlns:a16="http://schemas.microsoft.com/office/drawing/2014/main" id="{4B14899B-4AE4-D583-40E2-253AE557B774}"/>
-              </a:ext>
-            </a:extLst>
-          </p:cNvPr>
-          <p:cNvSpPr/>
-          <p:nvPr/>
-        </p:nvSpPr>
-        <p:spPr>
-          <a:xfrm>
-            <a:off x="3004457" y="163285"/>
-            <a:ext cx="7173686" cy="6531430"/>
-          </a:xfrm>
-          <a:prstGeom prst="rect">
-            <a:avLst/>
-          </a:prstGeom>
-          <a:solidFill>
-            <a:schemeClr val="accent4">
-              <a:lumMod val="60000"/>
-              <a:lumOff val="40000"/>
-            </a:schemeClr>
-          </a:solidFill>
-        </p:spPr>
-        <p:style>
-          <a:lnRef idx="2">
-            <a:schemeClr val="accent1">
-              <a:shade val="15000"/>
-            </a:schemeClr>
-          </a:lnRef>
-          <a:fillRef idx="1">
-            <a:schemeClr val="accent1"/>
-          </a:fillRef>
-          <a:effectRef idx="0">
-            <a:schemeClr val="accent1"/>
-          </a:effectRef>
-          <a:fontRef idx="minor">
-            <a:schemeClr val="lt1"/>
-          </a:fontRef>
-        </p:style>
-        <p:txBody>
-          <a:bodyPr rtlCol="0" anchor="ctr"/>
-          <a:lstStyle/>
-          <a:p>
-            <a:pPr algn="ctr"/>
-            <a:endParaRPr lang="en-US" dirty="0"/>
-          </a:p>
-        </p:txBody>
-      </p:sp>
-      <p:sp>
-        <p:nvSpPr>
-          <p:cNvPr id="5" name="Rectangle 4">
-            <a:extLst>
-              <a:ext uri="{FF2B5EF4-FFF2-40B4-BE49-F238E27FC236}">
-                <a16:creationId xmlns:a16="http://schemas.microsoft.com/office/drawing/2014/main" id="{79875C78-E69B-D6EE-9FAD-29CB8952770E}"/>
-              </a:ext>
-            </a:extLst>
-          </p:cNvPr>
-          <p:cNvSpPr/>
-          <p:nvPr/>
-        </p:nvSpPr>
-        <p:spPr>
-          <a:xfrm>
-            <a:off x="283029" y="163285"/>
-            <a:ext cx="2449285" cy="6291943"/>
-          </a:xfrm>
-          <a:prstGeom prst="rect">
-            <a:avLst/>
-          </a:prstGeom>
-        </p:spPr>
-        <p:style>
-          <a:lnRef idx="2">
-            <a:schemeClr val="accent1">
-              <a:shade val="15000"/>
-            </a:schemeClr>
-          </a:lnRef>
-          <a:fillRef idx="1">
-            <a:schemeClr val="accent1"/>
-          </a:fillRef>
-          <a:effectRef idx="0">
-            <a:schemeClr val="accent1"/>
-          </a:effectRef>
-          <a:fontRef idx="minor">
-            <a:schemeClr val="lt1"/>
-          </a:fontRef>
-        </p:style>
-        <p:txBody>
-          <a:bodyPr rtlCol="0" anchor="ctr"/>
-          <a:lstStyle/>
-          <a:p>
-            <a:pPr algn="ctr"/>
-            <a:r>
-              <a:rPr lang="en-US" dirty="0"/>
-              <a:t>Filters</a:t>
-            </a:r>
-          </a:p>
-          <a:p>
-            <a:pPr algn="ctr"/>
-            <a:br>
-              <a:rPr lang="en-US" dirty="0"/>
-            </a:br>
-            <a:r>
-              <a:rPr lang="en-US" dirty="0"/>
-              <a:t>make</a:t>
-            </a:r>
-            <a:br>
-              <a:rPr lang="en-US" dirty="0"/>
-            </a:br>
-            <a:r>
-              <a:rPr lang="en-US" dirty="0"/>
-              <a:t>model</a:t>
-            </a:r>
-          </a:p>
-          <a:p>
-            <a:pPr algn="ctr"/>
-            <a:r>
-              <a:rPr lang="en-US" dirty="0"/>
-              <a:t>year</a:t>
-            </a:r>
-          </a:p>
-          <a:p>
-            <a:pPr algn="ctr"/>
-            <a:r>
-              <a:rPr lang="en-US" dirty="0"/>
-              <a:t>Mileage</a:t>
-            </a:r>
-          </a:p>
-          <a:p>
-            <a:pPr algn="ctr"/>
-            <a:r>
-              <a:rPr lang="en-US" dirty="0"/>
-              <a:t>price</a:t>
-            </a:r>
-          </a:p>
-          <a:p>
-            <a:pPr algn="ctr"/>
-            <a:endParaRPr lang="en-US" dirty="0"/>
-          </a:p>
-        </p:txBody>
-      </p:sp>
-      <p:sp>
-        <p:nvSpPr>
-          <p:cNvPr id="6" name="Rectangle 5">
-            <a:extLst>
-              <a:ext uri="{FF2B5EF4-FFF2-40B4-BE49-F238E27FC236}">
-                <a16:creationId xmlns:a16="http://schemas.microsoft.com/office/drawing/2014/main" id="{6CE48759-9931-EEB7-C1FF-FC530709E99C}"/>
-              </a:ext>
-            </a:extLst>
-          </p:cNvPr>
-          <p:cNvSpPr/>
-          <p:nvPr/>
-        </p:nvSpPr>
-        <p:spPr>
-          <a:xfrm>
-            <a:off x="3271156" y="163285"/>
-            <a:ext cx="1807029" cy="1240971"/>
-          </a:xfrm>
-          <a:prstGeom prst="rect">
-            <a:avLst/>
-          </a:prstGeom>
-          <a:solidFill>
-            <a:schemeClr val="accent2"/>
-          </a:solidFill>
-        </p:spPr>
-        <p:style>
-          <a:lnRef idx="2">
-            <a:schemeClr val="accent1">
-              <a:shade val="15000"/>
-            </a:schemeClr>
-          </a:lnRef>
-          <a:fillRef idx="1">
-            <a:schemeClr val="accent1"/>
-          </a:fillRef>
-          <a:effectRef idx="0">
-            <a:schemeClr val="accent1"/>
-          </a:effectRef>
-          <a:fontRef idx="minor">
-            <a:schemeClr val="lt1"/>
-          </a:fontRef>
-        </p:style>
-        <p:txBody>
-          <a:bodyPr rtlCol="0" anchor="ctr"/>
-          <a:lstStyle/>
-          <a:p>
-            <a:pPr algn="ctr"/>
-            <a:r>
-              <a:rPr lang="en-US" dirty="0"/>
-              <a:t>Car Component</a:t>
-            </a:r>
-          </a:p>
-        </p:txBody>
-      </p:sp>
-      <p:sp>
-        <p:nvSpPr>
-          <p:cNvPr id="7" name="Rectangle 6">
-            <a:extLst>
-              <a:ext uri="{FF2B5EF4-FFF2-40B4-BE49-F238E27FC236}">
-                <a16:creationId xmlns:a16="http://schemas.microsoft.com/office/drawing/2014/main" id="{45CB8103-B658-5DFA-D4B3-BD1D2AB49CF9}"/>
-              </a:ext>
-            </a:extLst>
-          </p:cNvPr>
-          <p:cNvSpPr/>
-          <p:nvPr/>
-        </p:nvSpPr>
-        <p:spPr>
-          <a:xfrm>
-            <a:off x="5617027" y="163285"/>
-            <a:ext cx="1807029" cy="1240971"/>
-          </a:xfrm>
-          <a:prstGeom prst="rect">
-            <a:avLst/>
-          </a:prstGeom>
-          <a:solidFill>
-            <a:schemeClr val="accent2"/>
-          </a:solidFill>
-        </p:spPr>
-        <p:style>
-          <a:lnRef idx="2">
-            <a:schemeClr val="accent1">
-              <a:shade val="15000"/>
-            </a:schemeClr>
-          </a:lnRef>
-          <a:fillRef idx="1">
-            <a:schemeClr val="accent1"/>
-          </a:fillRef>
-          <a:effectRef idx="0">
-            <a:schemeClr val="accent1"/>
-          </a:effectRef>
-          <a:fontRef idx="minor">
-            <a:schemeClr val="lt1"/>
-          </a:fontRef>
-        </p:style>
-        <p:txBody>
-          <a:bodyPr rtlCol="0" anchor="ctr"/>
-          <a:lstStyle/>
-          <a:p>
-            <a:pPr algn="ctr"/>
-            <a:r>
-              <a:rPr lang="en-US" dirty="0"/>
-              <a:t>Car Component</a:t>
-            </a:r>
-          </a:p>
-        </p:txBody>
-      </p:sp>
-      <p:sp>
-        <p:nvSpPr>
-          <p:cNvPr id="8" name="Rectangle 7">
-            <a:extLst>
-              <a:ext uri="{FF2B5EF4-FFF2-40B4-BE49-F238E27FC236}">
-                <a16:creationId xmlns:a16="http://schemas.microsoft.com/office/drawing/2014/main" id="{102A67EF-FA44-9603-9385-E8B4A882F5C2}"/>
-              </a:ext>
-            </a:extLst>
-          </p:cNvPr>
-          <p:cNvSpPr/>
-          <p:nvPr/>
-        </p:nvSpPr>
-        <p:spPr>
-          <a:xfrm>
-            <a:off x="7962898" y="163285"/>
-            <a:ext cx="1807029" cy="1240971"/>
-          </a:xfrm>
-          <a:prstGeom prst="rect">
-            <a:avLst/>
-          </a:prstGeom>
-          <a:solidFill>
-            <a:schemeClr val="accent2"/>
-          </a:solidFill>
-        </p:spPr>
-        <p:style>
-          <a:lnRef idx="2">
-            <a:schemeClr val="accent1">
-              <a:shade val="15000"/>
-            </a:schemeClr>
-          </a:lnRef>
-          <a:fillRef idx="1">
-            <a:schemeClr val="accent1"/>
-          </a:fillRef>
-          <a:effectRef idx="0">
-            <a:schemeClr val="accent1"/>
-          </a:effectRef>
-          <a:fontRef idx="minor">
-            <a:schemeClr val="lt1"/>
-          </a:fontRef>
-        </p:style>
-        <p:txBody>
-          <a:bodyPr rtlCol="0" anchor="ctr"/>
-          <a:lstStyle/>
-          <a:p>
-            <a:pPr algn="ctr"/>
-            <a:r>
-              <a:rPr lang="en-US" dirty="0"/>
-              <a:t>Car Component</a:t>
-            </a:r>
-          </a:p>
-        </p:txBody>
-      </p:sp>
-      <p:sp>
-        <p:nvSpPr>
-          <p:cNvPr id="9" name="Rectangle 8">
-            <a:extLst>
-              <a:ext uri="{FF2B5EF4-FFF2-40B4-BE49-F238E27FC236}">
-                <a16:creationId xmlns:a16="http://schemas.microsoft.com/office/drawing/2014/main" id="{ED515557-C263-9720-C52B-E98604E71EB2}"/>
-              </a:ext>
-            </a:extLst>
-          </p:cNvPr>
-          <p:cNvSpPr/>
-          <p:nvPr/>
-        </p:nvSpPr>
-        <p:spPr>
-          <a:xfrm>
-            <a:off x="3271156" y="1861456"/>
-            <a:ext cx="1807029" cy="1328058"/>
-          </a:xfrm>
-          <a:prstGeom prst="rect">
-            <a:avLst/>
-          </a:prstGeom>
-          <a:solidFill>
-            <a:schemeClr val="accent2"/>
-          </a:solidFill>
-        </p:spPr>
-        <p:style>
-          <a:lnRef idx="2">
-            <a:schemeClr val="accent1">
-              <a:shade val="15000"/>
-            </a:schemeClr>
-          </a:lnRef>
-          <a:fillRef idx="1">
-            <a:schemeClr val="accent1"/>
-          </a:fillRef>
-          <a:effectRef idx="0">
-            <a:schemeClr val="accent1"/>
-          </a:effectRef>
-          <a:fontRef idx="minor">
-            <a:schemeClr val="lt1"/>
-          </a:fontRef>
-        </p:style>
-        <p:txBody>
-          <a:bodyPr rtlCol="0" anchor="ctr"/>
-          <a:lstStyle/>
-          <a:p>
-            <a:pPr algn="ctr"/>
-            <a:r>
-              <a:rPr lang="en-US" dirty="0"/>
-              <a:t>Car Component</a:t>
-            </a:r>
-          </a:p>
-        </p:txBody>
-      </p:sp>
-      <p:sp>
-        <p:nvSpPr>
-          <p:cNvPr id="10" name="Rectangle 9">
-            <a:extLst>
-              <a:ext uri="{FF2B5EF4-FFF2-40B4-BE49-F238E27FC236}">
-                <a16:creationId xmlns:a16="http://schemas.microsoft.com/office/drawing/2014/main" id="{DABDB437-D5AA-9367-764E-1FF9D059956F}"/>
-              </a:ext>
-            </a:extLst>
-          </p:cNvPr>
-          <p:cNvSpPr/>
-          <p:nvPr/>
-        </p:nvSpPr>
-        <p:spPr>
-          <a:xfrm>
-            <a:off x="5617026" y="1904999"/>
-            <a:ext cx="1807029" cy="1240971"/>
-          </a:xfrm>
-          <a:prstGeom prst="rect">
-            <a:avLst/>
-          </a:prstGeom>
-          <a:solidFill>
-            <a:schemeClr val="accent2"/>
-          </a:solidFill>
-        </p:spPr>
-        <p:style>
-          <a:lnRef idx="2">
-            <a:schemeClr val="accent1">
-              <a:shade val="15000"/>
-            </a:schemeClr>
-          </a:lnRef>
-          <a:fillRef idx="1">
-            <a:schemeClr val="accent1"/>
-          </a:fillRef>
-          <a:effectRef idx="0">
-            <a:schemeClr val="accent1"/>
-          </a:effectRef>
-          <a:fontRef idx="minor">
-            <a:schemeClr val="lt1"/>
-          </a:fontRef>
-        </p:style>
-        <p:txBody>
-          <a:bodyPr rtlCol="0" anchor="ctr"/>
-          <a:lstStyle/>
-          <a:p>
-            <a:pPr algn="ctr"/>
-            <a:r>
-              <a:rPr lang="en-US" dirty="0"/>
-              <a:t>Car Component</a:t>
-            </a:r>
-          </a:p>
-        </p:txBody>
-      </p:sp>
-      <p:sp>
-        <p:nvSpPr>
-          <p:cNvPr id="11" name="Rectangle 10">
-            <a:extLst>
-              <a:ext uri="{FF2B5EF4-FFF2-40B4-BE49-F238E27FC236}">
-                <a16:creationId xmlns:a16="http://schemas.microsoft.com/office/drawing/2014/main" id="{0058A4D3-9314-0200-8C5E-15F14E7B1734}"/>
-              </a:ext>
-            </a:extLst>
-          </p:cNvPr>
-          <p:cNvSpPr/>
-          <p:nvPr/>
-        </p:nvSpPr>
-        <p:spPr>
-          <a:xfrm>
-            <a:off x="7962896" y="1861456"/>
-            <a:ext cx="1807029" cy="1240971"/>
-          </a:xfrm>
-          <a:prstGeom prst="rect">
-            <a:avLst/>
-          </a:prstGeom>
-          <a:solidFill>
-            <a:schemeClr val="accent2"/>
-          </a:solidFill>
-        </p:spPr>
-        <p:style>
-          <a:lnRef idx="2">
-            <a:schemeClr val="accent1">
-              <a:shade val="15000"/>
-            </a:schemeClr>
-          </a:lnRef>
-          <a:fillRef idx="1">
-            <a:schemeClr val="accent1"/>
-          </a:fillRef>
-          <a:effectRef idx="0">
-            <a:schemeClr val="accent1"/>
-          </a:effectRef>
-          <a:fontRef idx="minor">
-            <a:schemeClr val="lt1"/>
-          </a:fontRef>
-        </p:style>
-        <p:txBody>
-          <a:bodyPr rtlCol="0" anchor="ctr"/>
-          <a:lstStyle/>
-          <a:p>
-            <a:pPr algn="ctr"/>
-            <a:r>
-              <a:rPr lang="en-US" dirty="0"/>
-              <a:t>…</a:t>
-            </a:r>
-          </a:p>
-        </p:txBody>
-      </p:sp>
-      <p:sp>
-        <p:nvSpPr>
-          <p:cNvPr id="12" name="Rectangle 11">
-            <a:extLst>
-              <a:ext uri="{FF2B5EF4-FFF2-40B4-BE49-F238E27FC236}">
-                <a16:creationId xmlns:a16="http://schemas.microsoft.com/office/drawing/2014/main" id="{47C704A6-1BA3-7086-755C-966BB6600F9D}"/>
-              </a:ext>
-            </a:extLst>
-          </p:cNvPr>
-          <p:cNvSpPr/>
-          <p:nvPr/>
-        </p:nvSpPr>
-        <p:spPr>
-          <a:xfrm>
-            <a:off x="4735286" y="3646714"/>
-            <a:ext cx="4953000" cy="2939143"/>
-          </a:xfrm>
-          <a:prstGeom prst="rect">
-            <a:avLst/>
-          </a:prstGeom>
-          <a:solidFill>
-            <a:schemeClr val="accent6">
-              <a:lumMod val="60000"/>
-              <a:lumOff val="40000"/>
-            </a:schemeClr>
-          </a:solidFill>
-        </p:spPr>
-        <p:style>
-          <a:lnRef idx="2">
-            <a:schemeClr val="accent1">
-              <a:shade val="15000"/>
-            </a:schemeClr>
-          </a:lnRef>
-          <a:fillRef idx="1">
-            <a:schemeClr val="accent1"/>
-          </a:fillRef>
-          <a:effectRef idx="0">
-            <a:schemeClr val="accent1"/>
-          </a:effectRef>
-          <a:fontRef idx="minor">
-            <a:schemeClr val="lt1"/>
-          </a:fontRef>
-        </p:style>
-        <p:txBody>
-          <a:bodyPr rtlCol="0" anchor="ctr"/>
-          <a:lstStyle/>
-          <a:p>
-            <a:pPr algn="ctr"/>
-            <a:r>
-              <a:rPr lang="en-US" dirty="0"/>
-              <a:t>Make</a:t>
-            </a:r>
-          </a:p>
-          <a:p>
-            <a:pPr algn="ctr"/>
-            <a:r>
-              <a:rPr lang="en-US" dirty="0"/>
-              <a:t>Model</a:t>
-            </a:r>
-          </a:p>
-          <a:p>
-            <a:pPr algn="ctr"/>
-            <a:r>
-              <a:rPr lang="en-US" dirty="0"/>
-              <a:t>Year</a:t>
-            </a:r>
-          </a:p>
-          <a:p>
-            <a:pPr algn="ctr"/>
-            <a:r>
-              <a:rPr lang="en-US" dirty="0"/>
-              <a:t>Mileage</a:t>
-            </a:r>
-            <a:br>
-              <a:rPr lang="en-US" dirty="0"/>
-            </a:br>
-            <a:r>
-              <a:rPr lang="en-US" dirty="0"/>
-              <a:t>Price</a:t>
-            </a:r>
-          </a:p>
-          <a:p>
-            <a:pPr algn="ctr"/>
-            <a:r>
-              <a:rPr lang="en-US" dirty="0"/>
-              <a:t>Contact Button</a:t>
-            </a:r>
-            <a:br>
-              <a:rPr lang="en-US" dirty="0"/>
-            </a:br>
-            <a:r>
-              <a:rPr lang="en-US" dirty="0"/>
-              <a:t>[image… API?]</a:t>
-            </a:r>
-          </a:p>
-        </p:txBody>
-      </p:sp>
-      <p:cxnSp>
-        <p:nvCxnSpPr>
-          <p:cNvPr id="14" name="Straight Connector 13">
-            <a:extLst>
-              <a:ext uri="{FF2B5EF4-FFF2-40B4-BE49-F238E27FC236}">
-                <a16:creationId xmlns:a16="http://schemas.microsoft.com/office/drawing/2014/main" id="{8BC294AD-01C9-D036-AC19-DB6692D59230}"/>
-              </a:ext>
-            </a:extLst>
-          </p:cNvPr>
-          <p:cNvCxnSpPr/>
-          <p:nvPr/>
-        </p:nvCxnSpPr>
-        <p:spPr>
-          <a:xfrm>
-            <a:off x="3271156" y="3298371"/>
-            <a:ext cx="1377044" cy="3156857"/>
-          </a:xfrm>
-          <a:prstGeom prst="line">
-            <a:avLst/>
-          </a:prstGeom>
-        </p:spPr>
-        <p:style>
-          <a:lnRef idx="1">
-            <a:schemeClr val="accent1"/>
-          </a:lnRef>
-          <a:fillRef idx="0">
-            <a:schemeClr val="accent1"/>
-          </a:fillRef>
-          <a:effectRef idx="0">
-            <a:schemeClr val="accent1"/>
-          </a:effectRef>
-          <a:fontRef idx="minor">
-            <a:schemeClr val="tx1"/>
-          </a:fontRef>
-        </p:style>
-      </p:cxnSp>
-      <p:cxnSp>
-        <p:nvCxnSpPr>
-          <p:cNvPr id="15" name="Straight Connector 14">
-            <a:extLst>
-              <a:ext uri="{FF2B5EF4-FFF2-40B4-BE49-F238E27FC236}">
-                <a16:creationId xmlns:a16="http://schemas.microsoft.com/office/drawing/2014/main" id="{2A9F7BD2-B595-D8E0-DEA2-F1BB5AE45E98}"/>
-              </a:ext>
-            </a:extLst>
-          </p:cNvPr>
-          <p:cNvCxnSpPr>
-            <a:cxnSpLocks/>
-          </p:cNvCxnSpPr>
-          <p:nvPr/>
-        </p:nvCxnSpPr>
-        <p:spPr>
-          <a:xfrm>
-            <a:off x="5080905" y="1850571"/>
-            <a:ext cx="4607381" cy="1796143"/>
-          </a:xfrm>
-          <a:prstGeom prst="line">
-            <a:avLst/>
-          </a:prstGeom>
-        </p:spPr>
-        <p:style>
-          <a:lnRef idx="1">
-            <a:schemeClr val="accent1"/>
-          </a:lnRef>
-          <a:fillRef idx="0">
-            <a:schemeClr val="accent1"/>
-          </a:fillRef>
-          <a:effectRef idx="0">
-            <a:schemeClr val="accent1"/>
-          </a:effectRef>
-          <a:fontRef idx="minor">
-            <a:schemeClr val="tx1"/>
-          </a:fontRef>
-        </p:style>
-      </p:cxnSp>
-    </p:spTree>
-    <p:extLst>
-      <p:ext uri="{BB962C8B-B14F-4D97-AF65-F5344CB8AC3E}">
-        <p14:creationId xmlns:p14="http://schemas.microsoft.com/office/powerpoint/2010/main" val="2258453339"/>
       </p:ext>
     </p:extLst>
   </p:cSld>

</xml_diff>

<commit_message>
PPT Update: high quality logo
</commit_message>
<xml_diff>
--- a/Capstone3_CJK.pptx
+++ b/Capstone3_CJK.pptx
@@ -12688,49 +12688,32 @@
       </p:sp>
       <p:pic>
         <p:nvPicPr>
-          <p:cNvPr id="1026" name="Picture 2" descr="Logo">
+          <p:cNvPr id="3" name="Picture 2">
             <a:extLst>
               <a:ext uri="{FF2B5EF4-FFF2-40B4-BE49-F238E27FC236}">
-                <a16:creationId xmlns:a16="http://schemas.microsoft.com/office/drawing/2014/main" id="{8740A592-64AB-CEA8-F38C-224DA0A5CE35}"/>
+                <a16:creationId xmlns:a16="http://schemas.microsoft.com/office/drawing/2014/main" id="{13217C25-C158-98FB-F42C-F3B6C8ABCC73}"/>
               </a:ext>
             </a:extLst>
           </p:cNvPr>
           <p:cNvPicPr>
-            <a:picLocks noChangeAspect="1" noChangeArrowheads="1"/>
+            <a:picLocks noChangeAspect="1"/>
           </p:cNvPicPr>
           <p:nvPr/>
         </p:nvPicPr>
         <p:blipFill>
-          <a:blip r:embed="rId2">
-            <a:extLst>
-              <a:ext uri="{28A0092B-C50C-407E-A947-70E740481C1C}">
-                <a14:useLocalDpi xmlns:a14="http://schemas.microsoft.com/office/drawing/2010/main" val="0"/>
-              </a:ext>
-            </a:extLst>
-          </a:blip>
-          <a:srcRect/>
+          <a:blip r:embed="rId2"/>
           <a:stretch>
             <a:fillRect/>
           </a:stretch>
         </p:blipFill>
-        <p:spPr bwMode="auto">
+        <p:spPr>
           <a:xfrm>
-            <a:off x="2186693" y="1605336"/>
-            <a:ext cx="6946422" cy="1678068"/>
+            <a:off x="1644538" y="960672"/>
+            <a:ext cx="8613521" cy="2079533"/>
           </a:xfrm>
           <a:prstGeom prst="rect">
             <a:avLst/>
           </a:prstGeom>
-          <a:noFill/>
-          <a:extLst>
-            <a:ext uri="{909E8E84-426E-40DD-AFC4-6F175D3DCCD1}">
-              <a14:hiddenFill xmlns:a14="http://schemas.microsoft.com/office/drawing/2010/main">
-                <a:solidFill>
-                  <a:srgbClr val="FFFFFF"/>
-                </a:solidFill>
-              </a14:hiddenFill>
-            </a:ext>
-          </a:extLst>
         </p:spPr>
       </p:pic>
     </p:spTree>

</xml_diff>

<commit_message>
update ppt with app name on close slide
</commit_message>
<xml_diff>
--- a/Capstone3_CJK.pptx
+++ b/Capstone3_CJK.pptx
@@ -15509,8 +15509,8 @@
         </p:nvSpPr>
         <p:spPr>
           <a:xfrm>
-            <a:off x="4038600" y="1939159"/>
-            <a:ext cx="7644627" cy="2751086"/>
+            <a:off x="4038600" y="2800693"/>
+            <a:ext cx="7644627" cy="1889552"/>
           </a:xfrm>
         </p:spPr>
         <p:txBody>
@@ -15522,9 +15522,8 @@
             <a:pPr algn="r"/>
             <a:r>
               <a:rPr lang="en-US" dirty="0"/>
-              <a:t>The End</a:t>
+              <a:t>Thank You</a:t>
             </a:r>
-            <a:endParaRPr lang="en-US"/>
           </a:p>
         </p:txBody>
       </p:sp>
@@ -15578,6 +15577,36 @@
           </a:p>
         </p:txBody>
       </p:sp>
+      <p:pic>
+        <p:nvPicPr>
+          <p:cNvPr id="3" name="Picture 2">
+            <a:extLst>
+              <a:ext uri="{FF2B5EF4-FFF2-40B4-BE49-F238E27FC236}">
+                <a16:creationId xmlns:a16="http://schemas.microsoft.com/office/drawing/2014/main" id="{EFABCFE8-4E37-5296-C9F9-B9DE4A616D6E}"/>
+              </a:ext>
+            </a:extLst>
+          </p:cNvPr>
+          <p:cNvPicPr>
+            <a:picLocks noChangeAspect="1"/>
+          </p:cNvPicPr>
+          <p:nvPr/>
+        </p:nvPicPr>
+        <p:blipFill>
+          <a:blip r:embed="rId2"/>
+          <a:stretch>
+            <a:fillRect/>
+          </a:stretch>
+        </p:blipFill>
+        <p:spPr>
+          <a:xfrm>
+            <a:off x="5138059" y="1359178"/>
+            <a:ext cx="6134519" cy="1481036"/>
+          </a:xfrm>
+          <a:prstGeom prst="rect">
+            <a:avLst/>
+          </a:prstGeom>
+        </p:spPr>
+      </p:pic>
     </p:spTree>
     <p:extLst>
       <p:ext uri="{BB962C8B-B14F-4D97-AF65-F5344CB8AC3E}">

</xml_diff>